<commit_message>
Update for lecture, and lab 03.
</commit_message>
<xml_diff>
--- a/bishops/cs321/resources/CS321_Lecture_04.pptx
+++ b/bishops/cs321/resources/CS321_Lecture_04.pptx
@@ -143,7 +143,7 @@
   </p:defaultTextStyle>
   <p:extLst>
     <p:ext uri="{EFAFB233-063F-42B5-8137-9DF3F51BA10A}">
-      <p15:sldGuideLst xmlns:p15="http://schemas.microsoft.com/office/powerpoint/2012/main" xmlns=""/>
+      <p15:sldGuideLst xmlns="" xmlns:p15="http://schemas.microsoft.com/office/powerpoint/2012/main"/>
     </p:ext>
   </p:extLst>
 </p:presentation>
@@ -154,7 +154,7 @@
   <p:cmAuthor id="1" name="Gregory" initials="G" lastIdx="1" clrIdx="0">
     <p:extLst>
       <p:ext uri="{19B8F6BF-5375-455C-9EA6-DF929625EA0E}">
-        <p15:presenceInfo xmlns:p15="http://schemas.microsoft.com/office/powerpoint/2012/main" xmlns="" userId="Gregory" providerId="None"/>
+        <p15:presenceInfo xmlns="" xmlns:p15="http://schemas.microsoft.com/office/powerpoint/2012/main" userId="Gregory" providerId="None"/>
       </p:ext>
     </p:extLst>
   </p:cmAuthor>
@@ -244,7 +244,7 @@
             <a:fld id="{A6583E9D-07AB-4C6D-BFD0-47E805C6B3D4}" type="datetimeFigureOut">
               <a:rPr lang="en-CA" smtClean="0"/>
               <a:pPr/>
-              <a:t>2025-01-05</a:t>
+              <a:t>2025-01-23</a:t>
             </a:fld>
             <a:endParaRPr lang="en-CA"/>
           </a:p>
@@ -413,7 +413,7 @@
     </p:spTree>
     <p:extLst>
       <p:ext uri="{BB962C8B-B14F-4D97-AF65-F5344CB8AC3E}">
-        <p14:creationId xmlns:p14="http://schemas.microsoft.com/office/powerpoint/2010/main" xmlns="" val="4237529172"/>
+        <p14:creationId xmlns="" xmlns:p14="http://schemas.microsoft.com/office/powerpoint/2010/main" val="4237529172"/>
       </p:ext>
     </p:extLst>
   </p:cSld>
@@ -588,7 +588,7 @@
     </p:spTree>
     <p:extLst>
       <p:ext uri="{BB962C8B-B14F-4D97-AF65-F5344CB8AC3E}">
-        <p14:creationId xmlns:p14="http://schemas.microsoft.com/office/powerpoint/2010/main" xmlns="" val="2340334442"/>
+        <p14:creationId xmlns="" xmlns:p14="http://schemas.microsoft.com/office/powerpoint/2010/main" val="2340334442"/>
       </p:ext>
     </p:extLst>
   </p:cSld>
@@ -792,7 +792,7 @@
     </p:spTree>
     <p:extLst>
       <p:ext uri="{BB962C8B-B14F-4D97-AF65-F5344CB8AC3E}">
-        <p14:creationId xmlns:p14="http://schemas.microsoft.com/office/powerpoint/2010/main" xmlns="" val="1900560834"/>
+        <p14:creationId xmlns="" xmlns:p14="http://schemas.microsoft.com/office/powerpoint/2010/main" val="1900560834"/>
       </p:ext>
     </p:extLst>
   </p:cSld>
@@ -966,7 +966,7 @@
     </p:spTree>
     <p:extLst>
       <p:ext uri="{BB962C8B-B14F-4D97-AF65-F5344CB8AC3E}">
-        <p14:creationId xmlns:p14="http://schemas.microsoft.com/office/powerpoint/2010/main" xmlns="" val="3722958745"/>
+        <p14:creationId xmlns="" xmlns:p14="http://schemas.microsoft.com/office/powerpoint/2010/main" val="3722958745"/>
       </p:ext>
     </p:extLst>
   </p:cSld>
@@ -1202,7 +1202,7 @@
     </p:spTree>
     <p:extLst>
       <p:ext uri="{BB962C8B-B14F-4D97-AF65-F5344CB8AC3E}">
-        <p14:creationId xmlns:p14="http://schemas.microsoft.com/office/powerpoint/2010/main" xmlns="" val="1822376042"/>
+        <p14:creationId xmlns="" xmlns:p14="http://schemas.microsoft.com/office/powerpoint/2010/main" val="1822376042"/>
       </p:ext>
     </p:extLst>
   </p:cSld>
@@ -1452,7 +1452,7 @@
     </p:spTree>
     <p:extLst>
       <p:ext uri="{BB962C8B-B14F-4D97-AF65-F5344CB8AC3E}">
-        <p14:creationId xmlns:p14="http://schemas.microsoft.com/office/powerpoint/2010/main" xmlns="" val="3411672561"/>
+        <p14:creationId xmlns="" xmlns:p14="http://schemas.microsoft.com/office/powerpoint/2010/main" val="3411672561"/>
       </p:ext>
     </p:extLst>
   </p:cSld>
@@ -1688,7 +1688,7 @@
     </p:spTree>
     <p:extLst>
       <p:ext uri="{BB962C8B-B14F-4D97-AF65-F5344CB8AC3E}">
-        <p14:creationId xmlns:p14="http://schemas.microsoft.com/office/powerpoint/2010/main" xmlns="" val="1093008526"/>
+        <p14:creationId xmlns="" xmlns:p14="http://schemas.microsoft.com/office/powerpoint/2010/main" val="1093008526"/>
       </p:ext>
     </p:extLst>
   </p:cSld>
@@ -2059,7 +2059,7 @@
     </p:spTree>
     <p:extLst>
       <p:ext uri="{BB962C8B-B14F-4D97-AF65-F5344CB8AC3E}">
-        <p14:creationId xmlns:p14="http://schemas.microsoft.com/office/powerpoint/2010/main" xmlns="" val="1087924878"/>
+        <p14:creationId xmlns="" xmlns:p14="http://schemas.microsoft.com/office/powerpoint/2010/main" val="1087924878"/>
       </p:ext>
     </p:extLst>
   </p:cSld>
@@ -2181,7 +2181,7 @@
     </p:spTree>
     <p:extLst>
       <p:ext uri="{BB962C8B-B14F-4D97-AF65-F5344CB8AC3E}">
-        <p14:creationId xmlns:p14="http://schemas.microsoft.com/office/powerpoint/2010/main" xmlns="" val="3802387408"/>
+        <p14:creationId xmlns="" xmlns:p14="http://schemas.microsoft.com/office/powerpoint/2010/main" val="3802387408"/>
       </p:ext>
     </p:extLst>
   </p:cSld>
@@ -2280,7 +2280,7 @@
     </p:spTree>
     <p:extLst>
       <p:ext uri="{BB962C8B-B14F-4D97-AF65-F5344CB8AC3E}">
-        <p14:creationId xmlns:p14="http://schemas.microsoft.com/office/powerpoint/2010/main" xmlns="" val="4234091411"/>
+        <p14:creationId xmlns="" xmlns:p14="http://schemas.microsoft.com/office/powerpoint/2010/main" val="4234091411"/>
       </p:ext>
     </p:extLst>
   </p:cSld>
@@ -2561,7 +2561,7 @@
     </p:spTree>
     <p:extLst>
       <p:ext uri="{BB962C8B-B14F-4D97-AF65-F5344CB8AC3E}">
-        <p14:creationId xmlns:p14="http://schemas.microsoft.com/office/powerpoint/2010/main" xmlns="" val="4189422420"/>
+        <p14:creationId xmlns="" xmlns:p14="http://schemas.microsoft.com/office/powerpoint/2010/main" val="4189422420"/>
       </p:ext>
     </p:extLst>
   </p:cSld>
@@ -2818,7 +2818,7 @@
     </p:spTree>
     <p:extLst>
       <p:ext uri="{BB962C8B-B14F-4D97-AF65-F5344CB8AC3E}">
-        <p14:creationId xmlns:p14="http://schemas.microsoft.com/office/powerpoint/2010/main" xmlns="" val="3252977898"/>
+        <p14:creationId xmlns="" xmlns:p14="http://schemas.microsoft.com/office/powerpoint/2010/main" val="3252977898"/>
       </p:ext>
     </p:extLst>
   </p:cSld>
@@ -3087,7 +3087,7 @@
           <a:blip r:embed="rId13" cstate="print">
             <a:extLst>
               <a:ext uri="{28A0092B-C50C-407E-A947-70E740481C1C}">
-                <a14:useLocalDpi xmlns:a14="http://schemas.microsoft.com/office/drawing/2010/main" xmlns="" val="0"/>
+                <a14:useLocalDpi xmlns="" xmlns:a14="http://schemas.microsoft.com/office/drawing/2010/main" val="0"/>
               </a:ext>
             </a:extLst>
           </a:blip>
@@ -3108,7 +3108,7 @@
     </p:spTree>
     <p:extLst>
       <p:ext uri="{BB962C8B-B14F-4D97-AF65-F5344CB8AC3E}">
-        <p14:creationId xmlns:p14="http://schemas.microsoft.com/office/powerpoint/2010/main" xmlns="" val="4230061028"/>
+        <p14:creationId xmlns="" xmlns:p14="http://schemas.microsoft.com/office/powerpoint/2010/main" val="4230061028"/>
       </p:ext>
     </p:extLst>
   </p:cSld>
@@ -3560,7 +3560,7 @@
           <p:cNvPr id="13" name="Picture 8" descr="http://osiris.ubishops.ca/~alussier/images/transparentlogo_bu.png">
             <a:extLst>
               <a:ext uri="{FF2B5EF4-FFF2-40B4-BE49-F238E27FC236}">
-                <a16:creationId xmlns:a16="http://schemas.microsoft.com/office/drawing/2014/main" xmlns="" id="{CCB9A035-2F1C-4B96-A5DB-70B72D6E4AD8}"/>
+                <a16:creationId xmlns="" xmlns:a16="http://schemas.microsoft.com/office/drawing/2014/main" id="{CCB9A035-2F1C-4B96-A5DB-70B72D6E4AD8}"/>
               </a:ext>
             </a:extLst>
           </p:cNvPr>
@@ -3573,7 +3573,7 @@
           <a:blip r:embed="rId3" cstate="print">
             <a:extLst>
               <a:ext uri="{28A0092B-C50C-407E-A947-70E740481C1C}">
-                <a14:useLocalDpi xmlns:a14="http://schemas.microsoft.com/office/drawing/2010/main" xmlns="" val="0"/>
+                <a14:useLocalDpi xmlns="" xmlns:a14="http://schemas.microsoft.com/office/drawing/2010/main" val="0"/>
               </a:ext>
             </a:extLst>
           </a:blip>
@@ -3593,7 +3593,7 @@
           <a:noFill/>
           <a:extLst>
             <a:ext uri="{909E8E84-426E-40DD-AFC4-6F175D3DCCD1}">
-              <a14:hiddenFill xmlns:a14="http://schemas.microsoft.com/office/drawing/2010/main" xmlns="">
+              <a14:hiddenFill xmlns="" xmlns:a14="http://schemas.microsoft.com/office/drawing/2010/main">
                 <a:solidFill>
                   <a:srgbClr val="FFFFFF"/>
                 </a:solidFill>
@@ -3605,7 +3605,7 @@
     </p:spTree>
     <p:extLst>
       <p:ext uri="{BB962C8B-B14F-4D97-AF65-F5344CB8AC3E}">
-        <p14:creationId xmlns:p14="http://schemas.microsoft.com/office/powerpoint/2010/main" xmlns="" val="4177077622"/>
+        <p14:creationId xmlns="" xmlns:p14="http://schemas.microsoft.com/office/powerpoint/2010/main" val="4177077622"/>
       </p:ext>
     </p:extLst>
   </p:cSld>
@@ -3746,7 +3746,7 @@
           <p:cNvPr id="7" name="Picture 6">
             <a:extLst>
               <a:ext uri="{FF2B5EF4-FFF2-40B4-BE49-F238E27FC236}">
-                <a16:creationId xmlns:a16="http://schemas.microsoft.com/office/drawing/2014/main" xmlns="" id="{8BAB5EDB-C339-4658-978D-CB7B86C318C8}"/>
+                <a16:creationId xmlns="" xmlns:a16="http://schemas.microsoft.com/office/drawing/2014/main" id="{8BAB5EDB-C339-4658-978D-CB7B86C318C8}"/>
               </a:ext>
             </a:extLst>
           </p:cNvPr>
@@ -3759,10 +3759,10 @@
           <a:blip r:embed="rId2" cstate="print">
             <a:extLst>
               <a:ext uri="{28A0092B-C50C-407E-A947-70E740481C1C}">
-                <a14:useLocalDpi xmlns:a14="http://schemas.microsoft.com/office/drawing/2010/main" xmlns="" val="0"/>
+                <a14:useLocalDpi xmlns="" xmlns:a14="http://schemas.microsoft.com/office/drawing/2010/main" val="0"/>
               </a:ext>
               <a:ext uri="{837473B0-CC2E-450A-ABE3-18F120FF3D39}">
-                <a1611:picAttrSrcUrl xmlns:a1611="http://schemas.microsoft.com/office/drawing/2016/11/main" xmlns="" r:id="rId3"/>
+                <a1611:picAttrSrcUrl xmlns="" xmlns:a1611="http://schemas.microsoft.com/office/drawing/2016/11/main" r:id="rId3"/>
               </a:ext>
             </a:extLst>
           </a:blip>
@@ -3785,7 +3785,7 @@
           <p:cNvPr id="9" name="Picture 8">
             <a:extLst>
               <a:ext uri="{FF2B5EF4-FFF2-40B4-BE49-F238E27FC236}">
-                <a16:creationId xmlns:a16="http://schemas.microsoft.com/office/drawing/2014/main" xmlns="" id="{217DD399-6BEC-42B0-8C8F-80C05C13BB8F}"/>
+                <a16:creationId xmlns="" xmlns:a16="http://schemas.microsoft.com/office/drawing/2014/main" id="{217DD399-6BEC-42B0-8C8F-80C05C13BB8F}"/>
               </a:ext>
             </a:extLst>
           </p:cNvPr>
@@ -3798,10 +3798,10 @@
           <a:blip r:embed="rId4" cstate="print">
             <a:extLst>
               <a:ext uri="{28A0092B-C50C-407E-A947-70E740481C1C}">
-                <a14:useLocalDpi xmlns:a14="http://schemas.microsoft.com/office/drawing/2010/main" xmlns="" val="0"/>
+                <a14:useLocalDpi xmlns="" xmlns:a14="http://schemas.microsoft.com/office/drawing/2010/main" val="0"/>
               </a:ext>
               <a:ext uri="{837473B0-CC2E-450A-ABE3-18F120FF3D39}">
-                <a1611:picAttrSrcUrl xmlns:a1611="http://schemas.microsoft.com/office/drawing/2016/11/main" xmlns="" r:id="rId5"/>
+                <a1611:picAttrSrcUrl xmlns="" xmlns:a1611="http://schemas.microsoft.com/office/drawing/2016/11/main" r:id="rId5"/>
               </a:ext>
             </a:extLst>
           </a:blip>
@@ -3824,7 +3824,7 @@
           <p:cNvPr id="5" name="Straight Arrow Connector 4">
             <a:extLst>
               <a:ext uri="{FF2B5EF4-FFF2-40B4-BE49-F238E27FC236}">
-                <a16:creationId xmlns:a16="http://schemas.microsoft.com/office/drawing/2014/main" xmlns="" id="{807C7073-511B-46BE-8CEC-CAFF15AD79B2}"/>
+                <a16:creationId xmlns="" xmlns:a16="http://schemas.microsoft.com/office/drawing/2014/main" id="{807C7073-511B-46BE-8CEC-CAFF15AD79B2}"/>
               </a:ext>
             </a:extLst>
           </p:cNvPr>
@@ -3868,7 +3868,7 @@
           <p:cNvPr id="13" name="TextBox 12">
             <a:extLst>
               <a:ext uri="{FF2B5EF4-FFF2-40B4-BE49-F238E27FC236}">
-                <a16:creationId xmlns:a16="http://schemas.microsoft.com/office/drawing/2014/main" xmlns="" id="{E056EDE4-8844-4846-B0A1-BE530F4D7466}"/>
+                <a16:creationId xmlns="" xmlns:a16="http://schemas.microsoft.com/office/drawing/2014/main" id="{E056EDE4-8844-4846-B0A1-BE530F4D7466}"/>
               </a:ext>
             </a:extLst>
           </p:cNvPr>
@@ -3910,7 +3910,7 @@
           <p:cNvPr id="14" name="TextBox 13">
             <a:extLst>
               <a:ext uri="{FF2B5EF4-FFF2-40B4-BE49-F238E27FC236}">
-                <a16:creationId xmlns:a16="http://schemas.microsoft.com/office/drawing/2014/main" xmlns="" id="{16109C71-5DB7-418B-ACC6-6B9C83D6F5BB}"/>
+                <a16:creationId xmlns="" xmlns:a16="http://schemas.microsoft.com/office/drawing/2014/main" id="{16109C71-5DB7-418B-ACC6-6B9C83D6F5BB}"/>
               </a:ext>
             </a:extLst>
           </p:cNvPr>
@@ -3960,7 +3960,7 @@
           <p:cNvPr id="15" name="Straight Arrow Connector 14">
             <a:extLst>
               <a:ext uri="{FF2B5EF4-FFF2-40B4-BE49-F238E27FC236}">
-                <a16:creationId xmlns:a16="http://schemas.microsoft.com/office/drawing/2014/main" xmlns="" id="{005BF5B4-EE3E-4309-A841-F9E134AE9FC1}"/>
+                <a16:creationId xmlns="" xmlns:a16="http://schemas.microsoft.com/office/drawing/2014/main" id="{005BF5B4-EE3E-4309-A841-F9E134AE9FC1}"/>
               </a:ext>
             </a:extLst>
           </p:cNvPr>
@@ -4002,7 +4002,7 @@
     </p:spTree>
     <p:extLst>
       <p:ext uri="{BB962C8B-B14F-4D97-AF65-F5344CB8AC3E}">
-        <p14:creationId xmlns:p14="http://schemas.microsoft.com/office/powerpoint/2010/main" xmlns="" val="100707161"/>
+        <p14:creationId xmlns="" xmlns:p14="http://schemas.microsoft.com/office/powerpoint/2010/main" val="100707161"/>
       </p:ext>
     </p:extLst>
   </p:cSld>
@@ -4143,7 +4143,7 @@
           <p:cNvPr id="7" name="Picture 6">
             <a:extLst>
               <a:ext uri="{FF2B5EF4-FFF2-40B4-BE49-F238E27FC236}">
-                <a16:creationId xmlns:a16="http://schemas.microsoft.com/office/drawing/2014/main" xmlns="" id="{8BAB5EDB-C339-4658-978D-CB7B86C318C8}"/>
+                <a16:creationId xmlns="" xmlns:a16="http://schemas.microsoft.com/office/drawing/2014/main" id="{8BAB5EDB-C339-4658-978D-CB7B86C318C8}"/>
               </a:ext>
             </a:extLst>
           </p:cNvPr>
@@ -4156,10 +4156,10 @@
           <a:blip r:embed="rId2" cstate="print">
             <a:extLst>
               <a:ext uri="{28A0092B-C50C-407E-A947-70E740481C1C}">
-                <a14:useLocalDpi xmlns:a14="http://schemas.microsoft.com/office/drawing/2010/main" xmlns="" val="0"/>
+                <a14:useLocalDpi xmlns="" xmlns:a14="http://schemas.microsoft.com/office/drawing/2010/main" val="0"/>
               </a:ext>
               <a:ext uri="{837473B0-CC2E-450A-ABE3-18F120FF3D39}">
-                <a1611:picAttrSrcUrl xmlns:a1611="http://schemas.microsoft.com/office/drawing/2016/11/main" xmlns="" r:id="rId3"/>
+                <a1611:picAttrSrcUrl xmlns="" xmlns:a1611="http://schemas.microsoft.com/office/drawing/2016/11/main" r:id="rId3"/>
               </a:ext>
             </a:extLst>
           </a:blip>
@@ -4182,7 +4182,7 @@
           <p:cNvPr id="9" name="Picture 8">
             <a:extLst>
               <a:ext uri="{FF2B5EF4-FFF2-40B4-BE49-F238E27FC236}">
-                <a16:creationId xmlns:a16="http://schemas.microsoft.com/office/drawing/2014/main" xmlns="" id="{217DD399-6BEC-42B0-8C8F-80C05C13BB8F}"/>
+                <a16:creationId xmlns="" xmlns:a16="http://schemas.microsoft.com/office/drawing/2014/main" id="{217DD399-6BEC-42B0-8C8F-80C05C13BB8F}"/>
               </a:ext>
             </a:extLst>
           </p:cNvPr>
@@ -4195,10 +4195,10 @@
           <a:blip r:embed="rId4" cstate="print">
             <a:extLst>
               <a:ext uri="{28A0092B-C50C-407E-A947-70E740481C1C}">
-                <a14:useLocalDpi xmlns:a14="http://schemas.microsoft.com/office/drawing/2010/main" xmlns="" val="0"/>
+                <a14:useLocalDpi xmlns="" xmlns:a14="http://schemas.microsoft.com/office/drawing/2010/main" val="0"/>
               </a:ext>
               <a:ext uri="{837473B0-CC2E-450A-ABE3-18F120FF3D39}">
-                <a1611:picAttrSrcUrl xmlns:a1611="http://schemas.microsoft.com/office/drawing/2016/11/main" xmlns="" r:id="rId5"/>
+                <a1611:picAttrSrcUrl xmlns="" xmlns:a1611="http://schemas.microsoft.com/office/drawing/2016/11/main" r:id="rId5"/>
               </a:ext>
             </a:extLst>
           </a:blip>
@@ -4221,7 +4221,7 @@
           <p:cNvPr id="5" name="Straight Arrow Connector 4">
             <a:extLst>
               <a:ext uri="{FF2B5EF4-FFF2-40B4-BE49-F238E27FC236}">
-                <a16:creationId xmlns:a16="http://schemas.microsoft.com/office/drawing/2014/main" xmlns="" id="{807C7073-511B-46BE-8CEC-CAFF15AD79B2}"/>
+                <a16:creationId xmlns="" xmlns:a16="http://schemas.microsoft.com/office/drawing/2014/main" id="{807C7073-511B-46BE-8CEC-CAFF15AD79B2}"/>
               </a:ext>
             </a:extLst>
           </p:cNvPr>
@@ -4265,7 +4265,7 @@
           <p:cNvPr id="13" name="TextBox 12">
             <a:extLst>
               <a:ext uri="{FF2B5EF4-FFF2-40B4-BE49-F238E27FC236}">
-                <a16:creationId xmlns:a16="http://schemas.microsoft.com/office/drawing/2014/main" xmlns="" id="{E056EDE4-8844-4846-B0A1-BE530F4D7466}"/>
+                <a16:creationId xmlns="" xmlns:a16="http://schemas.microsoft.com/office/drawing/2014/main" id="{E056EDE4-8844-4846-B0A1-BE530F4D7466}"/>
               </a:ext>
             </a:extLst>
           </p:cNvPr>
@@ -4307,7 +4307,7 @@
           <p:cNvPr id="14" name="TextBox 13">
             <a:extLst>
               <a:ext uri="{FF2B5EF4-FFF2-40B4-BE49-F238E27FC236}">
-                <a16:creationId xmlns:a16="http://schemas.microsoft.com/office/drawing/2014/main" xmlns="" id="{16109C71-5DB7-418B-ACC6-6B9C83D6F5BB}"/>
+                <a16:creationId xmlns="" xmlns:a16="http://schemas.microsoft.com/office/drawing/2014/main" id="{16109C71-5DB7-418B-ACC6-6B9C83D6F5BB}"/>
               </a:ext>
             </a:extLst>
           </p:cNvPr>
@@ -4357,7 +4357,7 @@
           <p:cNvPr id="15" name="Straight Arrow Connector 14">
             <a:extLst>
               <a:ext uri="{FF2B5EF4-FFF2-40B4-BE49-F238E27FC236}">
-                <a16:creationId xmlns:a16="http://schemas.microsoft.com/office/drawing/2014/main" xmlns="" id="{005BF5B4-EE3E-4309-A841-F9E134AE9FC1}"/>
+                <a16:creationId xmlns="" xmlns:a16="http://schemas.microsoft.com/office/drawing/2014/main" id="{005BF5B4-EE3E-4309-A841-F9E134AE9FC1}"/>
               </a:ext>
             </a:extLst>
           </p:cNvPr>
@@ -4401,7 +4401,7 @@
           <p:cNvPr id="17" name="Oval 16">
             <a:extLst>
               <a:ext uri="{FF2B5EF4-FFF2-40B4-BE49-F238E27FC236}">
-                <a16:creationId xmlns:a16="http://schemas.microsoft.com/office/drawing/2014/main" xmlns="" id="{DBA27E3B-CE81-443B-8B7B-F3E80DB22152}"/>
+                <a16:creationId xmlns="" xmlns:a16="http://schemas.microsoft.com/office/drawing/2014/main" id="{DBA27E3B-CE81-443B-8B7B-F3E80DB22152}"/>
               </a:ext>
             </a:extLst>
           </p:cNvPr>
@@ -4449,7 +4449,7 @@
           <p:cNvPr id="19" name="Oval 18">
             <a:extLst>
               <a:ext uri="{FF2B5EF4-FFF2-40B4-BE49-F238E27FC236}">
-                <a16:creationId xmlns:a16="http://schemas.microsoft.com/office/drawing/2014/main" xmlns="" id="{059E428F-9429-45DA-A48E-0CC5482E0B5D}"/>
+                <a16:creationId xmlns="" xmlns:a16="http://schemas.microsoft.com/office/drawing/2014/main" id="{059E428F-9429-45DA-A48E-0CC5482E0B5D}"/>
               </a:ext>
             </a:extLst>
           </p:cNvPr>
@@ -4499,7 +4499,7 @@
     </p:spTree>
     <p:extLst>
       <p:ext uri="{BB962C8B-B14F-4D97-AF65-F5344CB8AC3E}">
-        <p14:creationId xmlns:p14="http://schemas.microsoft.com/office/powerpoint/2010/main" xmlns="" val="3902734336"/>
+        <p14:creationId xmlns="" xmlns:p14="http://schemas.microsoft.com/office/powerpoint/2010/main" val="3902734336"/>
       </p:ext>
     </p:extLst>
   </p:cSld>
@@ -4640,7 +4640,7 @@
           <p:cNvPr id="7" name="Picture 6">
             <a:extLst>
               <a:ext uri="{FF2B5EF4-FFF2-40B4-BE49-F238E27FC236}">
-                <a16:creationId xmlns:a16="http://schemas.microsoft.com/office/drawing/2014/main" xmlns="" id="{8BAB5EDB-C339-4658-978D-CB7B86C318C8}"/>
+                <a16:creationId xmlns="" xmlns:a16="http://schemas.microsoft.com/office/drawing/2014/main" id="{8BAB5EDB-C339-4658-978D-CB7B86C318C8}"/>
               </a:ext>
             </a:extLst>
           </p:cNvPr>
@@ -4653,10 +4653,10 @@
           <a:blip r:embed="rId2" cstate="print">
             <a:extLst>
               <a:ext uri="{28A0092B-C50C-407E-A947-70E740481C1C}">
-                <a14:useLocalDpi xmlns:a14="http://schemas.microsoft.com/office/drawing/2010/main" xmlns="" val="0"/>
+                <a14:useLocalDpi xmlns="" xmlns:a14="http://schemas.microsoft.com/office/drawing/2010/main" val="0"/>
               </a:ext>
               <a:ext uri="{837473B0-CC2E-450A-ABE3-18F120FF3D39}">
-                <a1611:picAttrSrcUrl xmlns:a1611="http://schemas.microsoft.com/office/drawing/2016/11/main" xmlns="" r:id="rId3"/>
+                <a1611:picAttrSrcUrl xmlns="" xmlns:a1611="http://schemas.microsoft.com/office/drawing/2016/11/main" r:id="rId3"/>
               </a:ext>
             </a:extLst>
           </a:blip>
@@ -4679,7 +4679,7 @@
           <p:cNvPr id="9" name="Picture 8">
             <a:extLst>
               <a:ext uri="{FF2B5EF4-FFF2-40B4-BE49-F238E27FC236}">
-                <a16:creationId xmlns:a16="http://schemas.microsoft.com/office/drawing/2014/main" xmlns="" id="{217DD399-6BEC-42B0-8C8F-80C05C13BB8F}"/>
+                <a16:creationId xmlns="" xmlns:a16="http://schemas.microsoft.com/office/drawing/2014/main" id="{217DD399-6BEC-42B0-8C8F-80C05C13BB8F}"/>
               </a:ext>
             </a:extLst>
           </p:cNvPr>
@@ -4692,10 +4692,10 @@
           <a:blip r:embed="rId4" cstate="print">
             <a:extLst>
               <a:ext uri="{28A0092B-C50C-407E-A947-70E740481C1C}">
-                <a14:useLocalDpi xmlns:a14="http://schemas.microsoft.com/office/drawing/2010/main" xmlns="" val="0"/>
+                <a14:useLocalDpi xmlns="" xmlns:a14="http://schemas.microsoft.com/office/drawing/2010/main" val="0"/>
               </a:ext>
               <a:ext uri="{837473B0-CC2E-450A-ABE3-18F120FF3D39}">
-                <a1611:picAttrSrcUrl xmlns:a1611="http://schemas.microsoft.com/office/drawing/2016/11/main" xmlns="" r:id="rId5"/>
+                <a1611:picAttrSrcUrl xmlns="" xmlns:a1611="http://schemas.microsoft.com/office/drawing/2016/11/main" r:id="rId5"/>
               </a:ext>
             </a:extLst>
           </a:blip>
@@ -4718,7 +4718,7 @@
           <p:cNvPr id="5" name="Straight Arrow Connector 4">
             <a:extLst>
               <a:ext uri="{FF2B5EF4-FFF2-40B4-BE49-F238E27FC236}">
-                <a16:creationId xmlns:a16="http://schemas.microsoft.com/office/drawing/2014/main" xmlns="" id="{807C7073-511B-46BE-8CEC-CAFF15AD79B2}"/>
+                <a16:creationId xmlns="" xmlns:a16="http://schemas.microsoft.com/office/drawing/2014/main" id="{807C7073-511B-46BE-8CEC-CAFF15AD79B2}"/>
               </a:ext>
             </a:extLst>
           </p:cNvPr>
@@ -4762,7 +4762,7 @@
           <p:cNvPr id="13" name="TextBox 12">
             <a:extLst>
               <a:ext uri="{FF2B5EF4-FFF2-40B4-BE49-F238E27FC236}">
-                <a16:creationId xmlns:a16="http://schemas.microsoft.com/office/drawing/2014/main" xmlns="" id="{E056EDE4-8844-4846-B0A1-BE530F4D7466}"/>
+                <a16:creationId xmlns="" xmlns:a16="http://schemas.microsoft.com/office/drawing/2014/main" id="{E056EDE4-8844-4846-B0A1-BE530F4D7466}"/>
               </a:ext>
             </a:extLst>
           </p:cNvPr>
@@ -4804,7 +4804,7 @@
           <p:cNvPr id="14" name="TextBox 13">
             <a:extLst>
               <a:ext uri="{FF2B5EF4-FFF2-40B4-BE49-F238E27FC236}">
-                <a16:creationId xmlns:a16="http://schemas.microsoft.com/office/drawing/2014/main" xmlns="" id="{16109C71-5DB7-418B-ACC6-6B9C83D6F5BB}"/>
+                <a16:creationId xmlns="" xmlns:a16="http://schemas.microsoft.com/office/drawing/2014/main" id="{16109C71-5DB7-418B-ACC6-6B9C83D6F5BB}"/>
               </a:ext>
             </a:extLst>
           </p:cNvPr>
@@ -4854,7 +4854,7 @@
           <p:cNvPr id="15" name="Straight Arrow Connector 14">
             <a:extLst>
               <a:ext uri="{FF2B5EF4-FFF2-40B4-BE49-F238E27FC236}">
-                <a16:creationId xmlns:a16="http://schemas.microsoft.com/office/drawing/2014/main" xmlns="" id="{005BF5B4-EE3E-4309-A841-F9E134AE9FC1}"/>
+                <a16:creationId xmlns="" xmlns:a16="http://schemas.microsoft.com/office/drawing/2014/main" id="{005BF5B4-EE3E-4309-A841-F9E134AE9FC1}"/>
               </a:ext>
             </a:extLst>
           </p:cNvPr>
@@ -4898,7 +4898,7 @@
           <p:cNvPr id="8" name="Straight Connector 7">
             <a:extLst>
               <a:ext uri="{FF2B5EF4-FFF2-40B4-BE49-F238E27FC236}">
-                <a16:creationId xmlns:a16="http://schemas.microsoft.com/office/drawing/2014/main" xmlns="" id="{3B59536B-137F-41E4-BA0A-2C4C1A71E1C1}"/>
+                <a16:creationId xmlns="" xmlns:a16="http://schemas.microsoft.com/office/drawing/2014/main" id="{3B59536B-137F-41E4-BA0A-2C4C1A71E1C1}"/>
               </a:ext>
             </a:extLst>
           </p:cNvPr>
@@ -4939,7 +4939,7 @@
           <p:cNvPr id="16" name="Straight Connector 15">
             <a:extLst>
               <a:ext uri="{FF2B5EF4-FFF2-40B4-BE49-F238E27FC236}">
-                <a16:creationId xmlns:a16="http://schemas.microsoft.com/office/drawing/2014/main" xmlns="" id="{D5F83E8C-4962-4D60-9C76-2445177C0A91}"/>
+                <a16:creationId xmlns="" xmlns:a16="http://schemas.microsoft.com/office/drawing/2014/main" id="{D5F83E8C-4962-4D60-9C76-2445177C0A91}"/>
               </a:ext>
             </a:extLst>
           </p:cNvPr>
@@ -4980,7 +4980,7 @@
     </p:spTree>
     <p:extLst>
       <p:ext uri="{BB962C8B-B14F-4D97-AF65-F5344CB8AC3E}">
-        <p14:creationId xmlns:p14="http://schemas.microsoft.com/office/powerpoint/2010/main" xmlns="" val="3140037942"/>
+        <p14:creationId xmlns="" xmlns:p14="http://schemas.microsoft.com/office/powerpoint/2010/main" val="3140037942"/>
       </p:ext>
     </p:extLst>
   </p:cSld>
@@ -5121,7 +5121,7 @@
           <p:cNvPr id="7" name="Picture 6">
             <a:extLst>
               <a:ext uri="{FF2B5EF4-FFF2-40B4-BE49-F238E27FC236}">
-                <a16:creationId xmlns:a16="http://schemas.microsoft.com/office/drawing/2014/main" xmlns="" id="{8BAB5EDB-C339-4658-978D-CB7B86C318C8}"/>
+                <a16:creationId xmlns="" xmlns:a16="http://schemas.microsoft.com/office/drawing/2014/main" id="{8BAB5EDB-C339-4658-978D-CB7B86C318C8}"/>
               </a:ext>
             </a:extLst>
           </p:cNvPr>
@@ -5134,10 +5134,10 @@
           <a:blip r:embed="rId2" cstate="print">
             <a:extLst>
               <a:ext uri="{28A0092B-C50C-407E-A947-70E740481C1C}">
-                <a14:useLocalDpi xmlns:a14="http://schemas.microsoft.com/office/drawing/2010/main" xmlns="" val="0"/>
+                <a14:useLocalDpi xmlns="" xmlns:a14="http://schemas.microsoft.com/office/drawing/2010/main" val="0"/>
               </a:ext>
               <a:ext uri="{837473B0-CC2E-450A-ABE3-18F120FF3D39}">
-                <a1611:picAttrSrcUrl xmlns:a1611="http://schemas.microsoft.com/office/drawing/2016/11/main" xmlns="" r:id="rId3"/>
+                <a1611:picAttrSrcUrl xmlns="" xmlns:a1611="http://schemas.microsoft.com/office/drawing/2016/11/main" r:id="rId3"/>
               </a:ext>
             </a:extLst>
           </a:blip>
@@ -5160,7 +5160,7 @@
           <p:cNvPr id="9" name="Picture 8">
             <a:extLst>
               <a:ext uri="{FF2B5EF4-FFF2-40B4-BE49-F238E27FC236}">
-                <a16:creationId xmlns:a16="http://schemas.microsoft.com/office/drawing/2014/main" xmlns="" id="{217DD399-6BEC-42B0-8C8F-80C05C13BB8F}"/>
+                <a16:creationId xmlns="" xmlns:a16="http://schemas.microsoft.com/office/drawing/2014/main" id="{217DD399-6BEC-42B0-8C8F-80C05C13BB8F}"/>
               </a:ext>
             </a:extLst>
           </p:cNvPr>
@@ -5173,10 +5173,10 @@
           <a:blip r:embed="rId4" cstate="print">
             <a:extLst>
               <a:ext uri="{28A0092B-C50C-407E-A947-70E740481C1C}">
-                <a14:useLocalDpi xmlns:a14="http://schemas.microsoft.com/office/drawing/2010/main" xmlns="" val="0"/>
+                <a14:useLocalDpi xmlns="" xmlns:a14="http://schemas.microsoft.com/office/drawing/2010/main" val="0"/>
               </a:ext>
               <a:ext uri="{837473B0-CC2E-450A-ABE3-18F120FF3D39}">
-                <a1611:picAttrSrcUrl xmlns:a1611="http://schemas.microsoft.com/office/drawing/2016/11/main" xmlns="" r:id="rId5"/>
+                <a1611:picAttrSrcUrl xmlns="" xmlns:a1611="http://schemas.microsoft.com/office/drawing/2016/11/main" r:id="rId5"/>
               </a:ext>
             </a:extLst>
           </a:blip>
@@ -5199,7 +5199,7 @@
           <p:cNvPr id="5" name="Straight Arrow Connector 4">
             <a:extLst>
               <a:ext uri="{FF2B5EF4-FFF2-40B4-BE49-F238E27FC236}">
-                <a16:creationId xmlns:a16="http://schemas.microsoft.com/office/drawing/2014/main" xmlns="" id="{807C7073-511B-46BE-8CEC-CAFF15AD79B2}"/>
+                <a16:creationId xmlns="" xmlns:a16="http://schemas.microsoft.com/office/drawing/2014/main" id="{807C7073-511B-46BE-8CEC-CAFF15AD79B2}"/>
               </a:ext>
             </a:extLst>
           </p:cNvPr>
@@ -5243,7 +5243,7 @@
           <p:cNvPr id="13" name="TextBox 12">
             <a:extLst>
               <a:ext uri="{FF2B5EF4-FFF2-40B4-BE49-F238E27FC236}">
-                <a16:creationId xmlns:a16="http://schemas.microsoft.com/office/drawing/2014/main" xmlns="" id="{E056EDE4-8844-4846-B0A1-BE530F4D7466}"/>
+                <a16:creationId xmlns="" xmlns:a16="http://schemas.microsoft.com/office/drawing/2014/main" id="{E056EDE4-8844-4846-B0A1-BE530F4D7466}"/>
               </a:ext>
             </a:extLst>
           </p:cNvPr>
@@ -5285,7 +5285,7 @@
           <p:cNvPr id="14" name="TextBox 13">
             <a:extLst>
               <a:ext uri="{FF2B5EF4-FFF2-40B4-BE49-F238E27FC236}">
-                <a16:creationId xmlns:a16="http://schemas.microsoft.com/office/drawing/2014/main" xmlns="" id="{16109C71-5DB7-418B-ACC6-6B9C83D6F5BB}"/>
+                <a16:creationId xmlns="" xmlns:a16="http://schemas.microsoft.com/office/drawing/2014/main" id="{16109C71-5DB7-418B-ACC6-6B9C83D6F5BB}"/>
               </a:ext>
             </a:extLst>
           </p:cNvPr>
@@ -5335,7 +5335,7 @@
           <p:cNvPr id="15" name="Straight Arrow Connector 14">
             <a:extLst>
               <a:ext uri="{FF2B5EF4-FFF2-40B4-BE49-F238E27FC236}">
-                <a16:creationId xmlns:a16="http://schemas.microsoft.com/office/drawing/2014/main" xmlns="" id="{005BF5B4-EE3E-4309-A841-F9E134AE9FC1}"/>
+                <a16:creationId xmlns="" xmlns:a16="http://schemas.microsoft.com/office/drawing/2014/main" id="{005BF5B4-EE3E-4309-A841-F9E134AE9FC1}"/>
               </a:ext>
             </a:extLst>
           </p:cNvPr>
@@ -5379,7 +5379,7 @@
           <p:cNvPr id="4" name="Freeform: Shape 3">
             <a:extLst>
               <a:ext uri="{FF2B5EF4-FFF2-40B4-BE49-F238E27FC236}">
-                <a16:creationId xmlns:a16="http://schemas.microsoft.com/office/drawing/2014/main" xmlns="" id="{D0BEC306-7EB5-4B09-8E8E-D0C74D8CB22E}"/>
+                <a16:creationId xmlns="" xmlns:a16="http://schemas.microsoft.com/office/drawing/2014/main" id="{D0BEC306-7EB5-4B09-8E8E-D0C74D8CB22E}"/>
               </a:ext>
             </a:extLst>
           </p:cNvPr>
@@ -5532,7 +5532,7 @@
           <p:cNvPr id="11" name="Rectangle 10">
             <a:extLst>
               <a:ext uri="{FF2B5EF4-FFF2-40B4-BE49-F238E27FC236}">
-                <a16:creationId xmlns:a16="http://schemas.microsoft.com/office/drawing/2014/main" xmlns="" id="{9C0FB370-DD8C-4F2B-AF04-E541C7C8FFFB}"/>
+                <a16:creationId xmlns="" xmlns:a16="http://schemas.microsoft.com/office/drawing/2014/main" id="{9C0FB370-DD8C-4F2B-AF04-E541C7C8FFFB}"/>
               </a:ext>
             </a:extLst>
           </p:cNvPr>
@@ -5580,7 +5580,7 @@
           <p:cNvPr id="17" name="Rectangle 16">
             <a:extLst>
               <a:ext uri="{FF2B5EF4-FFF2-40B4-BE49-F238E27FC236}">
-                <a16:creationId xmlns:a16="http://schemas.microsoft.com/office/drawing/2014/main" xmlns="" id="{1291B997-CF72-4B83-8055-5AAA79536704}"/>
+                <a16:creationId xmlns="" xmlns:a16="http://schemas.microsoft.com/office/drawing/2014/main" id="{1291B997-CF72-4B83-8055-5AAA79536704}"/>
               </a:ext>
             </a:extLst>
           </p:cNvPr>
@@ -5630,7 +5630,7 @@
     </p:spTree>
     <p:extLst>
       <p:ext uri="{BB962C8B-B14F-4D97-AF65-F5344CB8AC3E}">
-        <p14:creationId xmlns:p14="http://schemas.microsoft.com/office/powerpoint/2010/main" xmlns="" val="2557757287"/>
+        <p14:creationId xmlns="" xmlns:p14="http://schemas.microsoft.com/office/powerpoint/2010/main" val="2557757287"/>
       </p:ext>
     </p:extLst>
   </p:cSld>
@@ -5765,7 +5765,7 @@
           <p:cNvPr id="16" name="AutoShape 9">
             <a:extLst>
               <a:ext uri="{FF2B5EF4-FFF2-40B4-BE49-F238E27FC236}">
-                <a16:creationId xmlns:a16="http://schemas.microsoft.com/office/drawing/2014/main" xmlns="" id="{27679E24-2F8C-4A90-B278-1A1815176573}"/>
+                <a16:creationId xmlns="" xmlns:a16="http://schemas.microsoft.com/office/drawing/2014/main" id="{27679E24-2F8C-4A90-B278-1A1815176573}"/>
               </a:ext>
             </a:extLst>
           </p:cNvPr>
@@ -5906,7 +5906,7 @@
           <p:cNvPr id="17" name="Text Box 10">
             <a:extLst>
               <a:ext uri="{FF2B5EF4-FFF2-40B4-BE49-F238E27FC236}">
-                <a16:creationId xmlns:a16="http://schemas.microsoft.com/office/drawing/2014/main" xmlns="" id="{1C7763D1-DDCF-419B-A903-A521BCEF19F9}"/>
+                <a16:creationId xmlns="" xmlns:a16="http://schemas.microsoft.com/office/drawing/2014/main" id="{1C7763D1-DDCF-419B-A903-A521BCEF19F9}"/>
               </a:ext>
             </a:extLst>
           </p:cNvPr>
@@ -5929,14 +5929,14 @@
           </a:ln>
           <a:extLst>
             <a:ext uri="{909E8E84-426E-40DD-AFC4-6F175D3DCCD1}">
-              <a14:hiddenFill xmlns:a14="http://schemas.microsoft.com/office/drawing/2010/main" xmlns="">
+              <a14:hiddenFill xmlns="" xmlns:a14="http://schemas.microsoft.com/office/drawing/2010/main">
                 <a:solidFill>
                   <a:srgbClr val="FFFFFF"/>
                 </a:solidFill>
               </a14:hiddenFill>
             </a:ext>
             <a:ext uri="{91240B29-F687-4F45-9708-019B960494DF}">
-              <a14:hiddenLine xmlns:a14="http://schemas.microsoft.com/office/drawing/2010/main" xmlns="" w="9525">
+              <a14:hiddenLine xmlns="" xmlns:a14="http://schemas.microsoft.com/office/drawing/2010/main" w="9525">
                 <a:solidFill>
                   <a:srgbClr val="000000"/>
                 </a:solidFill>
@@ -6369,7 +6369,7 @@
     </p:spTree>
     <p:extLst>
       <p:ext uri="{BB962C8B-B14F-4D97-AF65-F5344CB8AC3E}">
-        <p14:creationId xmlns:p14="http://schemas.microsoft.com/office/powerpoint/2010/main" xmlns="" val="2532964000"/>
+        <p14:creationId xmlns="" xmlns:p14="http://schemas.microsoft.com/office/powerpoint/2010/main" val="2532964000"/>
       </p:ext>
     </p:extLst>
   </p:cSld>
@@ -6534,7 +6534,7 @@
           <p:cNvPr id="16" name="AutoShape 9">
             <a:extLst>
               <a:ext uri="{FF2B5EF4-FFF2-40B4-BE49-F238E27FC236}">
-                <a16:creationId xmlns:a16="http://schemas.microsoft.com/office/drawing/2014/main" xmlns="" id="{27679E24-2F8C-4A90-B278-1A1815176573}"/>
+                <a16:creationId xmlns="" xmlns:a16="http://schemas.microsoft.com/office/drawing/2014/main" id="{27679E24-2F8C-4A90-B278-1A1815176573}"/>
               </a:ext>
             </a:extLst>
           </p:cNvPr>
@@ -6675,7 +6675,7 @@
           <p:cNvPr id="17" name="Text Box 10">
             <a:extLst>
               <a:ext uri="{FF2B5EF4-FFF2-40B4-BE49-F238E27FC236}">
-                <a16:creationId xmlns:a16="http://schemas.microsoft.com/office/drawing/2014/main" xmlns="" id="{1C7763D1-DDCF-419B-A903-A521BCEF19F9}"/>
+                <a16:creationId xmlns="" xmlns:a16="http://schemas.microsoft.com/office/drawing/2014/main" id="{1C7763D1-DDCF-419B-A903-A521BCEF19F9}"/>
               </a:ext>
             </a:extLst>
           </p:cNvPr>
@@ -6698,14 +6698,14 @@
           </a:ln>
           <a:extLst>
             <a:ext uri="{909E8E84-426E-40DD-AFC4-6F175D3DCCD1}">
-              <a14:hiddenFill xmlns:a14="http://schemas.microsoft.com/office/drawing/2010/main" xmlns="">
+              <a14:hiddenFill xmlns="" xmlns:a14="http://schemas.microsoft.com/office/drawing/2010/main">
                 <a:solidFill>
                   <a:srgbClr val="FFFFFF"/>
                 </a:solidFill>
               </a14:hiddenFill>
             </a:ext>
             <a:ext uri="{91240B29-F687-4F45-9708-019B960494DF}">
-              <a14:hiddenLine xmlns:a14="http://schemas.microsoft.com/office/drawing/2010/main" xmlns="" w="9525">
+              <a14:hiddenLine xmlns="" xmlns:a14="http://schemas.microsoft.com/office/drawing/2010/main" w="9525">
                 <a:solidFill>
                   <a:srgbClr val="000000"/>
                 </a:solidFill>
@@ -7140,7 +7140,7 @@
           <p:cNvPr id="11" name="AutoShape 9">
             <a:extLst>
               <a:ext uri="{FF2B5EF4-FFF2-40B4-BE49-F238E27FC236}">
-                <a16:creationId xmlns:a16="http://schemas.microsoft.com/office/drawing/2014/main" xmlns="" id="{E8928229-3C30-4270-91D2-8806A173E071}"/>
+                <a16:creationId xmlns="" xmlns:a16="http://schemas.microsoft.com/office/drawing/2014/main" id="{E8928229-3C30-4270-91D2-8806A173E071}"/>
               </a:ext>
             </a:extLst>
           </p:cNvPr>
@@ -7281,7 +7281,7 @@
           <p:cNvPr id="13" name="Text Box 10">
             <a:extLst>
               <a:ext uri="{FF2B5EF4-FFF2-40B4-BE49-F238E27FC236}">
-                <a16:creationId xmlns:a16="http://schemas.microsoft.com/office/drawing/2014/main" xmlns="" id="{48E99425-6E6A-4AF8-9646-40C0EF0FF8B9}"/>
+                <a16:creationId xmlns="" xmlns:a16="http://schemas.microsoft.com/office/drawing/2014/main" id="{48E99425-6E6A-4AF8-9646-40C0EF0FF8B9}"/>
               </a:ext>
             </a:extLst>
           </p:cNvPr>
@@ -7304,14 +7304,14 @@
           </a:ln>
           <a:extLst>
             <a:ext uri="{909E8E84-426E-40DD-AFC4-6F175D3DCCD1}">
-              <a14:hiddenFill xmlns:a14="http://schemas.microsoft.com/office/drawing/2010/main" xmlns="">
+              <a14:hiddenFill xmlns="" xmlns:a14="http://schemas.microsoft.com/office/drawing/2010/main">
                 <a:solidFill>
                   <a:srgbClr val="FFFFFF"/>
                 </a:solidFill>
               </a14:hiddenFill>
             </a:ext>
             <a:ext uri="{91240B29-F687-4F45-9708-019B960494DF}">
-              <a14:hiddenLine xmlns:a14="http://schemas.microsoft.com/office/drawing/2010/main" xmlns="" w="9525">
+              <a14:hiddenLine xmlns="" xmlns:a14="http://schemas.microsoft.com/office/drawing/2010/main" w="9525">
                 <a:solidFill>
                   <a:srgbClr val="000000"/>
                 </a:solidFill>
@@ -7664,7 +7664,7 @@
     </p:spTree>
     <p:extLst>
       <p:ext uri="{BB962C8B-B14F-4D97-AF65-F5344CB8AC3E}">
-        <p14:creationId xmlns:p14="http://schemas.microsoft.com/office/powerpoint/2010/main" xmlns="" val="751009210"/>
+        <p14:creationId xmlns="" xmlns:p14="http://schemas.microsoft.com/office/powerpoint/2010/main" val="751009210"/>
       </p:ext>
     </p:extLst>
   </p:cSld>
@@ -7796,7 +7796,7 @@
           <p:cNvPr id="16" name="AutoShape 9">
             <a:extLst>
               <a:ext uri="{FF2B5EF4-FFF2-40B4-BE49-F238E27FC236}">
-                <a16:creationId xmlns:a16="http://schemas.microsoft.com/office/drawing/2014/main" xmlns="" id="{27679E24-2F8C-4A90-B278-1A1815176573}"/>
+                <a16:creationId xmlns="" xmlns:a16="http://schemas.microsoft.com/office/drawing/2014/main" id="{27679E24-2F8C-4A90-B278-1A1815176573}"/>
               </a:ext>
             </a:extLst>
           </p:cNvPr>
@@ -7937,7 +7937,7 @@
           <p:cNvPr id="17" name="Text Box 10">
             <a:extLst>
               <a:ext uri="{FF2B5EF4-FFF2-40B4-BE49-F238E27FC236}">
-                <a16:creationId xmlns:a16="http://schemas.microsoft.com/office/drawing/2014/main" xmlns="" id="{1C7763D1-DDCF-419B-A903-A521BCEF19F9}"/>
+                <a16:creationId xmlns="" xmlns:a16="http://schemas.microsoft.com/office/drawing/2014/main" id="{1C7763D1-DDCF-419B-A903-A521BCEF19F9}"/>
               </a:ext>
             </a:extLst>
           </p:cNvPr>
@@ -7960,14 +7960,14 @@
           </a:ln>
           <a:extLst>
             <a:ext uri="{909E8E84-426E-40DD-AFC4-6F175D3DCCD1}">
-              <a14:hiddenFill xmlns:a14="http://schemas.microsoft.com/office/drawing/2010/main" xmlns="">
+              <a14:hiddenFill xmlns="" xmlns:a14="http://schemas.microsoft.com/office/drawing/2010/main">
                 <a:solidFill>
                   <a:srgbClr val="FFFFFF"/>
                 </a:solidFill>
               </a14:hiddenFill>
             </a:ext>
             <a:ext uri="{91240B29-F687-4F45-9708-019B960494DF}">
-              <a14:hiddenLine xmlns:a14="http://schemas.microsoft.com/office/drawing/2010/main" xmlns="" w="9525">
+              <a14:hiddenLine xmlns="" xmlns:a14="http://schemas.microsoft.com/office/drawing/2010/main" w="9525">
                 <a:solidFill>
                   <a:srgbClr val="000000"/>
                 </a:solidFill>
@@ -8454,7 +8454,7 @@
     </p:spTree>
     <p:extLst>
       <p:ext uri="{BB962C8B-B14F-4D97-AF65-F5344CB8AC3E}">
-        <p14:creationId xmlns:p14="http://schemas.microsoft.com/office/powerpoint/2010/main" xmlns="" val="2555361739"/>
+        <p14:creationId xmlns="" xmlns:p14="http://schemas.microsoft.com/office/powerpoint/2010/main" val="2555361739"/>
       </p:ext>
     </p:extLst>
   </p:cSld>
@@ -8586,7 +8586,7 @@
           <p:cNvPr id="16" name="AutoShape 9">
             <a:extLst>
               <a:ext uri="{FF2B5EF4-FFF2-40B4-BE49-F238E27FC236}">
-                <a16:creationId xmlns:a16="http://schemas.microsoft.com/office/drawing/2014/main" xmlns="" id="{27679E24-2F8C-4A90-B278-1A1815176573}"/>
+                <a16:creationId xmlns="" xmlns:a16="http://schemas.microsoft.com/office/drawing/2014/main" id="{27679E24-2F8C-4A90-B278-1A1815176573}"/>
               </a:ext>
             </a:extLst>
           </p:cNvPr>
@@ -8727,7 +8727,7 @@
           <p:cNvPr id="17" name="Text Box 10">
             <a:extLst>
               <a:ext uri="{FF2B5EF4-FFF2-40B4-BE49-F238E27FC236}">
-                <a16:creationId xmlns:a16="http://schemas.microsoft.com/office/drawing/2014/main" xmlns="" id="{1C7763D1-DDCF-419B-A903-A521BCEF19F9}"/>
+                <a16:creationId xmlns="" xmlns:a16="http://schemas.microsoft.com/office/drawing/2014/main" id="{1C7763D1-DDCF-419B-A903-A521BCEF19F9}"/>
               </a:ext>
             </a:extLst>
           </p:cNvPr>
@@ -8750,14 +8750,14 @@
           </a:ln>
           <a:extLst>
             <a:ext uri="{909E8E84-426E-40DD-AFC4-6F175D3DCCD1}">
-              <a14:hiddenFill xmlns:a14="http://schemas.microsoft.com/office/drawing/2010/main" xmlns="">
+              <a14:hiddenFill xmlns="" xmlns:a14="http://schemas.microsoft.com/office/drawing/2010/main">
                 <a:solidFill>
                   <a:srgbClr val="FFFFFF"/>
                 </a:solidFill>
               </a14:hiddenFill>
             </a:ext>
             <a:ext uri="{91240B29-F687-4F45-9708-019B960494DF}">
-              <a14:hiddenLine xmlns:a14="http://schemas.microsoft.com/office/drawing/2010/main" xmlns="" w="9525">
+              <a14:hiddenLine xmlns="" xmlns:a14="http://schemas.microsoft.com/office/drawing/2010/main" w="9525">
                 <a:solidFill>
                   <a:srgbClr val="000000"/>
                 </a:solidFill>
@@ -9368,7 +9368,7 @@
     </p:spTree>
     <p:extLst>
       <p:ext uri="{BB962C8B-B14F-4D97-AF65-F5344CB8AC3E}">
-        <p14:creationId xmlns:p14="http://schemas.microsoft.com/office/powerpoint/2010/main" xmlns="" val="3283418146"/>
+        <p14:creationId xmlns="" xmlns:p14="http://schemas.microsoft.com/office/powerpoint/2010/main" val="3283418146"/>
       </p:ext>
     </p:extLst>
   </p:cSld>
@@ -9500,7 +9500,7 @@
           <p:cNvPr id="16" name="AutoShape 9">
             <a:extLst>
               <a:ext uri="{FF2B5EF4-FFF2-40B4-BE49-F238E27FC236}">
-                <a16:creationId xmlns:a16="http://schemas.microsoft.com/office/drawing/2014/main" xmlns="" id="{27679E24-2F8C-4A90-B278-1A1815176573}"/>
+                <a16:creationId xmlns="" xmlns:a16="http://schemas.microsoft.com/office/drawing/2014/main" id="{27679E24-2F8C-4A90-B278-1A1815176573}"/>
               </a:ext>
             </a:extLst>
           </p:cNvPr>
@@ -9641,7 +9641,7 @@
           <p:cNvPr id="17" name="Text Box 10">
             <a:extLst>
               <a:ext uri="{FF2B5EF4-FFF2-40B4-BE49-F238E27FC236}">
-                <a16:creationId xmlns:a16="http://schemas.microsoft.com/office/drawing/2014/main" xmlns="" id="{1C7763D1-DDCF-419B-A903-A521BCEF19F9}"/>
+                <a16:creationId xmlns="" xmlns:a16="http://schemas.microsoft.com/office/drawing/2014/main" id="{1C7763D1-DDCF-419B-A903-A521BCEF19F9}"/>
               </a:ext>
             </a:extLst>
           </p:cNvPr>
@@ -9664,14 +9664,14 @@
           </a:ln>
           <a:extLst>
             <a:ext uri="{909E8E84-426E-40DD-AFC4-6F175D3DCCD1}">
-              <a14:hiddenFill xmlns:a14="http://schemas.microsoft.com/office/drawing/2010/main" xmlns="">
+              <a14:hiddenFill xmlns="" xmlns:a14="http://schemas.microsoft.com/office/drawing/2010/main">
                 <a:solidFill>
                   <a:srgbClr val="FFFFFF"/>
                 </a:solidFill>
               </a14:hiddenFill>
             </a:ext>
             <a:ext uri="{91240B29-F687-4F45-9708-019B960494DF}">
-              <a14:hiddenLine xmlns:a14="http://schemas.microsoft.com/office/drawing/2010/main" xmlns="" w="9525">
+              <a14:hiddenLine xmlns="" xmlns:a14="http://schemas.microsoft.com/office/drawing/2010/main" w="9525">
                 <a:solidFill>
                   <a:srgbClr val="000000"/>
                 </a:solidFill>
@@ -10197,7 +10197,7 @@
     </p:spTree>
     <p:extLst>
       <p:ext uri="{BB962C8B-B14F-4D97-AF65-F5344CB8AC3E}">
-        <p14:creationId xmlns:p14="http://schemas.microsoft.com/office/powerpoint/2010/main" xmlns="" val="718428616"/>
+        <p14:creationId xmlns="" xmlns:p14="http://schemas.microsoft.com/office/powerpoint/2010/main" val="718428616"/>
       </p:ext>
     </p:extLst>
   </p:cSld>
@@ -10329,7 +10329,7 @@
           <p:cNvPr id="16" name="AutoShape 9">
             <a:extLst>
               <a:ext uri="{FF2B5EF4-FFF2-40B4-BE49-F238E27FC236}">
-                <a16:creationId xmlns:a16="http://schemas.microsoft.com/office/drawing/2014/main" xmlns="" id="{27679E24-2F8C-4A90-B278-1A1815176573}"/>
+                <a16:creationId xmlns="" xmlns:a16="http://schemas.microsoft.com/office/drawing/2014/main" id="{27679E24-2F8C-4A90-B278-1A1815176573}"/>
               </a:ext>
             </a:extLst>
           </p:cNvPr>
@@ -10470,7 +10470,7 @@
           <p:cNvPr id="17" name="Text Box 10">
             <a:extLst>
               <a:ext uri="{FF2B5EF4-FFF2-40B4-BE49-F238E27FC236}">
-                <a16:creationId xmlns:a16="http://schemas.microsoft.com/office/drawing/2014/main" xmlns="" id="{1C7763D1-DDCF-419B-A903-A521BCEF19F9}"/>
+                <a16:creationId xmlns="" xmlns:a16="http://schemas.microsoft.com/office/drawing/2014/main" id="{1C7763D1-DDCF-419B-A903-A521BCEF19F9}"/>
               </a:ext>
             </a:extLst>
           </p:cNvPr>
@@ -10493,14 +10493,14 @@
           </a:ln>
           <a:extLst>
             <a:ext uri="{909E8E84-426E-40DD-AFC4-6F175D3DCCD1}">
-              <a14:hiddenFill xmlns:a14="http://schemas.microsoft.com/office/drawing/2010/main" xmlns="">
+              <a14:hiddenFill xmlns="" xmlns:a14="http://schemas.microsoft.com/office/drawing/2010/main">
                 <a:solidFill>
                   <a:srgbClr val="FFFFFF"/>
                 </a:solidFill>
               </a14:hiddenFill>
             </a:ext>
             <a:ext uri="{91240B29-F687-4F45-9708-019B960494DF}">
-              <a14:hiddenLine xmlns:a14="http://schemas.microsoft.com/office/drawing/2010/main" xmlns="" w="9525">
+              <a14:hiddenLine xmlns="" xmlns:a14="http://schemas.microsoft.com/office/drawing/2010/main" w="9525">
                 <a:solidFill>
                   <a:srgbClr val="000000"/>
                 </a:solidFill>
@@ -11000,7 +11000,7 @@
     </p:spTree>
     <p:extLst>
       <p:ext uri="{BB962C8B-B14F-4D97-AF65-F5344CB8AC3E}">
-        <p14:creationId xmlns:p14="http://schemas.microsoft.com/office/powerpoint/2010/main" xmlns="" val="2985867384"/>
+        <p14:creationId xmlns="" xmlns:p14="http://schemas.microsoft.com/office/powerpoint/2010/main" val="2985867384"/>
       </p:ext>
     </p:extLst>
   </p:cSld>
@@ -11172,7 +11172,7 @@
     </p:spTree>
     <p:extLst>
       <p:ext uri="{BB962C8B-B14F-4D97-AF65-F5344CB8AC3E}">
-        <p14:creationId xmlns:p14="http://schemas.microsoft.com/office/powerpoint/2010/main" xmlns="" val="5545177"/>
+        <p14:creationId xmlns="" xmlns:p14="http://schemas.microsoft.com/office/powerpoint/2010/main" val="5545177"/>
       </p:ext>
     </p:extLst>
   </p:cSld>
@@ -11304,7 +11304,7 @@
           <p:cNvPr id="16" name="AutoShape 9">
             <a:extLst>
               <a:ext uri="{FF2B5EF4-FFF2-40B4-BE49-F238E27FC236}">
-                <a16:creationId xmlns:a16="http://schemas.microsoft.com/office/drawing/2014/main" xmlns="" id="{27679E24-2F8C-4A90-B278-1A1815176573}"/>
+                <a16:creationId xmlns="" xmlns:a16="http://schemas.microsoft.com/office/drawing/2014/main" id="{27679E24-2F8C-4A90-B278-1A1815176573}"/>
               </a:ext>
             </a:extLst>
           </p:cNvPr>
@@ -11445,7 +11445,7 @@
           <p:cNvPr id="17" name="Text Box 10">
             <a:extLst>
               <a:ext uri="{FF2B5EF4-FFF2-40B4-BE49-F238E27FC236}">
-                <a16:creationId xmlns:a16="http://schemas.microsoft.com/office/drawing/2014/main" xmlns="" id="{1C7763D1-DDCF-419B-A903-A521BCEF19F9}"/>
+                <a16:creationId xmlns="" xmlns:a16="http://schemas.microsoft.com/office/drawing/2014/main" id="{1C7763D1-DDCF-419B-A903-A521BCEF19F9}"/>
               </a:ext>
             </a:extLst>
           </p:cNvPr>
@@ -11468,14 +11468,14 @@
           </a:ln>
           <a:extLst>
             <a:ext uri="{909E8E84-426E-40DD-AFC4-6F175D3DCCD1}">
-              <a14:hiddenFill xmlns:a14="http://schemas.microsoft.com/office/drawing/2010/main" xmlns="">
+              <a14:hiddenFill xmlns="" xmlns:a14="http://schemas.microsoft.com/office/drawing/2010/main">
                 <a:solidFill>
                   <a:srgbClr val="FFFFFF"/>
                 </a:solidFill>
               </a14:hiddenFill>
             </a:ext>
             <a:ext uri="{91240B29-F687-4F45-9708-019B960494DF}">
-              <a14:hiddenLine xmlns:a14="http://schemas.microsoft.com/office/drawing/2010/main" xmlns="" w="9525">
+              <a14:hiddenLine xmlns="" xmlns:a14="http://schemas.microsoft.com/office/drawing/2010/main" w="9525">
                 <a:solidFill>
                   <a:srgbClr val="000000"/>
                 </a:solidFill>
@@ -12103,7 +12103,7 @@
     </p:spTree>
     <p:extLst>
       <p:ext uri="{BB962C8B-B14F-4D97-AF65-F5344CB8AC3E}">
-        <p14:creationId xmlns:p14="http://schemas.microsoft.com/office/powerpoint/2010/main" xmlns="" val="1521112324"/>
+        <p14:creationId xmlns="" xmlns:p14="http://schemas.microsoft.com/office/powerpoint/2010/main" val="1521112324"/>
       </p:ext>
     </p:extLst>
   </p:cSld>
@@ -12235,7 +12235,7 @@
           <p:cNvPr id="9" name="AutoShape 4">
             <a:extLst>
               <a:ext uri="{FF2B5EF4-FFF2-40B4-BE49-F238E27FC236}">
-                <a16:creationId xmlns:a16="http://schemas.microsoft.com/office/drawing/2014/main" xmlns="" id="{625C335C-819B-4B5D-8D6E-9BF8C9E25B10}"/>
+                <a16:creationId xmlns="" xmlns:a16="http://schemas.microsoft.com/office/drawing/2014/main" id="{625C335C-819B-4B5D-8D6E-9BF8C9E25B10}"/>
               </a:ext>
             </a:extLst>
           </p:cNvPr>
@@ -12376,7 +12376,7 @@
           <p:cNvPr id="11" name="Text Box 5">
             <a:extLst>
               <a:ext uri="{FF2B5EF4-FFF2-40B4-BE49-F238E27FC236}">
-                <a16:creationId xmlns:a16="http://schemas.microsoft.com/office/drawing/2014/main" xmlns="" id="{B87D52A0-D3D9-47D9-8285-0C1131BFADC3}"/>
+                <a16:creationId xmlns="" xmlns:a16="http://schemas.microsoft.com/office/drawing/2014/main" id="{B87D52A0-D3D9-47D9-8285-0C1131BFADC3}"/>
               </a:ext>
             </a:extLst>
           </p:cNvPr>
@@ -12399,14 +12399,14 @@
           </a:ln>
           <a:extLst>
             <a:ext uri="{909E8E84-426E-40DD-AFC4-6F175D3DCCD1}">
-              <a14:hiddenFill xmlns:a14="http://schemas.microsoft.com/office/drawing/2010/main" xmlns="">
+              <a14:hiddenFill xmlns="" xmlns:a14="http://schemas.microsoft.com/office/drawing/2010/main">
                 <a:solidFill>
                   <a:srgbClr val="FFFFFF"/>
                 </a:solidFill>
               </a14:hiddenFill>
             </a:ext>
             <a:ext uri="{91240B29-F687-4F45-9708-019B960494DF}">
-              <a14:hiddenLine xmlns:a14="http://schemas.microsoft.com/office/drawing/2010/main" xmlns="" w="9525">
+              <a14:hiddenLine xmlns="" xmlns:a14="http://schemas.microsoft.com/office/drawing/2010/main" w="9525">
                 <a:solidFill>
                   <a:srgbClr val="000000"/>
                 </a:solidFill>
@@ -12919,7 +12919,7 @@
     </p:spTree>
     <p:extLst>
       <p:ext uri="{BB962C8B-B14F-4D97-AF65-F5344CB8AC3E}">
-        <p14:creationId xmlns:p14="http://schemas.microsoft.com/office/powerpoint/2010/main" xmlns="" val="3730383572"/>
+        <p14:creationId xmlns="" xmlns:p14="http://schemas.microsoft.com/office/powerpoint/2010/main" val="3730383572"/>
       </p:ext>
     </p:extLst>
   </p:cSld>
@@ -13058,7 +13058,7 @@
           <p:cNvPr id="13" name="Group 12">
             <a:extLst>
               <a:ext uri="{FF2B5EF4-FFF2-40B4-BE49-F238E27FC236}">
-                <a16:creationId xmlns:a16="http://schemas.microsoft.com/office/drawing/2014/main" xmlns="" id="{DEB99A94-F46D-4E77-BAB3-6753CAFE1DC4}"/>
+                <a16:creationId xmlns="" xmlns:a16="http://schemas.microsoft.com/office/drawing/2014/main" id="{DEB99A94-F46D-4E77-BAB3-6753CAFE1DC4}"/>
               </a:ext>
             </a:extLst>
           </p:cNvPr>
@@ -13078,7 +13078,7 @@
             <p:cNvPr id="14" name="AutoShape 4">
               <a:extLst>
                 <a:ext uri="{FF2B5EF4-FFF2-40B4-BE49-F238E27FC236}">
-                  <a16:creationId xmlns:a16="http://schemas.microsoft.com/office/drawing/2014/main" xmlns="" id="{0E5FC715-D2A1-492A-B3A9-1E8A32426BFA}"/>
+                  <a16:creationId xmlns="" xmlns:a16="http://schemas.microsoft.com/office/drawing/2014/main" id="{0E5FC715-D2A1-492A-B3A9-1E8A32426BFA}"/>
                 </a:ext>
               </a:extLst>
             </p:cNvPr>
@@ -13219,7 +13219,7 @@
             <p:cNvPr id="15" name="Text Box 5">
               <a:extLst>
                 <a:ext uri="{FF2B5EF4-FFF2-40B4-BE49-F238E27FC236}">
-                  <a16:creationId xmlns:a16="http://schemas.microsoft.com/office/drawing/2014/main" xmlns="" id="{00DC419B-7D7B-4D69-928B-4EF925DAB04B}"/>
+                  <a16:creationId xmlns="" xmlns:a16="http://schemas.microsoft.com/office/drawing/2014/main" id="{00DC419B-7D7B-4D69-928B-4EF925DAB04B}"/>
                 </a:ext>
               </a:extLst>
             </p:cNvPr>
@@ -13242,14 +13242,14 @@
             </a:ln>
             <a:extLst>
               <a:ext uri="{909E8E84-426E-40DD-AFC4-6F175D3DCCD1}">
-                <a14:hiddenFill xmlns:a14="http://schemas.microsoft.com/office/drawing/2010/main" xmlns="">
+                <a14:hiddenFill xmlns="" xmlns:a14="http://schemas.microsoft.com/office/drawing/2010/main">
                   <a:solidFill>
                     <a:srgbClr val="FFFFFF"/>
                   </a:solidFill>
                 </a14:hiddenFill>
               </a:ext>
               <a:ext uri="{91240B29-F687-4F45-9708-019B960494DF}">
-                <a14:hiddenLine xmlns:a14="http://schemas.microsoft.com/office/drawing/2010/main" xmlns="" w="9525">
+                <a14:hiddenLine xmlns="" xmlns:a14="http://schemas.microsoft.com/office/drawing/2010/main" w="9525">
                   <a:solidFill>
                     <a:srgbClr val="000000"/>
                   </a:solidFill>
@@ -13697,7 +13697,7 @@
             <p:cNvPr id="16" name="AutoShape 6">
               <a:extLst>
                 <a:ext uri="{FF2B5EF4-FFF2-40B4-BE49-F238E27FC236}">
-                  <a16:creationId xmlns:a16="http://schemas.microsoft.com/office/drawing/2014/main" xmlns="" id="{48A1CE43-948B-4336-8906-E029E8EECDCC}"/>
+                  <a16:creationId xmlns="" xmlns:a16="http://schemas.microsoft.com/office/drawing/2014/main" id="{48A1CE43-948B-4336-8906-E029E8EECDCC}"/>
                 </a:ext>
               </a:extLst>
             </p:cNvPr>
@@ -13880,7 +13880,7 @@
             <p:cNvPr id="17" name="Text Box 7">
               <a:extLst>
                 <a:ext uri="{FF2B5EF4-FFF2-40B4-BE49-F238E27FC236}">
-                  <a16:creationId xmlns:a16="http://schemas.microsoft.com/office/drawing/2014/main" xmlns="" id="{60044279-C9D4-4BE4-BB3D-0949E4B7D3EF}"/>
+                  <a16:creationId xmlns="" xmlns:a16="http://schemas.microsoft.com/office/drawing/2014/main" id="{60044279-C9D4-4BE4-BB3D-0949E4B7D3EF}"/>
                 </a:ext>
               </a:extLst>
             </p:cNvPr>
@@ -13903,14 +13903,14 @@
             </a:ln>
             <a:extLst>
               <a:ext uri="{909E8E84-426E-40DD-AFC4-6F175D3DCCD1}">
-                <a14:hiddenFill xmlns:a14="http://schemas.microsoft.com/office/drawing/2010/main" xmlns="">
+                <a14:hiddenFill xmlns="" xmlns:a14="http://schemas.microsoft.com/office/drawing/2010/main">
                   <a:solidFill>
                     <a:srgbClr val="FFFFFF"/>
                   </a:solidFill>
                 </a14:hiddenFill>
               </a:ext>
               <a:ext uri="{91240B29-F687-4F45-9708-019B960494DF}">
-                <a14:hiddenLine xmlns:a14="http://schemas.microsoft.com/office/drawing/2010/main" xmlns="" w="9525">
+                <a14:hiddenLine xmlns="" xmlns:a14="http://schemas.microsoft.com/office/drawing/2010/main" w="9525">
                   <a:solidFill>
                     <a:srgbClr val="000000"/>
                   </a:solidFill>
@@ -14046,7 +14046,7 @@
             <p:cNvPr id="18" name="AutoShape 8">
               <a:extLst>
                 <a:ext uri="{FF2B5EF4-FFF2-40B4-BE49-F238E27FC236}">
-                  <a16:creationId xmlns:a16="http://schemas.microsoft.com/office/drawing/2014/main" xmlns="" id="{1C993275-53BB-439B-A520-A913BCA9246C}"/>
+                  <a16:creationId xmlns="" xmlns:a16="http://schemas.microsoft.com/office/drawing/2014/main" id="{1C993275-53BB-439B-A520-A913BCA9246C}"/>
                 </a:ext>
               </a:extLst>
             </p:cNvPr>
@@ -14229,7 +14229,7 @@
             <p:cNvPr id="19" name="Text Box 9">
               <a:extLst>
                 <a:ext uri="{FF2B5EF4-FFF2-40B4-BE49-F238E27FC236}">
-                  <a16:creationId xmlns:a16="http://schemas.microsoft.com/office/drawing/2014/main" xmlns="" id="{616754A0-AF04-4192-8C02-94FFF06F0182}"/>
+                  <a16:creationId xmlns="" xmlns:a16="http://schemas.microsoft.com/office/drawing/2014/main" id="{616754A0-AF04-4192-8C02-94FFF06F0182}"/>
                 </a:ext>
               </a:extLst>
             </p:cNvPr>
@@ -14252,14 +14252,14 @@
             </a:ln>
             <a:extLst>
               <a:ext uri="{909E8E84-426E-40DD-AFC4-6F175D3DCCD1}">
-                <a14:hiddenFill xmlns:a14="http://schemas.microsoft.com/office/drawing/2010/main" xmlns="">
+                <a14:hiddenFill xmlns="" xmlns:a14="http://schemas.microsoft.com/office/drawing/2010/main">
                   <a:solidFill>
                     <a:srgbClr val="FFFFFF"/>
                   </a:solidFill>
                 </a14:hiddenFill>
               </a:ext>
               <a:ext uri="{91240B29-F687-4F45-9708-019B960494DF}">
-                <a14:hiddenLine xmlns:a14="http://schemas.microsoft.com/office/drawing/2010/main" xmlns="" w="9525">
+                <a14:hiddenLine xmlns="" xmlns:a14="http://schemas.microsoft.com/office/drawing/2010/main" w="9525">
                   <a:solidFill>
                     <a:srgbClr val="000000"/>
                   </a:solidFill>
@@ -14395,7 +14395,7 @@
             <p:cNvPr id="20" name="AutoShape 10">
               <a:extLst>
                 <a:ext uri="{FF2B5EF4-FFF2-40B4-BE49-F238E27FC236}">
-                  <a16:creationId xmlns:a16="http://schemas.microsoft.com/office/drawing/2014/main" xmlns="" id="{08E02AA4-93ED-4553-A4D8-A525F161FA8D}"/>
+                  <a16:creationId xmlns="" xmlns:a16="http://schemas.microsoft.com/office/drawing/2014/main" id="{08E02AA4-93ED-4553-A4D8-A525F161FA8D}"/>
                 </a:ext>
               </a:extLst>
             </p:cNvPr>
@@ -14578,7 +14578,7 @@
             <p:cNvPr id="21" name="Text Box 11">
               <a:extLst>
                 <a:ext uri="{FF2B5EF4-FFF2-40B4-BE49-F238E27FC236}">
-                  <a16:creationId xmlns:a16="http://schemas.microsoft.com/office/drawing/2014/main" xmlns="" id="{14101093-22D6-41BA-94C5-54A9E944B64D}"/>
+                  <a16:creationId xmlns="" xmlns:a16="http://schemas.microsoft.com/office/drawing/2014/main" id="{14101093-22D6-41BA-94C5-54A9E944B64D}"/>
                 </a:ext>
               </a:extLst>
             </p:cNvPr>
@@ -14601,14 +14601,14 @@
             </a:ln>
             <a:extLst>
               <a:ext uri="{909E8E84-426E-40DD-AFC4-6F175D3DCCD1}">
-                <a14:hiddenFill xmlns:a14="http://schemas.microsoft.com/office/drawing/2010/main" xmlns="">
+                <a14:hiddenFill xmlns="" xmlns:a14="http://schemas.microsoft.com/office/drawing/2010/main">
                   <a:solidFill>
                     <a:srgbClr val="FFFFFF"/>
                   </a:solidFill>
                 </a14:hiddenFill>
               </a:ext>
               <a:ext uri="{91240B29-F687-4F45-9708-019B960494DF}">
-                <a14:hiddenLine xmlns:a14="http://schemas.microsoft.com/office/drawing/2010/main" xmlns="" w="9525">
+                <a14:hiddenLine xmlns="" xmlns:a14="http://schemas.microsoft.com/office/drawing/2010/main" w="9525">
                   <a:solidFill>
                     <a:srgbClr val="000000"/>
                   </a:solidFill>
@@ -14744,7 +14744,7 @@
             <p:cNvPr id="22" name="AutoShape 12">
               <a:extLst>
                 <a:ext uri="{FF2B5EF4-FFF2-40B4-BE49-F238E27FC236}">
-                  <a16:creationId xmlns:a16="http://schemas.microsoft.com/office/drawing/2014/main" xmlns="" id="{3D46AB9E-9234-44B2-BAB1-5A27D9EC8DC6}"/>
+                  <a16:creationId xmlns="" xmlns:a16="http://schemas.microsoft.com/office/drawing/2014/main" id="{3D46AB9E-9234-44B2-BAB1-5A27D9EC8DC6}"/>
                 </a:ext>
               </a:extLst>
             </p:cNvPr>
@@ -14927,7 +14927,7 @@
             <p:cNvPr id="23" name="Text Box 13">
               <a:extLst>
                 <a:ext uri="{FF2B5EF4-FFF2-40B4-BE49-F238E27FC236}">
-                  <a16:creationId xmlns:a16="http://schemas.microsoft.com/office/drawing/2014/main" xmlns="" id="{65BD9710-DA2D-499C-A3F2-61AF8D3A055A}"/>
+                  <a16:creationId xmlns="" xmlns:a16="http://schemas.microsoft.com/office/drawing/2014/main" id="{65BD9710-DA2D-499C-A3F2-61AF8D3A055A}"/>
                 </a:ext>
               </a:extLst>
             </p:cNvPr>
@@ -14950,14 +14950,14 @@
             </a:ln>
             <a:extLst>
               <a:ext uri="{909E8E84-426E-40DD-AFC4-6F175D3DCCD1}">
-                <a14:hiddenFill xmlns:a14="http://schemas.microsoft.com/office/drawing/2010/main" xmlns="">
+                <a14:hiddenFill xmlns="" xmlns:a14="http://schemas.microsoft.com/office/drawing/2010/main">
                   <a:solidFill>
                     <a:srgbClr val="FFFFFF"/>
                   </a:solidFill>
                 </a14:hiddenFill>
               </a:ext>
               <a:ext uri="{91240B29-F687-4F45-9708-019B960494DF}">
-                <a14:hiddenLine xmlns:a14="http://schemas.microsoft.com/office/drawing/2010/main" xmlns="" w="9525">
+                <a14:hiddenLine xmlns="" xmlns:a14="http://schemas.microsoft.com/office/drawing/2010/main" w="9525">
                   <a:solidFill>
                     <a:srgbClr val="000000"/>
                   </a:solidFill>
@@ -15093,7 +15093,7 @@
             <p:cNvPr id="24" name="AutoShape 14">
               <a:extLst>
                 <a:ext uri="{FF2B5EF4-FFF2-40B4-BE49-F238E27FC236}">
-                  <a16:creationId xmlns:a16="http://schemas.microsoft.com/office/drawing/2014/main" xmlns="" id="{867C66D3-04C1-405C-80AF-971E2280F703}"/>
+                  <a16:creationId xmlns="" xmlns:a16="http://schemas.microsoft.com/office/drawing/2014/main" id="{867C66D3-04C1-405C-80AF-971E2280F703}"/>
                 </a:ext>
               </a:extLst>
             </p:cNvPr>
@@ -15276,7 +15276,7 @@
             <p:cNvPr id="25" name="Text Box 15">
               <a:extLst>
                 <a:ext uri="{FF2B5EF4-FFF2-40B4-BE49-F238E27FC236}">
-                  <a16:creationId xmlns:a16="http://schemas.microsoft.com/office/drawing/2014/main" xmlns="" id="{A371CB78-E7F3-4919-9DA5-C97F7F0D5107}"/>
+                  <a16:creationId xmlns="" xmlns:a16="http://schemas.microsoft.com/office/drawing/2014/main" id="{A371CB78-E7F3-4919-9DA5-C97F7F0D5107}"/>
                 </a:ext>
               </a:extLst>
             </p:cNvPr>
@@ -15299,14 +15299,14 @@
             </a:ln>
             <a:extLst>
               <a:ext uri="{909E8E84-426E-40DD-AFC4-6F175D3DCCD1}">
-                <a14:hiddenFill xmlns:a14="http://schemas.microsoft.com/office/drawing/2010/main" xmlns="">
+                <a14:hiddenFill xmlns="" xmlns:a14="http://schemas.microsoft.com/office/drawing/2010/main">
                   <a:solidFill>
                     <a:srgbClr val="FFFFFF"/>
                   </a:solidFill>
                 </a14:hiddenFill>
               </a:ext>
               <a:ext uri="{91240B29-F687-4F45-9708-019B960494DF}">
-                <a14:hiddenLine xmlns:a14="http://schemas.microsoft.com/office/drawing/2010/main" xmlns="" w="9525">
+                <a14:hiddenLine xmlns="" xmlns:a14="http://schemas.microsoft.com/office/drawing/2010/main" w="9525">
                   <a:solidFill>
                     <a:srgbClr val="000000"/>
                   </a:solidFill>
@@ -15442,7 +15442,7 @@
             <p:cNvPr id="26" name="AutoShape 16">
               <a:extLst>
                 <a:ext uri="{FF2B5EF4-FFF2-40B4-BE49-F238E27FC236}">
-                  <a16:creationId xmlns:a16="http://schemas.microsoft.com/office/drawing/2014/main" xmlns="" id="{461004C5-55AB-4B79-A487-3B8FCFDA7747}"/>
+                  <a16:creationId xmlns="" xmlns:a16="http://schemas.microsoft.com/office/drawing/2014/main" id="{461004C5-55AB-4B79-A487-3B8FCFDA7747}"/>
                 </a:ext>
               </a:extLst>
             </p:cNvPr>
@@ -15625,7 +15625,7 @@
             <p:cNvPr id="27" name="AutoShape 17">
               <a:extLst>
                 <a:ext uri="{FF2B5EF4-FFF2-40B4-BE49-F238E27FC236}">
-                  <a16:creationId xmlns:a16="http://schemas.microsoft.com/office/drawing/2014/main" xmlns="" id="{B5A9EB06-1EA7-458C-8F21-7CED89FA9BAB}"/>
+                  <a16:creationId xmlns="" xmlns:a16="http://schemas.microsoft.com/office/drawing/2014/main" id="{B5A9EB06-1EA7-458C-8F21-7CED89FA9BAB}"/>
                 </a:ext>
               </a:extLst>
             </p:cNvPr>
@@ -15807,7 +15807,7 @@
     </p:spTree>
     <p:extLst>
       <p:ext uri="{BB962C8B-B14F-4D97-AF65-F5344CB8AC3E}">
-        <p14:creationId xmlns:p14="http://schemas.microsoft.com/office/powerpoint/2010/main" xmlns="" val="2581422512"/>
+        <p14:creationId xmlns="" xmlns:p14="http://schemas.microsoft.com/office/powerpoint/2010/main" val="2581422512"/>
       </p:ext>
     </p:extLst>
   </p:cSld>
@@ -16006,7 +16006,7 @@
     </p:spTree>
     <p:extLst>
       <p:ext uri="{BB962C8B-B14F-4D97-AF65-F5344CB8AC3E}">
-        <p14:creationId xmlns:p14="http://schemas.microsoft.com/office/powerpoint/2010/main" xmlns="" val="1870606848"/>
+        <p14:creationId xmlns="" xmlns:p14="http://schemas.microsoft.com/office/powerpoint/2010/main" val="1870606848"/>
       </p:ext>
     </p:extLst>
   </p:cSld>
@@ -16141,7 +16141,7 @@
           <p:cNvPr id="7" name="AutoShape 3">
             <a:extLst>
               <a:ext uri="{FF2B5EF4-FFF2-40B4-BE49-F238E27FC236}">
-                <a16:creationId xmlns:a16="http://schemas.microsoft.com/office/drawing/2014/main" xmlns="" id="{C994F795-AD1C-452E-A17D-69DC23088AAD}"/>
+                <a16:creationId xmlns="" xmlns:a16="http://schemas.microsoft.com/office/drawing/2014/main" id="{C994F795-AD1C-452E-A17D-69DC23088AAD}"/>
               </a:ext>
             </a:extLst>
           </p:cNvPr>
@@ -16282,7 +16282,7 @@
           <p:cNvPr id="8" name="Text Box 4">
             <a:extLst>
               <a:ext uri="{FF2B5EF4-FFF2-40B4-BE49-F238E27FC236}">
-                <a16:creationId xmlns:a16="http://schemas.microsoft.com/office/drawing/2014/main" xmlns="" id="{A868091F-2B86-4270-8163-D91477A7BCBB}"/>
+                <a16:creationId xmlns="" xmlns:a16="http://schemas.microsoft.com/office/drawing/2014/main" id="{A868091F-2B86-4270-8163-D91477A7BCBB}"/>
               </a:ext>
             </a:extLst>
           </p:cNvPr>
@@ -16305,14 +16305,14 @@
           </a:ln>
           <a:extLst>
             <a:ext uri="{909E8E84-426E-40DD-AFC4-6F175D3DCCD1}">
-              <a14:hiddenFill xmlns:a14="http://schemas.microsoft.com/office/drawing/2010/main" xmlns="">
+              <a14:hiddenFill xmlns="" xmlns:a14="http://schemas.microsoft.com/office/drawing/2010/main">
                 <a:solidFill>
                   <a:srgbClr val="FFFFFF"/>
                 </a:solidFill>
               </a14:hiddenFill>
             </a:ext>
             <a:ext uri="{91240B29-F687-4F45-9708-019B960494DF}">
-              <a14:hiddenLine xmlns:a14="http://schemas.microsoft.com/office/drawing/2010/main" xmlns="" w="9525">
+              <a14:hiddenLine xmlns="" xmlns:a14="http://schemas.microsoft.com/office/drawing/2010/main" w="9525">
                 <a:solidFill>
                   <a:srgbClr val="000000"/>
                 </a:solidFill>
@@ -16756,7 +16756,7 @@
           <p:cNvPr id="9" name="Text Box 5">
             <a:extLst>
               <a:ext uri="{FF2B5EF4-FFF2-40B4-BE49-F238E27FC236}">
-                <a16:creationId xmlns:a16="http://schemas.microsoft.com/office/drawing/2014/main" xmlns="" id="{858BC78E-BD71-47D1-89CD-37C8DE32E3DF}"/>
+                <a16:creationId xmlns="" xmlns:a16="http://schemas.microsoft.com/office/drawing/2014/main" id="{858BC78E-BD71-47D1-89CD-37C8DE32E3DF}"/>
               </a:ext>
             </a:extLst>
           </p:cNvPr>
@@ -16779,14 +16779,14 @@
           </a:ln>
           <a:extLst>
             <a:ext uri="{909E8E84-426E-40DD-AFC4-6F175D3DCCD1}">
-              <a14:hiddenFill xmlns:a14="http://schemas.microsoft.com/office/drawing/2010/main" xmlns="">
+              <a14:hiddenFill xmlns="" xmlns:a14="http://schemas.microsoft.com/office/drawing/2010/main">
                 <a:solidFill>
                   <a:srgbClr val="FFFFFF"/>
                 </a:solidFill>
               </a14:hiddenFill>
             </a:ext>
             <a:ext uri="{91240B29-F687-4F45-9708-019B960494DF}">
-              <a14:hiddenLine xmlns:a14="http://schemas.microsoft.com/office/drawing/2010/main" xmlns="" w="9525">
+              <a14:hiddenLine xmlns="" xmlns:a14="http://schemas.microsoft.com/office/drawing/2010/main" w="9525">
                 <a:solidFill>
                   <a:srgbClr val="000000"/>
                 </a:solidFill>
@@ -16949,7 +16949,7 @@
           <p:cNvPr id="11" name="AutoShape 6">
             <a:extLst>
               <a:ext uri="{FF2B5EF4-FFF2-40B4-BE49-F238E27FC236}">
-                <a16:creationId xmlns:a16="http://schemas.microsoft.com/office/drawing/2014/main" xmlns="" id="{75E5DCDA-8D10-4087-9B17-16A1542098E7}"/>
+                <a16:creationId xmlns="" xmlns:a16="http://schemas.microsoft.com/office/drawing/2014/main" id="{75E5DCDA-8D10-4087-9B17-16A1542098E7}"/>
               </a:ext>
             </a:extLst>
           </p:cNvPr>
@@ -17090,7 +17090,7 @@
           <p:cNvPr id="13" name="Oval 7">
             <a:extLst>
               <a:ext uri="{FF2B5EF4-FFF2-40B4-BE49-F238E27FC236}">
-                <a16:creationId xmlns:a16="http://schemas.microsoft.com/office/drawing/2014/main" xmlns="" id="{B9840BCB-993C-44FD-B450-6C13DAB45A0D}"/>
+                <a16:creationId xmlns="" xmlns:a16="http://schemas.microsoft.com/office/drawing/2014/main" id="{B9840BCB-993C-44FD-B450-6C13DAB45A0D}"/>
               </a:ext>
             </a:extLst>
           </p:cNvPr>
@@ -17296,7 +17296,7 @@
           <p:cNvPr id="14" name="Text Box 8">
             <a:extLst>
               <a:ext uri="{FF2B5EF4-FFF2-40B4-BE49-F238E27FC236}">
-                <a16:creationId xmlns:a16="http://schemas.microsoft.com/office/drawing/2014/main" xmlns="" id="{4FF00565-98AC-4882-9CA3-D49A7CF3A339}"/>
+                <a16:creationId xmlns="" xmlns:a16="http://schemas.microsoft.com/office/drawing/2014/main" id="{4FF00565-98AC-4882-9CA3-D49A7CF3A339}"/>
               </a:ext>
             </a:extLst>
           </p:cNvPr>
@@ -17319,14 +17319,14 @@
           </a:ln>
           <a:extLst>
             <a:ext uri="{909E8E84-426E-40DD-AFC4-6F175D3DCCD1}">
-              <a14:hiddenFill xmlns:a14="http://schemas.microsoft.com/office/drawing/2010/main" xmlns="">
+              <a14:hiddenFill xmlns="" xmlns:a14="http://schemas.microsoft.com/office/drawing/2010/main">
                 <a:solidFill>
                   <a:srgbClr val="FFFFFF"/>
                 </a:solidFill>
               </a14:hiddenFill>
             </a:ext>
             <a:ext uri="{91240B29-F687-4F45-9708-019B960494DF}">
-              <a14:hiddenLine xmlns:a14="http://schemas.microsoft.com/office/drawing/2010/main" xmlns="" w="9525">
+              <a14:hiddenLine xmlns="" xmlns:a14="http://schemas.microsoft.com/office/drawing/2010/main" w="9525">
                 <a:solidFill>
                   <a:srgbClr val="000000"/>
                 </a:solidFill>
@@ -17489,7 +17489,7 @@
           <p:cNvPr id="15" name="AutoShape 9">
             <a:extLst>
               <a:ext uri="{FF2B5EF4-FFF2-40B4-BE49-F238E27FC236}">
-                <a16:creationId xmlns:a16="http://schemas.microsoft.com/office/drawing/2014/main" xmlns="" id="{690191B9-C4E6-45AA-8626-5D253ED50B24}"/>
+                <a16:creationId xmlns="" xmlns:a16="http://schemas.microsoft.com/office/drawing/2014/main" id="{690191B9-C4E6-45AA-8626-5D253ED50B24}"/>
               </a:ext>
             </a:extLst>
           </p:cNvPr>
@@ -17630,7 +17630,7 @@
           <p:cNvPr id="16" name="Line 13">
             <a:extLst>
               <a:ext uri="{FF2B5EF4-FFF2-40B4-BE49-F238E27FC236}">
-                <a16:creationId xmlns:a16="http://schemas.microsoft.com/office/drawing/2014/main" xmlns="" id="{2D25F502-739E-4F56-A729-C936505AB583}"/>
+                <a16:creationId xmlns="" xmlns:a16="http://schemas.microsoft.com/office/drawing/2014/main" id="{2D25F502-739E-4F56-A729-C936505AB583}"/>
               </a:ext>
             </a:extLst>
           </p:cNvPr>
@@ -17659,12 +17659,12 @@
           <a:effectLst/>
           <a:extLst>
             <a:ext uri="{909E8E84-426E-40DD-AFC4-6F175D3DCCD1}">
-              <a14:hiddenFill xmlns:a14="http://schemas.microsoft.com/office/drawing/2010/main" xmlns="">
+              <a14:hiddenFill xmlns="" xmlns:a14="http://schemas.microsoft.com/office/drawing/2010/main">
                 <a:noFill/>
               </a14:hiddenFill>
             </a:ext>
             <a:ext uri="{AF507438-7753-43E0-B8FC-AC1667EBCBE1}">
-              <a14:hiddenEffects xmlns:a14="http://schemas.microsoft.com/office/drawing/2010/main" xmlns="">
+              <a14:hiddenEffects xmlns="" xmlns:a14="http://schemas.microsoft.com/office/drawing/2010/main">
                 <a:effectLst>
                   <a:outerShdw blurRad="63500" dist="38099" dir="2700000" algn="ctr" rotWithShape="0">
                     <a:schemeClr val="bg2">
@@ -17694,7 +17694,7 @@
           <p:cNvPr id="17" name="Line 14">
             <a:extLst>
               <a:ext uri="{FF2B5EF4-FFF2-40B4-BE49-F238E27FC236}">
-                <a16:creationId xmlns:a16="http://schemas.microsoft.com/office/drawing/2014/main" xmlns="" id="{429BF3E8-A1BC-45C6-8DD6-5691553970B9}"/>
+                <a16:creationId xmlns="" xmlns:a16="http://schemas.microsoft.com/office/drawing/2014/main" id="{429BF3E8-A1BC-45C6-8DD6-5691553970B9}"/>
               </a:ext>
             </a:extLst>
           </p:cNvPr>
@@ -17723,12 +17723,12 @@
           <a:effectLst/>
           <a:extLst>
             <a:ext uri="{909E8E84-426E-40DD-AFC4-6F175D3DCCD1}">
-              <a14:hiddenFill xmlns:a14="http://schemas.microsoft.com/office/drawing/2010/main" xmlns="">
+              <a14:hiddenFill xmlns="" xmlns:a14="http://schemas.microsoft.com/office/drawing/2010/main">
                 <a:noFill/>
               </a14:hiddenFill>
             </a:ext>
             <a:ext uri="{AF507438-7753-43E0-B8FC-AC1667EBCBE1}">
-              <a14:hiddenEffects xmlns:a14="http://schemas.microsoft.com/office/drawing/2010/main" xmlns="">
+              <a14:hiddenEffects xmlns="" xmlns:a14="http://schemas.microsoft.com/office/drawing/2010/main">
                 <a:effectLst>
                   <a:outerShdw blurRad="63500" dist="38099" dir="2700000" algn="ctr" rotWithShape="0">
                     <a:schemeClr val="bg2">
@@ -17756,7 +17756,7 @@
     </p:spTree>
     <p:extLst>
       <p:ext uri="{BB962C8B-B14F-4D97-AF65-F5344CB8AC3E}">
-        <p14:creationId xmlns:p14="http://schemas.microsoft.com/office/powerpoint/2010/main" xmlns="" val="2300009982"/>
+        <p14:creationId xmlns="" xmlns:p14="http://schemas.microsoft.com/office/powerpoint/2010/main" val="2300009982"/>
       </p:ext>
     </p:extLst>
   </p:cSld>
@@ -17917,7 +17917,7 @@
           <p:cNvPr id="7" name="AutoShape 4">
             <a:extLst>
               <a:ext uri="{FF2B5EF4-FFF2-40B4-BE49-F238E27FC236}">
-                <a16:creationId xmlns:a16="http://schemas.microsoft.com/office/drawing/2014/main" xmlns="" id="{B038E632-9BE6-46DA-AD27-B95418BDFDB9}"/>
+                <a16:creationId xmlns="" xmlns:a16="http://schemas.microsoft.com/office/drawing/2014/main" id="{B038E632-9BE6-46DA-AD27-B95418BDFDB9}"/>
               </a:ext>
             </a:extLst>
           </p:cNvPr>
@@ -18058,7 +18058,7 @@
           <p:cNvPr id="8" name="Text Box 5">
             <a:extLst>
               <a:ext uri="{FF2B5EF4-FFF2-40B4-BE49-F238E27FC236}">
-                <a16:creationId xmlns:a16="http://schemas.microsoft.com/office/drawing/2014/main" xmlns="" id="{38155AF2-3B1F-40FE-8DC9-BD1FA3910DE9}"/>
+                <a16:creationId xmlns="" xmlns:a16="http://schemas.microsoft.com/office/drawing/2014/main" id="{38155AF2-3B1F-40FE-8DC9-BD1FA3910DE9}"/>
               </a:ext>
             </a:extLst>
           </p:cNvPr>
@@ -18081,14 +18081,14 @@
           </a:ln>
           <a:extLst>
             <a:ext uri="{909E8E84-426E-40DD-AFC4-6F175D3DCCD1}">
-              <a14:hiddenFill xmlns:a14="http://schemas.microsoft.com/office/drawing/2010/main" xmlns="">
+              <a14:hiddenFill xmlns="" xmlns:a14="http://schemas.microsoft.com/office/drawing/2010/main">
                 <a:solidFill>
                   <a:srgbClr val="FFFFFF"/>
                 </a:solidFill>
               </a14:hiddenFill>
             </a:ext>
             <a:ext uri="{91240B29-F687-4F45-9708-019B960494DF}">
-              <a14:hiddenLine xmlns:a14="http://schemas.microsoft.com/office/drawing/2010/main" xmlns="" w="9525">
+              <a14:hiddenLine xmlns="" xmlns:a14="http://schemas.microsoft.com/office/drawing/2010/main" w="9525">
                 <a:solidFill>
                   <a:srgbClr val="000000"/>
                 </a:solidFill>
@@ -18492,7 +18492,7 @@
     </p:spTree>
     <p:extLst>
       <p:ext uri="{BB962C8B-B14F-4D97-AF65-F5344CB8AC3E}">
-        <p14:creationId xmlns:p14="http://schemas.microsoft.com/office/powerpoint/2010/main" xmlns="" val="4007749539"/>
+        <p14:creationId xmlns="" xmlns:p14="http://schemas.microsoft.com/office/powerpoint/2010/main" val="4007749539"/>
       </p:ext>
     </p:extLst>
   </p:cSld>
@@ -18675,7 +18675,7 @@
     </p:spTree>
     <p:extLst>
       <p:ext uri="{BB962C8B-B14F-4D97-AF65-F5344CB8AC3E}">
-        <p14:creationId xmlns:p14="http://schemas.microsoft.com/office/powerpoint/2010/main" xmlns="" val="3947875643"/>
+        <p14:creationId xmlns="" xmlns:p14="http://schemas.microsoft.com/office/powerpoint/2010/main" val="3947875643"/>
       </p:ext>
     </p:extLst>
   </p:cSld>
@@ -18807,7 +18807,7 @@
           <p:cNvPr id="7" name="AutoShape 4">
             <a:extLst>
               <a:ext uri="{FF2B5EF4-FFF2-40B4-BE49-F238E27FC236}">
-                <a16:creationId xmlns:a16="http://schemas.microsoft.com/office/drawing/2014/main" xmlns="" id="{E7A1E0BF-ED82-4E8D-8E9A-625BFBBE8D1A}"/>
+                <a16:creationId xmlns="" xmlns:a16="http://schemas.microsoft.com/office/drawing/2014/main" id="{E7A1E0BF-ED82-4E8D-8E9A-625BFBBE8D1A}"/>
               </a:ext>
             </a:extLst>
           </p:cNvPr>
@@ -18948,7 +18948,7 @@
           <p:cNvPr id="8" name="Text Box 5">
             <a:extLst>
               <a:ext uri="{FF2B5EF4-FFF2-40B4-BE49-F238E27FC236}">
-                <a16:creationId xmlns:a16="http://schemas.microsoft.com/office/drawing/2014/main" xmlns="" id="{991E86CF-8EFC-4BB3-B052-4116086944D2}"/>
+                <a16:creationId xmlns="" xmlns:a16="http://schemas.microsoft.com/office/drawing/2014/main" id="{991E86CF-8EFC-4BB3-B052-4116086944D2}"/>
               </a:ext>
             </a:extLst>
           </p:cNvPr>
@@ -18971,14 +18971,14 @@
           </a:ln>
           <a:extLst>
             <a:ext uri="{909E8E84-426E-40DD-AFC4-6F175D3DCCD1}">
-              <a14:hiddenFill xmlns:a14="http://schemas.microsoft.com/office/drawing/2010/main" xmlns="">
+              <a14:hiddenFill xmlns="" xmlns:a14="http://schemas.microsoft.com/office/drawing/2010/main">
                 <a:solidFill>
                   <a:srgbClr val="FFFFFF"/>
                 </a:solidFill>
               </a14:hiddenFill>
             </a:ext>
             <a:ext uri="{91240B29-F687-4F45-9708-019B960494DF}">
-              <a14:hiddenLine xmlns:a14="http://schemas.microsoft.com/office/drawing/2010/main" xmlns="" w="9525">
+              <a14:hiddenLine xmlns="" xmlns:a14="http://schemas.microsoft.com/office/drawing/2010/main" w="9525">
                 <a:solidFill>
                   <a:srgbClr val="000000"/>
                 </a:solidFill>
@@ -19400,7 +19400,7 @@
           <p:cNvPr id="9" name="Oval 6">
             <a:extLst>
               <a:ext uri="{FF2B5EF4-FFF2-40B4-BE49-F238E27FC236}">
-                <a16:creationId xmlns:a16="http://schemas.microsoft.com/office/drawing/2014/main" xmlns="" id="{AC9E086C-F378-4991-96AF-94C27BD6885F}"/>
+                <a16:creationId xmlns="" xmlns:a16="http://schemas.microsoft.com/office/drawing/2014/main" id="{AC9E086C-F378-4991-96AF-94C27BD6885F}"/>
               </a:ext>
             </a:extLst>
           </p:cNvPr>
@@ -19581,7 +19581,7 @@
           <p:cNvPr id="11" name="Oval 7">
             <a:extLst>
               <a:ext uri="{FF2B5EF4-FFF2-40B4-BE49-F238E27FC236}">
-                <a16:creationId xmlns:a16="http://schemas.microsoft.com/office/drawing/2014/main" xmlns="" id="{1B5AC7AD-97D7-4E6F-9D38-9CCDE25B58DC}"/>
+                <a16:creationId xmlns="" xmlns:a16="http://schemas.microsoft.com/office/drawing/2014/main" id="{1B5AC7AD-97D7-4E6F-9D38-9CCDE25B58DC}"/>
               </a:ext>
             </a:extLst>
           </p:cNvPr>
@@ -19762,7 +19762,7 @@
           <p:cNvPr id="13" name="Oval 8">
             <a:extLst>
               <a:ext uri="{FF2B5EF4-FFF2-40B4-BE49-F238E27FC236}">
-                <a16:creationId xmlns:a16="http://schemas.microsoft.com/office/drawing/2014/main" xmlns="" id="{FC45E833-7274-47FA-A81E-94A935A8B48C}"/>
+                <a16:creationId xmlns="" xmlns:a16="http://schemas.microsoft.com/office/drawing/2014/main" id="{FC45E833-7274-47FA-A81E-94A935A8B48C}"/>
               </a:ext>
             </a:extLst>
           </p:cNvPr>
@@ -19943,7 +19943,7 @@
           <p:cNvPr id="14" name="Oval 9">
             <a:extLst>
               <a:ext uri="{FF2B5EF4-FFF2-40B4-BE49-F238E27FC236}">
-                <a16:creationId xmlns:a16="http://schemas.microsoft.com/office/drawing/2014/main" xmlns="" id="{1074705B-A445-43BA-A75A-CD9E29D8110A}"/>
+                <a16:creationId xmlns="" xmlns:a16="http://schemas.microsoft.com/office/drawing/2014/main" id="{1074705B-A445-43BA-A75A-CD9E29D8110A}"/>
               </a:ext>
             </a:extLst>
           </p:cNvPr>
@@ -20124,7 +20124,7 @@
           <p:cNvPr id="15" name="Oval 10">
             <a:extLst>
               <a:ext uri="{FF2B5EF4-FFF2-40B4-BE49-F238E27FC236}">
-                <a16:creationId xmlns:a16="http://schemas.microsoft.com/office/drawing/2014/main" xmlns="" id="{EDF8F0D8-A792-4AA5-B117-ACDCCD5FC23F}"/>
+                <a16:creationId xmlns="" xmlns:a16="http://schemas.microsoft.com/office/drawing/2014/main" id="{EDF8F0D8-A792-4AA5-B117-ACDCCD5FC23F}"/>
               </a:ext>
             </a:extLst>
           </p:cNvPr>
@@ -20305,7 +20305,7 @@
           <p:cNvPr id="16" name="Oval 11">
             <a:extLst>
               <a:ext uri="{FF2B5EF4-FFF2-40B4-BE49-F238E27FC236}">
-                <a16:creationId xmlns:a16="http://schemas.microsoft.com/office/drawing/2014/main" xmlns="" id="{1D608BCE-9E09-4192-B887-80B309B155DB}"/>
+                <a16:creationId xmlns="" xmlns:a16="http://schemas.microsoft.com/office/drawing/2014/main" id="{1D608BCE-9E09-4192-B887-80B309B155DB}"/>
               </a:ext>
             </a:extLst>
           </p:cNvPr>
@@ -20486,7 +20486,7 @@
           <p:cNvPr id="17" name="Oval 12">
             <a:extLst>
               <a:ext uri="{FF2B5EF4-FFF2-40B4-BE49-F238E27FC236}">
-                <a16:creationId xmlns:a16="http://schemas.microsoft.com/office/drawing/2014/main" xmlns="" id="{0A476B5F-18A0-45DC-A49E-3CA81281D9DE}"/>
+                <a16:creationId xmlns="" xmlns:a16="http://schemas.microsoft.com/office/drawing/2014/main" id="{0A476B5F-18A0-45DC-A49E-3CA81281D9DE}"/>
               </a:ext>
             </a:extLst>
           </p:cNvPr>
@@ -20667,7 +20667,7 @@
           <p:cNvPr id="18" name="Oval 13">
             <a:extLst>
               <a:ext uri="{FF2B5EF4-FFF2-40B4-BE49-F238E27FC236}">
-                <a16:creationId xmlns:a16="http://schemas.microsoft.com/office/drawing/2014/main" xmlns="" id="{645BF441-4E32-4C10-B413-AE1256F8B24B}"/>
+                <a16:creationId xmlns="" xmlns:a16="http://schemas.microsoft.com/office/drawing/2014/main" id="{645BF441-4E32-4C10-B413-AE1256F8B24B}"/>
               </a:ext>
             </a:extLst>
           </p:cNvPr>
@@ -20848,7 +20848,7 @@
           <p:cNvPr id="19" name="Oval 14">
             <a:extLst>
               <a:ext uri="{FF2B5EF4-FFF2-40B4-BE49-F238E27FC236}">
-                <a16:creationId xmlns:a16="http://schemas.microsoft.com/office/drawing/2014/main" xmlns="" id="{1C24AD11-2298-4D21-A8D7-9B844B304DE9}"/>
+                <a16:creationId xmlns="" xmlns:a16="http://schemas.microsoft.com/office/drawing/2014/main" id="{1C24AD11-2298-4D21-A8D7-9B844B304DE9}"/>
               </a:ext>
             </a:extLst>
           </p:cNvPr>
@@ -21029,7 +21029,7 @@
           <p:cNvPr id="20" name="AutoShape 15">
             <a:extLst>
               <a:ext uri="{FF2B5EF4-FFF2-40B4-BE49-F238E27FC236}">
-                <a16:creationId xmlns:a16="http://schemas.microsoft.com/office/drawing/2014/main" xmlns="" id="{8DD1D10D-B7BF-4B9D-83D5-5C3A14102844}"/>
+                <a16:creationId xmlns="" xmlns:a16="http://schemas.microsoft.com/office/drawing/2014/main" id="{8DD1D10D-B7BF-4B9D-83D5-5C3A14102844}"/>
               </a:ext>
             </a:extLst>
           </p:cNvPr>
@@ -21212,7 +21212,7 @@
           <p:cNvPr id="21" name="Text Box 16">
             <a:extLst>
               <a:ext uri="{FF2B5EF4-FFF2-40B4-BE49-F238E27FC236}">
-                <a16:creationId xmlns:a16="http://schemas.microsoft.com/office/drawing/2014/main" xmlns="" id="{D74FE2D1-6379-445F-9284-81051BAE705F}"/>
+                <a16:creationId xmlns="" xmlns:a16="http://schemas.microsoft.com/office/drawing/2014/main" id="{D74FE2D1-6379-445F-9284-81051BAE705F}"/>
               </a:ext>
             </a:extLst>
           </p:cNvPr>
@@ -21235,14 +21235,14 @@
           </a:ln>
           <a:extLst>
             <a:ext uri="{909E8E84-426E-40DD-AFC4-6F175D3DCCD1}">
-              <a14:hiddenFill xmlns:a14="http://schemas.microsoft.com/office/drawing/2010/main" xmlns="">
+              <a14:hiddenFill xmlns="" xmlns:a14="http://schemas.microsoft.com/office/drawing/2010/main">
                 <a:solidFill>
                   <a:srgbClr val="FFFFFF"/>
                 </a:solidFill>
               </a14:hiddenFill>
             </a:ext>
             <a:ext uri="{91240B29-F687-4F45-9708-019B960494DF}">
-              <a14:hiddenLine xmlns:a14="http://schemas.microsoft.com/office/drawing/2010/main" xmlns="" w="9525">
+              <a14:hiddenLine xmlns="" xmlns:a14="http://schemas.microsoft.com/office/drawing/2010/main" w="9525">
                 <a:solidFill>
                   <a:srgbClr val="000000"/>
                 </a:solidFill>
@@ -21412,7 +21412,7 @@
     </p:spTree>
     <p:extLst>
       <p:ext uri="{BB962C8B-B14F-4D97-AF65-F5344CB8AC3E}">
-        <p14:creationId xmlns:p14="http://schemas.microsoft.com/office/powerpoint/2010/main" xmlns="" val="238478991"/>
+        <p14:creationId xmlns="" xmlns:p14="http://schemas.microsoft.com/office/powerpoint/2010/main" val="238478991"/>
       </p:ext>
     </p:extLst>
   </p:cSld>
@@ -21593,7 +21593,7 @@
     </p:spTree>
     <p:extLst>
       <p:ext uri="{BB962C8B-B14F-4D97-AF65-F5344CB8AC3E}">
-        <p14:creationId xmlns:p14="http://schemas.microsoft.com/office/powerpoint/2010/main" xmlns="" val="3367233346"/>
+        <p14:creationId xmlns="" xmlns:p14="http://schemas.microsoft.com/office/powerpoint/2010/main" val="3367233346"/>
       </p:ext>
     </p:extLst>
   </p:cSld>
@@ -21725,7 +21725,7 @@
           <p:cNvPr id="7" name="AutoShape 4">
             <a:extLst>
               <a:ext uri="{FF2B5EF4-FFF2-40B4-BE49-F238E27FC236}">
-                <a16:creationId xmlns:a16="http://schemas.microsoft.com/office/drawing/2014/main" xmlns="" id="{518A57DD-E4BB-4DEA-BA6E-8725D8A872A2}"/>
+                <a16:creationId xmlns="" xmlns:a16="http://schemas.microsoft.com/office/drawing/2014/main" id="{518A57DD-E4BB-4DEA-BA6E-8725D8A872A2}"/>
               </a:ext>
             </a:extLst>
           </p:cNvPr>
@@ -21866,7 +21866,7 @@
           <p:cNvPr id="8" name="Text Box 5">
             <a:extLst>
               <a:ext uri="{FF2B5EF4-FFF2-40B4-BE49-F238E27FC236}">
-                <a16:creationId xmlns:a16="http://schemas.microsoft.com/office/drawing/2014/main" xmlns="" id="{229CC713-E71F-4760-8043-43FAB5935643}"/>
+                <a16:creationId xmlns="" xmlns:a16="http://schemas.microsoft.com/office/drawing/2014/main" id="{229CC713-E71F-4760-8043-43FAB5935643}"/>
               </a:ext>
             </a:extLst>
           </p:cNvPr>
@@ -21889,14 +21889,14 @@
           </a:ln>
           <a:extLst>
             <a:ext uri="{909E8E84-426E-40DD-AFC4-6F175D3DCCD1}">
-              <a14:hiddenFill xmlns:a14="http://schemas.microsoft.com/office/drawing/2010/main" xmlns="">
+              <a14:hiddenFill xmlns="" xmlns:a14="http://schemas.microsoft.com/office/drawing/2010/main">
                 <a:solidFill>
                   <a:srgbClr val="FFFFFF"/>
                 </a:solidFill>
               </a14:hiddenFill>
             </a:ext>
             <a:ext uri="{91240B29-F687-4F45-9708-019B960494DF}">
-              <a14:hiddenLine xmlns:a14="http://schemas.microsoft.com/office/drawing/2010/main" xmlns="" w="9525">
+              <a14:hiddenLine xmlns="" xmlns:a14="http://schemas.microsoft.com/office/drawing/2010/main" w="9525">
                 <a:solidFill>
                   <a:srgbClr val="000000"/>
                 </a:solidFill>
@@ -22343,7 +22343,7 @@
           <p:cNvPr id="9" name="Oval 6">
             <a:extLst>
               <a:ext uri="{FF2B5EF4-FFF2-40B4-BE49-F238E27FC236}">
-                <a16:creationId xmlns:a16="http://schemas.microsoft.com/office/drawing/2014/main" xmlns="" id="{26A54D48-B791-4AE6-988A-637AD593AFF5}"/>
+                <a16:creationId xmlns="" xmlns:a16="http://schemas.microsoft.com/office/drawing/2014/main" id="{26A54D48-B791-4AE6-988A-637AD593AFF5}"/>
               </a:ext>
             </a:extLst>
           </p:cNvPr>
@@ -22524,7 +22524,7 @@
           <p:cNvPr id="11" name="Oval 7">
             <a:extLst>
               <a:ext uri="{FF2B5EF4-FFF2-40B4-BE49-F238E27FC236}">
-                <a16:creationId xmlns:a16="http://schemas.microsoft.com/office/drawing/2014/main" xmlns="" id="{C2BF27CA-1EDC-4146-ADE4-D1CDB6BCC5EC}"/>
+                <a16:creationId xmlns="" xmlns:a16="http://schemas.microsoft.com/office/drawing/2014/main" id="{C2BF27CA-1EDC-4146-ADE4-D1CDB6BCC5EC}"/>
               </a:ext>
             </a:extLst>
           </p:cNvPr>
@@ -22705,7 +22705,7 @@
           <p:cNvPr id="13" name="Oval 8">
             <a:extLst>
               <a:ext uri="{FF2B5EF4-FFF2-40B4-BE49-F238E27FC236}">
-                <a16:creationId xmlns:a16="http://schemas.microsoft.com/office/drawing/2014/main" xmlns="" id="{4F5ED168-45E3-4E2C-B010-90BA1DCBD099}"/>
+                <a16:creationId xmlns="" xmlns:a16="http://schemas.microsoft.com/office/drawing/2014/main" id="{4F5ED168-45E3-4E2C-B010-90BA1DCBD099}"/>
               </a:ext>
             </a:extLst>
           </p:cNvPr>
@@ -22886,7 +22886,7 @@
           <p:cNvPr id="14" name="Oval 9">
             <a:extLst>
               <a:ext uri="{FF2B5EF4-FFF2-40B4-BE49-F238E27FC236}">
-                <a16:creationId xmlns:a16="http://schemas.microsoft.com/office/drawing/2014/main" xmlns="" id="{692AFADF-DA66-4F9D-8EE0-A4BC663813FC}"/>
+                <a16:creationId xmlns="" xmlns:a16="http://schemas.microsoft.com/office/drawing/2014/main" id="{692AFADF-DA66-4F9D-8EE0-A4BC663813FC}"/>
               </a:ext>
             </a:extLst>
           </p:cNvPr>
@@ -23067,7 +23067,7 @@
           <p:cNvPr id="15" name="Oval 10">
             <a:extLst>
               <a:ext uri="{FF2B5EF4-FFF2-40B4-BE49-F238E27FC236}">
-                <a16:creationId xmlns:a16="http://schemas.microsoft.com/office/drawing/2014/main" xmlns="" id="{8321742D-551A-4AB3-85C2-B3D453B7DDE0}"/>
+                <a16:creationId xmlns="" xmlns:a16="http://schemas.microsoft.com/office/drawing/2014/main" id="{8321742D-551A-4AB3-85C2-B3D453B7DDE0}"/>
               </a:ext>
             </a:extLst>
           </p:cNvPr>
@@ -23248,7 +23248,7 @@
           <p:cNvPr id="16" name="Oval 11">
             <a:extLst>
               <a:ext uri="{FF2B5EF4-FFF2-40B4-BE49-F238E27FC236}">
-                <a16:creationId xmlns:a16="http://schemas.microsoft.com/office/drawing/2014/main" xmlns="" id="{9BC121E0-1899-4643-9DCB-9BEC574CEB39}"/>
+                <a16:creationId xmlns="" xmlns:a16="http://schemas.microsoft.com/office/drawing/2014/main" id="{9BC121E0-1899-4643-9DCB-9BEC574CEB39}"/>
               </a:ext>
             </a:extLst>
           </p:cNvPr>
@@ -23429,7 +23429,7 @@
           <p:cNvPr id="17" name="Oval 12">
             <a:extLst>
               <a:ext uri="{FF2B5EF4-FFF2-40B4-BE49-F238E27FC236}">
-                <a16:creationId xmlns:a16="http://schemas.microsoft.com/office/drawing/2014/main" xmlns="" id="{45742073-634C-46C6-8BF0-0C01E0E9139A}"/>
+                <a16:creationId xmlns="" xmlns:a16="http://schemas.microsoft.com/office/drawing/2014/main" id="{45742073-634C-46C6-8BF0-0C01E0E9139A}"/>
               </a:ext>
             </a:extLst>
           </p:cNvPr>
@@ -23610,7 +23610,7 @@
           <p:cNvPr id="18" name="Oval 13">
             <a:extLst>
               <a:ext uri="{FF2B5EF4-FFF2-40B4-BE49-F238E27FC236}">
-                <a16:creationId xmlns:a16="http://schemas.microsoft.com/office/drawing/2014/main" xmlns="" id="{2474517F-EB6F-48CE-9728-74697DA9D730}"/>
+                <a16:creationId xmlns="" xmlns:a16="http://schemas.microsoft.com/office/drawing/2014/main" id="{2474517F-EB6F-48CE-9728-74697DA9D730}"/>
               </a:ext>
             </a:extLst>
           </p:cNvPr>
@@ -23791,7 +23791,7 @@
           <p:cNvPr id="19" name="Oval 14">
             <a:extLst>
               <a:ext uri="{FF2B5EF4-FFF2-40B4-BE49-F238E27FC236}">
-                <a16:creationId xmlns:a16="http://schemas.microsoft.com/office/drawing/2014/main" xmlns="" id="{8D729BCC-7C5E-4945-BF51-F314E45C26AB}"/>
+                <a16:creationId xmlns="" xmlns:a16="http://schemas.microsoft.com/office/drawing/2014/main" id="{8D729BCC-7C5E-4945-BF51-F314E45C26AB}"/>
               </a:ext>
             </a:extLst>
           </p:cNvPr>
@@ -23972,7 +23972,7 @@
           <p:cNvPr id="20" name="AutoShape 15">
             <a:extLst>
               <a:ext uri="{FF2B5EF4-FFF2-40B4-BE49-F238E27FC236}">
-                <a16:creationId xmlns:a16="http://schemas.microsoft.com/office/drawing/2014/main" xmlns="" id="{B7D9EA72-D68A-421E-A80B-6928B4852FF9}"/>
+                <a16:creationId xmlns="" xmlns:a16="http://schemas.microsoft.com/office/drawing/2014/main" id="{B7D9EA72-D68A-421E-A80B-6928B4852FF9}"/>
               </a:ext>
             </a:extLst>
           </p:cNvPr>
@@ -24113,7 +24113,7 @@
           <p:cNvPr id="21" name="Text Box 16">
             <a:extLst>
               <a:ext uri="{FF2B5EF4-FFF2-40B4-BE49-F238E27FC236}">
-                <a16:creationId xmlns:a16="http://schemas.microsoft.com/office/drawing/2014/main" xmlns="" id="{6B75DD81-3470-40A5-8351-77B1CBECFAB4}"/>
+                <a16:creationId xmlns="" xmlns:a16="http://schemas.microsoft.com/office/drawing/2014/main" id="{6B75DD81-3470-40A5-8351-77B1CBECFAB4}"/>
               </a:ext>
             </a:extLst>
           </p:cNvPr>
@@ -24136,14 +24136,14 @@
           </a:ln>
           <a:extLst>
             <a:ext uri="{909E8E84-426E-40DD-AFC4-6F175D3DCCD1}">
-              <a14:hiddenFill xmlns:a14="http://schemas.microsoft.com/office/drawing/2010/main" xmlns="">
+              <a14:hiddenFill xmlns="" xmlns:a14="http://schemas.microsoft.com/office/drawing/2010/main">
                 <a:solidFill>
                   <a:srgbClr val="FFFFFF"/>
                 </a:solidFill>
               </a14:hiddenFill>
             </a:ext>
             <a:ext uri="{91240B29-F687-4F45-9708-019B960494DF}">
-              <a14:hiddenLine xmlns:a14="http://schemas.microsoft.com/office/drawing/2010/main" xmlns="" w="9525">
+              <a14:hiddenLine xmlns="" xmlns:a14="http://schemas.microsoft.com/office/drawing/2010/main" w="9525">
                 <a:solidFill>
                   <a:srgbClr val="000000"/>
                 </a:solidFill>
@@ -24315,7 +24315,7 @@
           <p:cNvPr id="22" name="Text Box 17">
             <a:extLst>
               <a:ext uri="{FF2B5EF4-FFF2-40B4-BE49-F238E27FC236}">
-                <a16:creationId xmlns:a16="http://schemas.microsoft.com/office/drawing/2014/main" xmlns="" id="{1537CE72-5259-4E18-8831-78E0FDC61E08}"/>
+                <a16:creationId xmlns="" xmlns:a16="http://schemas.microsoft.com/office/drawing/2014/main" id="{1537CE72-5259-4E18-8831-78E0FDC61E08}"/>
               </a:ext>
             </a:extLst>
           </p:cNvPr>
@@ -24338,14 +24338,14 @@
           </a:ln>
           <a:extLst>
             <a:ext uri="{909E8E84-426E-40DD-AFC4-6F175D3DCCD1}">
-              <a14:hiddenFill xmlns:a14="http://schemas.microsoft.com/office/drawing/2010/main" xmlns="">
+              <a14:hiddenFill xmlns="" xmlns:a14="http://schemas.microsoft.com/office/drawing/2010/main">
                 <a:solidFill>
                   <a:srgbClr val="FFFFFF"/>
                 </a:solidFill>
               </a14:hiddenFill>
             </a:ext>
             <a:ext uri="{91240B29-F687-4F45-9708-019B960494DF}">
-              <a14:hiddenLine xmlns:a14="http://schemas.microsoft.com/office/drawing/2010/main" xmlns="" w="9525">
+              <a14:hiddenLine xmlns="" xmlns:a14="http://schemas.microsoft.com/office/drawing/2010/main" w="9525">
                 <a:solidFill>
                   <a:srgbClr val="000000"/>
                 </a:solidFill>
@@ -24538,7 +24538,7 @@
           <p:cNvPr id="23" name="AutoShape 19">
             <a:extLst>
               <a:ext uri="{FF2B5EF4-FFF2-40B4-BE49-F238E27FC236}">
-                <a16:creationId xmlns:a16="http://schemas.microsoft.com/office/drawing/2014/main" xmlns="" id="{4F9590C8-BE9C-4C28-941B-FCF2437EB428}"/>
+                <a16:creationId xmlns="" xmlns:a16="http://schemas.microsoft.com/office/drawing/2014/main" id="{4F9590C8-BE9C-4C28-941B-FCF2437EB428}"/>
               </a:ext>
             </a:extLst>
           </p:cNvPr>
@@ -24719,7 +24719,7 @@
     </p:spTree>
     <p:extLst>
       <p:ext uri="{BB962C8B-B14F-4D97-AF65-F5344CB8AC3E}">
-        <p14:creationId xmlns:p14="http://schemas.microsoft.com/office/powerpoint/2010/main" xmlns="" val="2589079622"/>
+        <p14:creationId xmlns="" xmlns:p14="http://schemas.microsoft.com/office/powerpoint/2010/main" val="2589079622"/>
       </p:ext>
     </p:extLst>
   </p:cSld>
@@ -24854,7 +24854,7 @@
           <p:cNvPr id="16" name="AutoShape 9">
             <a:extLst>
               <a:ext uri="{FF2B5EF4-FFF2-40B4-BE49-F238E27FC236}">
-                <a16:creationId xmlns:a16="http://schemas.microsoft.com/office/drawing/2014/main" xmlns="" id="{33189353-F7F2-4FA9-999A-2F81AA853AC6}"/>
+                <a16:creationId xmlns="" xmlns:a16="http://schemas.microsoft.com/office/drawing/2014/main" id="{33189353-F7F2-4FA9-999A-2F81AA853AC6}"/>
               </a:ext>
             </a:extLst>
           </p:cNvPr>
@@ -24995,7 +24995,7 @@
           <p:cNvPr id="17" name="Text Box 10">
             <a:extLst>
               <a:ext uri="{FF2B5EF4-FFF2-40B4-BE49-F238E27FC236}">
-                <a16:creationId xmlns:a16="http://schemas.microsoft.com/office/drawing/2014/main" xmlns="" id="{B0C67384-D2EA-42A6-8E4B-36426D10D84A}"/>
+                <a16:creationId xmlns="" xmlns:a16="http://schemas.microsoft.com/office/drawing/2014/main" id="{B0C67384-D2EA-42A6-8E4B-36426D10D84A}"/>
               </a:ext>
             </a:extLst>
           </p:cNvPr>
@@ -25018,14 +25018,14 @@
           </a:ln>
           <a:extLst>
             <a:ext uri="{909E8E84-426E-40DD-AFC4-6F175D3DCCD1}">
-              <a14:hiddenFill xmlns:a14="http://schemas.microsoft.com/office/drawing/2010/main" xmlns="">
+              <a14:hiddenFill xmlns="" xmlns:a14="http://schemas.microsoft.com/office/drawing/2010/main">
                 <a:solidFill>
                   <a:srgbClr val="FFFFFF"/>
                 </a:solidFill>
               </a14:hiddenFill>
             </a:ext>
             <a:ext uri="{91240B29-F687-4F45-9708-019B960494DF}">
-              <a14:hiddenLine xmlns:a14="http://schemas.microsoft.com/office/drawing/2010/main" xmlns="" w="9525">
+              <a14:hiddenLine xmlns="" xmlns:a14="http://schemas.microsoft.com/office/drawing/2010/main" w="9525">
                 <a:solidFill>
                   <a:srgbClr val="000000"/>
                 </a:solidFill>
@@ -25836,7 +25836,7 @@
     </p:spTree>
     <p:extLst>
       <p:ext uri="{BB962C8B-B14F-4D97-AF65-F5344CB8AC3E}">
-        <p14:creationId xmlns:p14="http://schemas.microsoft.com/office/powerpoint/2010/main" xmlns="" val="3295771326"/>
+        <p14:creationId xmlns="" xmlns:p14="http://schemas.microsoft.com/office/powerpoint/2010/main" val="3295771326"/>
       </p:ext>
     </p:extLst>
   </p:cSld>
@@ -26005,7 +26005,7 @@
           <p:cNvPr id="7" name="AutoShape 4">
             <a:extLst>
               <a:ext uri="{FF2B5EF4-FFF2-40B4-BE49-F238E27FC236}">
-                <a16:creationId xmlns:a16="http://schemas.microsoft.com/office/drawing/2014/main" xmlns="" id="{937D5F2E-2306-42F5-8BD1-EF1E2C4963DB}"/>
+                <a16:creationId xmlns="" xmlns:a16="http://schemas.microsoft.com/office/drawing/2014/main" id="{937D5F2E-2306-42F5-8BD1-EF1E2C4963DB}"/>
               </a:ext>
             </a:extLst>
           </p:cNvPr>
@@ -26146,7 +26146,7 @@
           <p:cNvPr id="8" name="Text Box 5">
             <a:extLst>
               <a:ext uri="{FF2B5EF4-FFF2-40B4-BE49-F238E27FC236}">
-                <a16:creationId xmlns:a16="http://schemas.microsoft.com/office/drawing/2014/main" xmlns="" id="{FCA8133D-B200-474C-B68B-7E73B0C066BA}"/>
+                <a16:creationId xmlns="" xmlns:a16="http://schemas.microsoft.com/office/drawing/2014/main" id="{FCA8133D-B200-474C-B68B-7E73B0C066BA}"/>
               </a:ext>
             </a:extLst>
           </p:cNvPr>
@@ -26169,14 +26169,14 @@
           </a:ln>
           <a:extLst>
             <a:ext uri="{909E8E84-426E-40DD-AFC4-6F175D3DCCD1}">
-              <a14:hiddenFill xmlns:a14="http://schemas.microsoft.com/office/drawing/2010/main" xmlns="">
+              <a14:hiddenFill xmlns="" xmlns:a14="http://schemas.microsoft.com/office/drawing/2010/main">
                 <a:solidFill>
                   <a:srgbClr val="FFFFFF"/>
                 </a:solidFill>
               </a14:hiddenFill>
             </a:ext>
             <a:ext uri="{91240B29-F687-4F45-9708-019B960494DF}">
-              <a14:hiddenLine xmlns:a14="http://schemas.microsoft.com/office/drawing/2010/main" xmlns="" w="9525">
+              <a14:hiddenLine xmlns="" xmlns:a14="http://schemas.microsoft.com/office/drawing/2010/main" w="9525">
                 <a:solidFill>
                   <a:srgbClr val="000000"/>
                 </a:solidFill>
@@ -26585,7 +26585,7 @@
     </p:spTree>
     <p:extLst>
       <p:ext uri="{BB962C8B-B14F-4D97-AF65-F5344CB8AC3E}">
-        <p14:creationId xmlns:p14="http://schemas.microsoft.com/office/powerpoint/2010/main" xmlns="" val="2059298126"/>
+        <p14:creationId xmlns="" xmlns:p14="http://schemas.microsoft.com/office/powerpoint/2010/main" val="2059298126"/>
       </p:ext>
     </p:extLst>
   </p:cSld>
@@ -26731,7 +26731,7 @@
           <p:cNvPr id="7" name="AutoShape 4">
             <a:extLst>
               <a:ext uri="{FF2B5EF4-FFF2-40B4-BE49-F238E27FC236}">
-                <a16:creationId xmlns:a16="http://schemas.microsoft.com/office/drawing/2014/main" xmlns="" id="{064016A1-1F08-4CEF-B7B3-BF52130D0495}"/>
+                <a16:creationId xmlns="" xmlns:a16="http://schemas.microsoft.com/office/drawing/2014/main" id="{064016A1-1F08-4CEF-B7B3-BF52130D0495}"/>
               </a:ext>
             </a:extLst>
           </p:cNvPr>
@@ -26872,7 +26872,7 @@
           <p:cNvPr id="8" name="Text Box 5">
             <a:extLst>
               <a:ext uri="{FF2B5EF4-FFF2-40B4-BE49-F238E27FC236}">
-                <a16:creationId xmlns:a16="http://schemas.microsoft.com/office/drawing/2014/main" xmlns="" id="{7E43E751-F547-4BD8-94A7-D7B91727F5E8}"/>
+                <a16:creationId xmlns="" xmlns:a16="http://schemas.microsoft.com/office/drawing/2014/main" id="{7E43E751-F547-4BD8-94A7-D7B91727F5E8}"/>
               </a:ext>
             </a:extLst>
           </p:cNvPr>
@@ -26895,14 +26895,14 @@
           </a:ln>
           <a:extLst>
             <a:ext uri="{909E8E84-426E-40DD-AFC4-6F175D3DCCD1}">
-              <a14:hiddenFill xmlns:a14="http://schemas.microsoft.com/office/drawing/2010/main" xmlns="">
+              <a14:hiddenFill xmlns="" xmlns:a14="http://schemas.microsoft.com/office/drawing/2010/main">
                 <a:solidFill>
                   <a:srgbClr val="FFFFFF"/>
                 </a:solidFill>
               </a14:hiddenFill>
             </a:ext>
             <a:ext uri="{91240B29-F687-4F45-9708-019B960494DF}">
-              <a14:hiddenLine xmlns:a14="http://schemas.microsoft.com/office/drawing/2010/main" xmlns="" w="9525">
+              <a14:hiddenLine xmlns="" xmlns:a14="http://schemas.microsoft.com/office/drawing/2010/main" w="9525">
                 <a:solidFill>
                   <a:srgbClr val="000000"/>
                 </a:solidFill>
@@ -27632,7 +27632,7 @@
     </p:spTree>
     <p:extLst>
       <p:ext uri="{BB962C8B-B14F-4D97-AF65-F5344CB8AC3E}">
-        <p14:creationId xmlns:p14="http://schemas.microsoft.com/office/powerpoint/2010/main" xmlns="" val="2402579004"/>
+        <p14:creationId xmlns="" xmlns:p14="http://schemas.microsoft.com/office/powerpoint/2010/main" val="2402579004"/>
       </p:ext>
     </p:extLst>
   </p:cSld>
@@ -27771,7 +27771,7 @@
           <p:cNvPr id="7" name="AutoShape 4">
             <a:extLst>
               <a:ext uri="{FF2B5EF4-FFF2-40B4-BE49-F238E27FC236}">
-                <a16:creationId xmlns:a16="http://schemas.microsoft.com/office/drawing/2014/main" xmlns="" id="{9C64D8DF-64E7-4445-93DB-2556DB518D7E}"/>
+                <a16:creationId xmlns="" xmlns:a16="http://schemas.microsoft.com/office/drawing/2014/main" id="{9C64D8DF-64E7-4445-93DB-2556DB518D7E}"/>
               </a:ext>
             </a:extLst>
           </p:cNvPr>
@@ -27912,7 +27912,7 @@
           <p:cNvPr id="8" name="Text Box 5">
             <a:extLst>
               <a:ext uri="{FF2B5EF4-FFF2-40B4-BE49-F238E27FC236}">
-                <a16:creationId xmlns:a16="http://schemas.microsoft.com/office/drawing/2014/main" xmlns="" id="{C7FF05EB-00AE-4BE3-93DF-752D0B979038}"/>
+                <a16:creationId xmlns="" xmlns:a16="http://schemas.microsoft.com/office/drawing/2014/main" id="{C7FF05EB-00AE-4BE3-93DF-752D0B979038}"/>
               </a:ext>
             </a:extLst>
           </p:cNvPr>
@@ -27935,14 +27935,14 @@
           </a:ln>
           <a:extLst>
             <a:ext uri="{909E8E84-426E-40DD-AFC4-6F175D3DCCD1}">
-              <a14:hiddenFill xmlns:a14="http://schemas.microsoft.com/office/drawing/2010/main" xmlns="">
+              <a14:hiddenFill xmlns="" xmlns:a14="http://schemas.microsoft.com/office/drawing/2010/main">
                 <a:solidFill>
                   <a:srgbClr val="FFFFFF"/>
                 </a:solidFill>
               </a14:hiddenFill>
             </a:ext>
             <a:ext uri="{91240B29-F687-4F45-9708-019B960494DF}">
-              <a14:hiddenLine xmlns:a14="http://schemas.microsoft.com/office/drawing/2010/main" xmlns="" w="9525">
+              <a14:hiddenLine xmlns="" xmlns:a14="http://schemas.microsoft.com/office/drawing/2010/main" w="9525">
                 <a:solidFill>
                   <a:srgbClr val="000000"/>
                 </a:solidFill>
@@ -28610,7 +28610,7 @@
     </p:spTree>
     <p:extLst>
       <p:ext uri="{BB962C8B-B14F-4D97-AF65-F5344CB8AC3E}">
-        <p14:creationId xmlns:p14="http://schemas.microsoft.com/office/powerpoint/2010/main" xmlns="" val="3872755809"/>
+        <p14:creationId xmlns="" xmlns:p14="http://schemas.microsoft.com/office/powerpoint/2010/main" val="3872755809"/>
       </p:ext>
     </p:extLst>
   </p:cSld>
@@ -28815,7 +28815,7 @@
     </p:spTree>
     <p:extLst>
       <p:ext uri="{BB962C8B-B14F-4D97-AF65-F5344CB8AC3E}">
-        <p14:creationId xmlns:p14="http://schemas.microsoft.com/office/powerpoint/2010/main" xmlns="" val="820574166"/>
+        <p14:creationId xmlns="" xmlns:p14="http://schemas.microsoft.com/office/powerpoint/2010/main" val="820574166"/>
       </p:ext>
     </p:extLst>
   </p:cSld>
@@ -28967,7 +28967,7 @@
           <p:cNvPr id="7" name="Oval 4">
             <a:extLst>
               <a:ext uri="{FF2B5EF4-FFF2-40B4-BE49-F238E27FC236}">
-                <a16:creationId xmlns:a16="http://schemas.microsoft.com/office/drawing/2014/main" xmlns="" id="{E361BFF1-E7C9-42E7-AC13-159C52064292}"/>
+                <a16:creationId xmlns="" xmlns:a16="http://schemas.microsoft.com/office/drawing/2014/main" id="{E361BFF1-E7C9-42E7-AC13-159C52064292}"/>
               </a:ext>
             </a:extLst>
           </p:cNvPr>
@@ -29148,7 +29148,7 @@
           <p:cNvPr id="8" name="Oval 5">
             <a:extLst>
               <a:ext uri="{FF2B5EF4-FFF2-40B4-BE49-F238E27FC236}">
-                <a16:creationId xmlns:a16="http://schemas.microsoft.com/office/drawing/2014/main" xmlns="" id="{4BBF4AA0-023B-4580-8E65-717E17AFF0F4}"/>
+                <a16:creationId xmlns="" xmlns:a16="http://schemas.microsoft.com/office/drawing/2014/main" id="{4BBF4AA0-023B-4580-8E65-717E17AFF0F4}"/>
               </a:ext>
             </a:extLst>
           </p:cNvPr>
@@ -29329,7 +29329,7 @@
           <p:cNvPr id="9" name="Line 6">
             <a:extLst>
               <a:ext uri="{FF2B5EF4-FFF2-40B4-BE49-F238E27FC236}">
-                <a16:creationId xmlns:a16="http://schemas.microsoft.com/office/drawing/2014/main" xmlns="" id="{475A24CA-F73E-447F-98E8-EE0976B14B9D}"/>
+                <a16:creationId xmlns="" xmlns:a16="http://schemas.microsoft.com/office/drawing/2014/main" id="{475A24CA-F73E-447F-98E8-EE0976B14B9D}"/>
               </a:ext>
             </a:extLst>
           </p:cNvPr>
@@ -29357,7 +29357,7 @@
           </a:ln>
           <a:extLst>
             <a:ext uri="{909E8E84-426E-40DD-AFC4-6F175D3DCCD1}">
-              <a14:hiddenFill xmlns:a14="http://schemas.microsoft.com/office/drawing/2010/main" xmlns="">
+              <a14:hiddenFill xmlns="" xmlns:a14="http://schemas.microsoft.com/office/drawing/2010/main">
                 <a:noFill/>
               </a14:hiddenFill>
             </a:ext>
@@ -29376,7 +29376,7 @@
           <p:cNvPr id="11" name="Line 7">
             <a:extLst>
               <a:ext uri="{FF2B5EF4-FFF2-40B4-BE49-F238E27FC236}">
-                <a16:creationId xmlns:a16="http://schemas.microsoft.com/office/drawing/2014/main" xmlns="" id="{E22C19E6-97D6-47CE-A49D-A838A9A97447}"/>
+                <a16:creationId xmlns="" xmlns:a16="http://schemas.microsoft.com/office/drawing/2014/main" id="{E22C19E6-97D6-47CE-A49D-A838A9A97447}"/>
               </a:ext>
             </a:extLst>
           </p:cNvPr>
@@ -29404,7 +29404,7 @@
           </a:ln>
           <a:extLst>
             <a:ext uri="{909E8E84-426E-40DD-AFC4-6F175D3DCCD1}">
-              <a14:hiddenFill xmlns:a14="http://schemas.microsoft.com/office/drawing/2010/main" xmlns="">
+              <a14:hiddenFill xmlns="" xmlns:a14="http://schemas.microsoft.com/office/drawing/2010/main">
                 <a:noFill/>
               </a14:hiddenFill>
             </a:ext>
@@ -29423,7 +29423,7 @@
           <p:cNvPr id="13" name="Oval 8">
             <a:extLst>
               <a:ext uri="{FF2B5EF4-FFF2-40B4-BE49-F238E27FC236}">
-                <a16:creationId xmlns:a16="http://schemas.microsoft.com/office/drawing/2014/main" xmlns="" id="{475338BD-A532-4B9D-BE33-396EEC5D774E}"/>
+                <a16:creationId xmlns="" xmlns:a16="http://schemas.microsoft.com/office/drawing/2014/main" id="{475338BD-A532-4B9D-BE33-396EEC5D774E}"/>
               </a:ext>
             </a:extLst>
           </p:cNvPr>
@@ -29604,7 +29604,7 @@
           <p:cNvPr id="14" name="Oval 9">
             <a:extLst>
               <a:ext uri="{FF2B5EF4-FFF2-40B4-BE49-F238E27FC236}">
-                <a16:creationId xmlns:a16="http://schemas.microsoft.com/office/drawing/2014/main" xmlns="" id="{4340F4C8-2171-48C1-A454-C665184FBFBF}"/>
+                <a16:creationId xmlns="" xmlns:a16="http://schemas.microsoft.com/office/drawing/2014/main" id="{4340F4C8-2171-48C1-A454-C665184FBFBF}"/>
               </a:ext>
             </a:extLst>
           </p:cNvPr>
@@ -29785,7 +29785,7 @@
           <p:cNvPr id="15" name="Oval 10">
             <a:extLst>
               <a:ext uri="{FF2B5EF4-FFF2-40B4-BE49-F238E27FC236}">
-                <a16:creationId xmlns:a16="http://schemas.microsoft.com/office/drawing/2014/main" xmlns="" id="{CA023106-11CF-46E0-8BC9-743C8F6D17E7}"/>
+                <a16:creationId xmlns="" xmlns:a16="http://schemas.microsoft.com/office/drawing/2014/main" id="{CA023106-11CF-46E0-8BC9-743C8F6D17E7}"/>
               </a:ext>
             </a:extLst>
           </p:cNvPr>
@@ -29966,7 +29966,7 @@
           <p:cNvPr id="16" name="Line 11">
             <a:extLst>
               <a:ext uri="{FF2B5EF4-FFF2-40B4-BE49-F238E27FC236}">
-                <a16:creationId xmlns:a16="http://schemas.microsoft.com/office/drawing/2014/main" xmlns="" id="{CC6FF9C0-26FC-430E-9553-83F853982AAF}"/>
+                <a16:creationId xmlns="" xmlns:a16="http://schemas.microsoft.com/office/drawing/2014/main" id="{CC6FF9C0-26FC-430E-9553-83F853982AAF}"/>
               </a:ext>
             </a:extLst>
           </p:cNvPr>
@@ -29994,7 +29994,7 @@
           </a:ln>
           <a:extLst>
             <a:ext uri="{909E8E84-426E-40DD-AFC4-6F175D3DCCD1}">
-              <a14:hiddenFill xmlns:a14="http://schemas.microsoft.com/office/drawing/2010/main" xmlns="">
+              <a14:hiddenFill xmlns="" xmlns:a14="http://schemas.microsoft.com/office/drawing/2010/main">
                 <a:noFill/>
               </a14:hiddenFill>
             </a:ext>
@@ -30013,7 +30013,7 @@
           <p:cNvPr id="17" name="Line 12">
             <a:extLst>
               <a:ext uri="{FF2B5EF4-FFF2-40B4-BE49-F238E27FC236}">
-                <a16:creationId xmlns:a16="http://schemas.microsoft.com/office/drawing/2014/main" xmlns="" id="{847AB340-5E45-4AD8-9D6A-D22FCBE722CD}"/>
+                <a16:creationId xmlns="" xmlns:a16="http://schemas.microsoft.com/office/drawing/2014/main" id="{847AB340-5E45-4AD8-9D6A-D22FCBE722CD}"/>
               </a:ext>
             </a:extLst>
           </p:cNvPr>
@@ -30041,7 +30041,7 @@
           </a:ln>
           <a:extLst>
             <a:ext uri="{909E8E84-426E-40DD-AFC4-6F175D3DCCD1}">
-              <a14:hiddenFill xmlns:a14="http://schemas.microsoft.com/office/drawing/2010/main" xmlns="">
+              <a14:hiddenFill xmlns="" xmlns:a14="http://schemas.microsoft.com/office/drawing/2010/main">
                 <a:noFill/>
               </a14:hiddenFill>
             </a:ext>
@@ -30060,7 +30060,7 @@
           <p:cNvPr id="18" name="Line 13">
             <a:extLst>
               <a:ext uri="{FF2B5EF4-FFF2-40B4-BE49-F238E27FC236}">
-                <a16:creationId xmlns:a16="http://schemas.microsoft.com/office/drawing/2014/main" xmlns="" id="{D008EF2E-A427-4A3B-9B90-867374F9EDA2}"/>
+                <a16:creationId xmlns="" xmlns:a16="http://schemas.microsoft.com/office/drawing/2014/main" id="{D008EF2E-A427-4A3B-9B90-867374F9EDA2}"/>
               </a:ext>
             </a:extLst>
           </p:cNvPr>
@@ -30088,7 +30088,7 @@
           </a:ln>
           <a:extLst>
             <a:ext uri="{909E8E84-426E-40DD-AFC4-6F175D3DCCD1}">
-              <a14:hiddenFill xmlns:a14="http://schemas.microsoft.com/office/drawing/2010/main" xmlns="">
+              <a14:hiddenFill xmlns="" xmlns:a14="http://schemas.microsoft.com/office/drawing/2010/main">
                 <a:noFill/>
               </a14:hiddenFill>
             </a:ext>
@@ -30105,7 +30105,7 @@
     </p:spTree>
     <p:extLst>
       <p:ext uri="{BB962C8B-B14F-4D97-AF65-F5344CB8AC3E}">
-        <p14:creationId xmlns:p14="http://schemas.microsoft.com/office/powerpoint/2010/main" xmlns="" val="70777362"/>
+        <p14:creationId xmlns="" xmlns:p14="http://schemas.microsoft.com/office/powerpoint/2010/main" val="70777362"/>
       </p:ext>
     </p:extLst>
   </p:cSld>
@@ -30270,7 +30270,7 @@
     </p:spTree>
     <p:extLst>
       <p:ext uri="{BB962C8B-B14F-4D97-AF65-F5344CB8AC3E}">
-        <p14:creationId xmlns:p14="http://schemas.microsoft.com/office/powerpoint/2010/main" xmlns="" val="257777428"/>
+        <p14:creationId xmlns="" xmlns:p14="http://schemas.microsoft.com/office/powerpoint/2010/main" val="257777428"/>
       </p:ext>
     </p:extLst>
   </p:cSld>
@@ -30405,7 +30405,7 @@
           <p:cNvPr id="4" name="Group 3">
             <a:extLst>
               <a:ext uri="{FF2B5EF4-FFF2-40B4-BE49-F238E27FC236}">
-                <a16:creationId xmlns:a16="http://schemas.microsoft.com/office/drawing/2014/main" xmlns="" id="{5D91B3C9-D26B-444F-8430-46F29A59053F}"/>
+                <a16:creationId xmlns="" xmlns:a16="http://schemas.microsoft.com/office/drawing/2014/main" id="{5D91B3C9-D26B-444F-8430-46F29A59053F}"/>
               </a:ext>
             </a:extLst>
           </p:cNvPr>
@@ -30425,7 +30425,7 @@
             <p:cNvPr id="16" name="AutoShape 9">
               <a:extLst>
                 <a:ext uri="{FF2B5EF4-FFF2-40B4-BE49-F238E27FC236}">
-                  <a16:creationId xmlns:a16="http://schemas.microsoft.com/office/drawing/2014/main" xmlns="" id="{33189353-F7F2-4FA9-999A-2F81AA853AC6}"/>
+                  <a16:creationId xmlns="" xmlns:a16="http://schemas.microsoft.com/office/drawing/2014/main" id="{33189353-F7F2-4FA9-999A-2F81AA853AC6}"/>
                 </a:ext>
               </a:extLst>
             </p:cNvPr>
@@ -30566,7 +30566,7 @@
             <p:cNvPr id="17" name="Text Box 10">
               <a:extLst>
                 <a:ext uri="{FF2B5EF4-FFF2-40B4-BE49-F238E27FC236}">
-                  <a16:creationId xmlns:a16="http://schemas.microsoft.com/office/drawing/2014/main" xmlns="" id="{B0C67384-D2EA-42A6-8E4B-36426D10D84A}"/>
+                  <a16:creationId xmlns="" xmlns:a16="http://schemas.microsoft.com/office/drawing/2014/main" id="{B0C67384-D2EA-42A6-8E4B-36426D10D84A}"/>
                 </a:ext>
               </a:extLst>
             </p:cNvPr>
@@ -30589,14 +30589,14 @@
             </a:ln>
             <a:extLst>
               <a:ext uri="{909E8E84-426E-40DD-AFC4-6F175D3DCCD1}">
-                <a14:hiddenFill xmlns:a14="http://schemas.microsoft.com/office/drawing/2010/main" xmlns="">
+                <a14:hiddenFill xmlns="" xmlns:a14="http://schemas.microsoft.com/office/drawing/2010/main">
                   <a:solidFill>
                     <a:srgbClr val="FFFFFF"/>
                   </a:solidFill>
                 </a14:hiddenFill>
               </a:ext>
               <a:ext uri="{91240B29-F687-4F45-9708-019B960494DF}">
-                <a14:hiddenLine xmlns:a14="http://schemas.microsoft.com/office/drawing/2010/main" xmlns="" w="9525">
+                <a14:hiddenLine xmlns="" xmlns:a14="http://schemas.microsoft.com/office/drawing/2010/main" w="9525">
                   <a:solidFill>
                     <a:srgbClr val="000000"/>
                   </a:solidFill>
@@ -31030,7 +31030,7 @@
           <p:cNvPr id="7" name="Straight Arrow Connector 6">
             <a:extLst>
               <a:ext uri="{FF2B5EF4-FFF2-40B4-BE49-F238E27FC236}">
-                <a16:creationId xmlns:a16="http://schemas.microsoft.com/office/drawing/2014/main" xmlns="" id="{61E5DED6-7720-4D70-8140-18B1A57A859E}"/>
+                <a16:creationId xmlns="" xmlns:a16="http://schemas.microsoft.com/office/drawing/2014/main" id="{61E5DED6-7720-4D70-8140-18B1A57A859E}"/>
               </a:ext>
             </a:extLst>
           </p:cNvPr>
@@ -31074,7 +31074,7 @@
           <p:cNvPr id="13" name="Straight Arrow Connector 12">
             <a:extLst>
               <a:ext uri="{FF2B5EF4-FFF2-40B4-BE49-F238E27FC236}">
-                <a16:creationId xmlns:a16="http://schemas.microsoft.com/office/drawing/2014/main" xmlns="" id="{5385C0F6-FB88-4A38-80F4-3C9A99D2421C}"/>
+                <a16:creationId xmlns="" xmlns:a16="http://schemas.microsoft.com/office/drawing/2014/main" id="{5385C0F6-FB88-4A38-80F4-3C9A99D2421C}"/>
               </a:ext>
             </a:extLst>
           </p:cNvPr>
@@ -31083,7 +31083,7 @@
         </p:nvCxnSpPr>
         <p:spPr>
           <a:xfrm>
-            <a:off x="3793541" y="2541047"/>
+            <a:off x="3454091" y="2541047"/>
             <a:ext cx="0" cy="713105"/>
           </a:xfrm>
           <a:prstGeom prst="straightConnector1">
@@ -31116,7 +31116,7 @@
           <p:cNvPr id="14" name="Straight Arrow Connector 13">
             <a:extLst>
               <a:ext uri="{FF2B5EF4-FFF2-40B4-BE49-F238E27FC236}">
-                <a16:creationId xmlns:a16="http://schemas.microsoft.com/office/drawing/2014/main" xmlns="" id="{ED643DA3-AB98-4220-9665-FFAE77084D13}"/>
+                <a16:creationId xmlns="" xmlns:a16="http://schemas.microsoft.com/office/drawing/2014/main" id="{ED643DA3-AB98-4220-9665-FFAE77084D13}"/>
               </a:ext>
             </a:extLst>
           </p:cNvPr>
@@ -31127,7 +31127,7 @@
         </p:nvCxnSpPr>
         <p:spPr>
           <a:xfrm>
-            <a:off x="4781683" y="2131861"/>
+            <a:off x="4108258" y="2131861"/>
             <a:ext cx="0" cy="1122290"/>
           </a:xfrm>
           <a:prstGeom prst="straightConnector1">
@@ -31160,7 +31160,7 @@
           <p:cNvPr id="15" name="Straight Arrow Connector 14">
             <a:extLst>
               <a:ext uri="{FF2B5EF4-FFF2-40B4-BE49-F238E27FC236}">
-                <a16:creationId xmlns:a16="http://schemas.microsoft.com/office/drawing/2014/main" xmlns="" id="{AD0DFE4D-0E2C-4464-B716-C8D80BA41339}"/>
+                <a16:creationId xmlns="" xmlns:a16="http://schemas.microsoft.com/office/drawing/2014/main" id="{AD0DFE4D-0E2C-4464-B716-C8D80BA41339}"/>
               </a:ext>
             </a:extLst>
           </p:cNvPr>
@@ -31169,7 +31169,7 @@
         </p:nvCxnSpPr>
         <p:spPr>
           <a:xfrm>
-            <a:off x="6143450" y="2541046"/>
+            <a:off x="5021075" y="2541046"/>
             <a:ext cx="0" cy="713105"/>
           </a:xfrm>
           <a:prstGeom prst="straightConnector1">
@@ -31202,7 +31202,7 @@
           <p:cNvPr id="18" name="Straight Arrow Connector 17">
             <a:extLst>
               <a:ext uri="{FF2B5EF4-FFF2-40B4-BE49-F238E27FC236}">
-                <a16:creationId xmlns:a16="http://schemas.microsoft.com/office/drawing/2014/main" xmlns="" id="{44F56871-6817-4FD3-BE71-0F6632BD916D}"/>
+                <a16:creationId xmlns="" xmlns:a16="http://schemas.microsoft.com/office/drawing/2014/main" id="{44F56871-6817-4FD3-BE71-0F6632BD916D}"/>
               </a:ext>
             </a:extLst>
           </p:cNvPr>
@@ -31211,7 +31211,7 @@
         </p:nvCxnSpPr>
         <p:spPr>
           <a:xfrm>
-            <a:off x="8596599" y="2541046"/>
+            <a:off x="7030749" y="2541046"/>
             <a:ext cx="0" cy="713105"/>
           </a:xfrm>
           <a:prstGeom prst="straightConnector1">
@@ -31244,7 +31244,7 @@
           <p:cNvPr id="19" name="Straight Arrow Connector 18">
             <a:extLst>
               <a:ext uri="{FF2B5EF4-FFF2-40B4-BE49-F238E27FC236}">
-                <a16:creationId xmlns:a16="http://schemas.microsoft.com/office/drawing/2014/main" xmlns="" id="{A6B0413A-A877-47B1-98A9-6497B4A00C1A}"/>
+                <a16:creationId xmlns="" xmlns:a16="http://schemas.microsoft.com/office/drawing/2014/main" id="{A6B0413A-A877-47B1-98A9-6497B4A00C1A}"/>
               </a:ext>
             </a:extLst>
           </p:cNvPr>
@@ -31288,7 +31288,7 @@
           <p:cNvPr id="20" name="TextBox 19">
             <a:extLst>
               <a:ext uri="{FF2B5EF4-FFF2-40B4-BE49-F238E27FC236}">
-                <a16:creationId xmlns:a16="http://schemas.microsoft.com/office/drawing/2014/main" xmlns="" id="{3CDFF184-7DC9-44B1-B563-7E8DE80DE88F}"/>
+                <a16:creationId xmlns="" xmlns:a16="http://schemas.microsoft.com/office/drawing/2014/main" id="{3CDFF184-7DC9-44B1-B563-7E8DE80DE88F}"/>
               </a:ext>
             </a:extLst>
           </p:cNvPr>
@@ -31323,7 +31323,7 @@
           <p:cNvPr id="21" name="TextBox 20">
             <a:extLst>
               <a:ext uri="{FF2B5EF4-FFF2-40B4-BE49-F238E27FC236}">
-                <a16:creationId xmlns:a16="http://schemas.microsoft.com/office/drawing/2014/main" xmlns="" id="{5CFE5FD7-5685-44CA-9FC3-CAF541F563A4}"/>
+                <a16:creationId xmlns="" xmlns:a16="http://schemas.microsoft.com/office/drawing/2014/main" id="{5CFE5FD7-5685-44CA-9FC3-CAF541F563A4}"/>
               </a:ext>
             </a:extLst>
           </p:cNvPr>
@@ -31332,7 +31332,7 @@
         </p:nvSpPr>
         <p:spPr>
           <a:xfrm>
-            <a:off x="3087545" y="1954150"/>
+            <a:off x="2748095" y="1954150"/>
             <a:ext cx="2252351" cy="646331"/>
           </a:xfrm>
           <a:prstGeom prst="rect">
@@ -31364,7 +31364,7 @@
           <p:cNvPr id="22" name="TextBox 21">
             <a:extLst>
               <a:ext uri="{FF2B5EF4-FFF2-40B4-BE49-F238E27FC236}">
-                <a16:creationId xmlns:a16="http://schemas.microsoft.com/office/drawing/2014/main" xmlns="" id="{281D3950-4B99-415A-8989-EAE7F3B6D0E2}"/>
+                <a16:creationId xmlns="" xmlns:a16="http://schemas.microsoft.com/office/drawing/2014/main" id="{281D3950-4B99-415A-8989-EAE7F3B6D0E2}"/>
               </a:ext>
             </a:extLst>
           </p:cNvPr>
@@ -31373,7 +31373,7 @@
         </p:nvSpPr>
         <p:spPr>
           <a:xfrm>
-            <a:off x="4423810" y="1485530"/>
+            <a:off x="3750385" y="1485530"/>
             <a:ext cx="1341110" cy="646331"/>
           </a:xfrm>
           <a:prstGeom prst="rect">
@@ -31405,7 +31405,7 @@
           <p:cNvPr id="23" name="TextBox 22">
             <a:extLst>
               <a:ext uri="{FF2B5EF4-FFF2-40B4-BE49-F238E27FC236}">
-                <a16:creationId xmlns:a16="http://schemas.microsoft.com/office/drawing/2014/main" xmlns="" id="{BE342F9D-01C5-43F0-86B2-FBB589D5C1BC}"/>
+                <a16:creationId xmlns="" xmlns:a16="http://schemas.microsoft.com/office/drawing/2014/main" id="{BE342F9D-01C5-43F0-86B2-FBB589D5C1BC}"/>
               </a:ext>
             </a:extLst>
           </p:cNvPr>
@@ -31414,7 +31414,7 @@
         </p:nvSpPr>
         <p:spPr>
           <a:xfrm>
-            <a:off x="5714250" y="1828723"/>
+            <a:off x="4591875" y="1828723"/>
             <a:ext cx="1341110" cy="646331"/>
           </a:xfrm>
           <a:prstGeom prst="rect">
@@ -31446,7 +31446,7 @@
           <p:cNvPr id="24" name="TextBox 23">
             <a:extLst>
               <a:ext uri="{FF2B5EF4-FFF2-40B4-BE49-F238E27FC236}">
-                <a16:creationId xmlns:a16="http://schemas.microsoft.com/office/drawing/2014/main" xmlns="" id="{C90F14E4-1F1B-44D1-8E56-62DD771BFE18}"/>
+                <a16:creationId xmlns="" xmlns:a16="http://schemas.microsoft.com/office/drawing/2014/main" id="{C90F14E4-1F1B-44D1-8E56-62DD771BFE18}"/>
               </a:ext>
             </a:extLst>
           </p:cNvPr>
@@ -31455,7 +31455,7 @@
         </p:nvSpPr>
         <p:spPr>
           <a:xfrm>
-            <a:off x="7450190" y="1847907"/>
+            <a:off x="5884340" y="1847907"/>
             <a:ext cx="2364267" cy="646331"/>
           </a:xfrm>
           <a:prstGeom prst="rect">
@@ -31487,7 +31487,7 @@
           <p:cNvPr id="25" name="TextBox 24">
             <a:extLst>
               <a:ext uri="{FF2B5EF4-FFF2-40B4-BE49-F238E27FC236}">
-                <a16:creationId xmlns:a16="http://schemas.microsoft.com/office/drawing/2014/main" xmlns="" id="{D1CBE011-E170-4BE6-A16D-63D9E6661B0D}"/>
+                <a16:creationId xmlns="" xmlns:a16="http://schemas.microsoft.com/office/drawing/2014/main" id="{D1CBE011-E170-4BE6-A16D-63D9E6661B0D}"/>
               </a:ext>
             </a:extLst>
           </p:cNvPr>
@@ -31526,7 +31526,7 @@
     </p:spTree>
     <p:extLst>
       <p:ext uri="{BB962C8B-B14F-4D97-AF65-F5344CB8AC3E}">
-        <p14:creationId xmlns:p14="http://schemas.microsoft.com/office/powerpoint/2010/main" xmlns="" val="2979522362"/>
+        <p14:creationId xmlns="" xmlns:p14="http://schemas.microsoft.com/office/powerpoint/2010/main" val="2979522362"/>
       </p:ext>
     </p:extLst>
   </p:cSld>
@@ -31685,7 +31685,7 @@
           <p:cNvPr id="16" name="AutoShape 9">
             <a:extLst>
               <a:ext uri="{FF2B5EF4-FFF2-40B4-BE49-F238E27FC236}">
-                <a16:creationId xmlns:a16="http://schemas.microsoft.com/office/drawing/2014/main" xmlns="" id="{33189353-F7F2-4FA9-999A-2F81AA853AC6}"/>
+                <a16:creationId xmlns="" xmlns:a16="http://schemas.microsoft.com/office/drawing/2014/main" id="{33189353-F7F2-4FA9-999A-2F81AA853AC6}"/>
               </a:ext>
             </a:extLst>
           </p:cNvPr>
@@ -31826,7 +31826,7 @@
           <p:cNvPr id="17" name="Text Box 10">
             <a:extLst>
               <a:ext uri="{FF2B5EF4-FFF2-40B4-BE49-F238E27FC236}">
-                <a16:creationId xmlns:a16="http://schemas.microsoft.com/office/drawing/2014/main" xmlns="" id="{B0C67384-D2EA-42A6-8E4B-36426D10D84A}"/>
+                <a16:creationId xmlns="" xmlns:a16="http://schemas.microsoft.com/office/drawing/2014/main" id="{B0C67384-D2EA-42A6-8E4B-36426D10D84A}"/>
               </a:ext>
             </a:extLst>
           </p:cNvPr>
@@ -31849,14 +31849,14 @@
           </a:ln>
           <a:extLst>
             <a:ext uri="{909E8E84-426E-40DD-AFC4-6F175D3DCCD1}">
-              <a14:hiddenFill xmlns:a14="http://schemas.microsoft.com/office/drawing/2010/main" xmlns="">
+              <a14:hiddenFill xmlns="" xmlns:a14="http://schemas.microsoft.com/office/drawing/2010/main">
                 <a:solidFill>
                   <a:srgbClr val="FFFFFF"/>
                 </a:solidFill>
               </a14:hiddenFill>
             </a:ext>
             <a:ext uri="{91240B29-F687-4F45-9708-019B960494DF}">
-              <a14:hiddenLine xmlns:a14="http://schemas.microsoft.com/office/drawing/2010/main" xmlns="" w="9525">
+              <a14:hiddenLine xmlns="" xmlns:a14="http://schemas.microsoft.com/office/drawing/2010/main" w="9525">
                 <a:solidFill>
                   <a:srgbClr val="000000"/>
                 </a:solidFill>
@@ -32380,7 +32380,7 @@
     </p:spTree>
     <p:extLst>
       <p:ext uri="{BB962C8B-B14F-4D97-AF65-F5344CB8AC3E}">
-        <p14:creationId xmlns:p14="http://schemas.microsoft.com/office/powerpoint/2010/main" xmlns="" val="2024809533"/>
+        <p14:creationId xmlns="" xmlns:p14="http://schemas.microsoft.com/office/powerpoint/2010/main" val="2024809533"/>
       </p:ext>
     </p:extLst>
   </p:cSld>
@@ -32584,7 +32584,7 @@
     </p:spTree>
     <p:extLst>
       <p:ext uri="{BB962C8B-B14F-4D97-AF65-F5344CB8AC3E}">
-        <p14:creationId xmlns:p14="http://schemas.microsoft.com/office/powerpoint/2010/main" xmlns="" val="3826898292"/>
+        <p14:creationId xmlns="" xmlns:p14="http://schemas.microsoft.com/office/powerpoint/2010/main" val="3826898292"/>
       </p:ext>
     </p:extLst>
   </p:cSld>
@@ -32719,7 +32719,7 @@
           <p:cNvPr id="5" name="Picture 4">
             <a:extLst>
               <a:ext uri="{FF2B5EF4-FFF2-40B4-BE49-F238E27FC236}">
-                <a16:creationId xmlns:a16="http://schemas.microsoft.com/office/drawing/2014/main" xmlns="" id="{803B4936-45A2-413F-AB8F-8C23C7A392C9}"/>
+                <a16:creationId xmlns="" xmlns:a16="http://schemas.microsoft.com/office/drawing/2014/main" id="{803B4936-45A2-413F-AB8F-8C23C7A392C9}"/>
               </a:ext>
             </a:extLst>
           </p:cNvPr>
@@ -32732,10 +32732,10 @@
           <a:blip r:embed="rId2" cstate="print">
             <a:extLst>
               <a:ext uri="{28A0092B-C50C-407E-A947-70E740481C1C}">
-                <a14:useLocalDpi xmlns:a14="http://schemas.microsoft.com/office/drawing/2010/main" xmlns="" val="0"/>
+                <a14:useLocalDpi xmlns="" xmlns:a14="http://schemas.microsoft.com/office/drawing/2010/main" val="0"/>
               </a:ext>
               <a:ext uri="{837473B0-CC2E-450A-ABE3-18F120FF3D39}">
-                <a1611:picAttrSrcUrl xmlns:a1611="http://schemas.microsoft.com/office/drawing/2016/11/main" xmlns="" r:id="rId3"/>
+                <a1611:picAttrSrcUrl xmlns="" xmlns:a1611="http://schemas.microsoft.com/office/drawing/2016/11/main" r:id="rId3"/>
               </a:ext>
             </a:extLst>
           </a:blip>
@@ -32758,7 +32758,7 @@
           <p:cNvPr id="13" name="Picture 12">
             <a:extLst>
               <a:ext uri="{FF2B5EF4-FFF2-40B4-BE49-F238E27FC236}">
-                <a16:creationId xmlns:a16="http://schemas.microsoft.com/office/drawing/2014/main" xmlns="" id="{27FEF2F8-9EEA-48B5-B21F-E3999BCF99AB}"/>
+                <a16:creationId xmlns="" xmlns:a16="http://schemas.microsoft.com/office/drawing/2014/main" id="{27FEF2F8-9EEA-48B5-B21F-E3999BCF99AB}"/>
               </a:ext>
             </a:extLst>
           </p:cNvPr>
@@ -32771,10 +32771,10 @@
           <a:blip r:embed="rId4" cstate="print">
             <a:extLst>
               <a:ext uri="{28A0092B-C50C-407E-A947-70E740481C1C}">
-                <a14:useLocalDpi xmlns:a14="http://schemas.microsoft.com/office/drawing/2010/main" xmlns="" val="0"/>
+                <a14:useLocalDpi xmlns="" xmlns:a14="http://schemas.microsoft.com/office/drawing/2010/main" val="0"/>
               </a:ext>
               <a:ext uri="{837473B0-CC2E-450A-ABE3-18F120FF3D39}">
-                <a1611:picAttrSrcUrl xmlns:a1611="http://schemas.microsoft.com/office/drawing/2016/11/main" xmlns="" r:id="rId5"/>
+                <a1611:picAttrSrcUrl xmlns="" xmlns:a1611="http://schemas.microsoft.com/office/drawing/2016/11/main" r:id="rId5"/>
               </a:ext>
             </a:extLst>
           </a:blip>
@@ -32797,7 +32797,7 @@
           <p:cNvPr id="15" name="Picture 14">
             <a:extLst>
               <a:ext uri="{FF2B5EF4-FFF2-40B4-BE49-F238E27FC236}">
-                <a16:creationId xmlns:a16="http://schemas.microsoft.com/office/drawing/2014/main" xmlns="" id="{61C04142-3366-49EB-9FEC-88FF5368D17D}"/>
+                <a16:creationId xmlns="" xmlns:a16="http://schemas.microsoft.com/office/drawing/2014/main" id="{61C04142-3366-49EB-9FEC-88FF5368D17D}"/>
               </a:ext>
             </a:extLst>
           </p:cNvPr>
@@ -32810,10 +32810,10 @@
           <a:blip r:embed="rId6" cstate="print">
             <a:extLst>
               <a:ext uri="{28A0092B-C50C-407E-A947-70E740481C1C}">
-                <a14:useLocalDpi xmlns:a14="http://schemas.microsoft.com/office/drawing/2010/main" xmlns="" val="0"/>
+                <a14:useLocalDpi xmlns="" xmlns:a14="http://schemas.microsoft.com/office/drawing/2010/main" val="0"/>
               </a:ext>
               <a:ext uri="{837473B0-CC2E-450A-ABE3-18F120FF3D39}">
-                <a1611:picAttrSrcUrl xmlns:a1611="http://schemas.microsoft.com/office/drawing/2016/11/main" xmlns="" r:id="rId7"/>
+                <a1611:picAttrSrcUrl xmlns="" xmlns:a1611="http://schemas.microsoft.com/office/drawing/2016/11/main" r:id="rId7"/>
               </a:ext>
             </a:extLst>
           </a:blip>
@@ -32834,7 +32834,7 @@
     </p:spTree>
     <p:extLst>
       <p:ext uri="{BB962C8B-B14F-4D97-AF65-F5344CB8AC3E}">
-        <p14:creationId xmlns:p14="http://schemas.microsoft.com/office/powerpoint/2010/main" xmlns="" val="793235412"/>
+        <p14:creationId xmlns="" xmlns:p14="http://schemas.microsoft.com/office/powerpoint/2010/main" val="793235412"/>
       </p:ext>
     </p:extLst>
   </p:cSld>
@@ -32969,7 +32969,7 @@
           <p:cNvPr id="15" name="Picture 14">
             <a:extLst>
               <a:ext uri="{FF2B5EF4-FFF2-40B4-BE49-F238E27FC236}">
-                <a16:creationId xmlns:a16="http://schemas.microsoft.com/office/drawing/2014/main" xmlns="" id="{61C04142-3366-49EB-9FEC-88FF5368D17D}"/>
+                <a16:creationId xmlns="" xmlns:a16="http://schemas.microsoft.com/office/drawing/2014/main" id="{61C04142-3366-49EB-9FEC-88FF5368D17D}"/>
               </a:ext>
             </a:extLst>
           </p:cNvPr>
@@ -32982,10 +32982,10 @@
           <a:blip r:embed="rId2" cstate="print">
             <a:extLst>
               <a:ext uri="{28A0092B-C50C-407E-A947-70E740481C1C}">
-                <a14:useLocalDpi xmlns:a14="http://schemas.microsoft.com/office/drawing/2010/main" xmlns="" val="0"/>
+                <a14:useLocalDpi xmlns="" xmlns:a14="http://schemas.microsoft.com/office/drawing/2010/main" val="0"/>
               </a:ext>
               <a:ext uri="{837473B0-CC2E-450A-ABE3-18F120FF3D39}">
-                <a1611:picAttrSrcUrl xmlns:a1611="http://schemas.microsoft.com/office/drawing/2016/11/main" xmlns="" r:id="rId3"/>
+                <a1611:picAttrSrcUrl xmlns="" xmlns:a1611="http://schemas.microsoft.com/office/drawing/2016/11/main" r:id="rId3"/>
               </a:ext>
             </a:extLst>
           </a:blip>
@@ -33008,7 +33008,7 @@
           <p:cNvPr id="4" name="TextBox 3">
             <a:extLst>
               <a:ext uri="{FF2B5EF4-FFF2-40B4-BE49-F238E27FC236}">
-                <a16:creationId xmlns:a16="http://schemas.microsoft.com/office/drawing/2014/main" xmlns="" id="{065F8F52-C484-420F-8838-9BA9EB24F06F}"/>
+                <a16:creationId xmlns="" xmlns:a16="http://schemas.microsoft.com/office/drawing/2014/main" id="{065F8F52-C484-420F-8838-9BA9EB24F06F}"/>
               </a:ext>
             </a:extLst>
           </p:cNvPr>
@@ -33043,7 +33043,7 @@
           <p:cNvPr id="14" name="TextBox 13">
             <a:extLst>
               <a:ext uri="{FF2B5EF4-FFF2-40B4-BE49-F238E27FC236}">
-                <a16:creationId xmlns:a16="http://schemas.microsoft.com/office/drawing/2014/main" xmlns="" id="{545FB07B-3C17-49FB-8188-00D3D635E234}"/>
+                <a16:creationId xmlns="" xmlns:a16="http://schemas.microsoft.com/office/drawing/2014/main" id="{545FB07B-3C17-49FB-8188-00D3D635E234}"/>
               </a:ext>
             </a:extLst>
           </p:cNvPr>
@@ -33078,7 +33078,7 @@
           <p:cNvPr id="16" name="TextBox 15">
             <a:extLst>
               <a:ext uri="{FF2B5EF4-FFF2-40B4-BE49-F238E27FC236}">
-                <a16:creationId xmlns:a16="http://schemas.microsoft.com/office/drawing/2014/main" xmlns="" id="{FE719AD3-1761-492D-823C-0AA513693A5E}"/>
+                <a16:creationId xmlns="" xmlns:a16="http://schemas.microsoft.com/office/drawing/2014/main" id="{FE719AD3-1761-492D-823C-0AA513693A5E}"/>
               </a:ext>
             </a:extLst>
           </p:cNvPr>
@@ -33113,7 +33113,7 @@
           <p:cNvPr id="17" name="TextBox 16">
             <a:extLst>
               <a:ext uri="{FF2B5EF4-FFF2-40B4-BE49-F238E27FC236}">
-                <a16:creationId xmlns:a16="http://schemas.microsoft.com/office/drawing/2014/main" xmlns="" id="{0AECDDDD-9C69-4208-AA1C-905C5B95F22C}"/>
+                <a16:creationId xmlns="" xmlns:a16="http://schemas.microsoft.com/office/drawing/2014/main" id="{0AECDDDD-9C69-4208-AA1C-905C5B95F22C}"/>
               </a:ext>
             </a:extLst>
           </p:cNvPr>
@@ -33148,7 +33148,7 @@
           <p:cNvPr id="8" name="Straight Arrow Connector 7">
             <a:extLst>
               <a:ext uri="{FF2B5EF4-FFF2-40B4-BE49-F238E27FC236}">
-                <a16:creationId xmlns:a16="http://schemas.microsoft.com/office/drawing/2014/main" xmlns="" id="{8DDBEF33-54E1-493E-BF2F-6C758455DB2F}"/>
+                <a16:creationId xmlns="" xmlns:a16="http://schemas.microsoft.com/office/drawing/2014/main" id="{8DDBEF33-54E1-493E-BF2F-6C758455DB2F}"/>
               </a:ext>
             </a:extLst>
           </p:cNvPr>
@@ -33193,7 +33193,7 @@
           <p:cNvPr id="18" name="Straight Arrow Connector 17">
             <a:extLst>
               <a:ext uri="{FF2B5EF4-FFF2-40B4-BE49-F238E27FC236}">
-                <a16:creationId xmlns:a16="http://schemas.microsoft.com/office/drawing/2014/main" xmlns="" id="{F1E47557-78F8-4490-9DC2-B232D55FD35C}"/>
+                <a16:creationId xmlns="" xmlns:a16="http://schemas.microsoft.com/office/drawing/2014/main" id="{F1E47557-78F8-4490-9DC2-B232D55FD35C}"/>
               </a:ext>
             </a:extLst>
           </p:cNvPr>
@@ -33237,7 +33237,7 @@
           <p:cNvPr id="22" name="Straight Arrow Connector 21">
             <a:extLst>
               <a:ext uri="{FF2B5EF4-FFF2-40B4-BE49-F238E27FC236}">
-                <a16:creationId xmlns:a16="http://schemas.microsoft.com/office/drawing/2014/main" xmlns="" id="{54728F14-6E5A-45E2-AC4A-EFD14011F60B}"/>
+                <a16:creationId xmlns="" xmlns:a16="http://schemas.microsoft.com/office/drawing/2014/main" id="{54728F14-6E5A-45E2-AC4A-EFD14011F60B}"/>
               </a:ext>
             </a:extLst>
           </p:cNvPr>
@@ -33282,7 +33282,7 @@
           <p:cNvPr id="25" name="Straight Arrow Connector 24">
             <a:extLst>
               <a:ext uri="{FF2B5EF4-FFF2-40B4-BE49-F238E27FC236}">
-                <a16:creationId xmlns:a16="http://schemas.microsoft.com/office/drawing/2014/main" xmlns="" id="{D54D66D9-20DA-42BE-9E8F-546A8ED2AA32}"/>
+                <a16:creationId xmlns="" xmlns:a16="http://schemas.microsoft.com/office/drawing/2014/main" id="{D54D66D9-20DA-42BE-9E8F-546A8ED2AA32}"/>
               </a:ext>
             </a:extLst>
           </p:cNvPr>
@@ -33327,7 +33327,7 @@
           <p:cNvPr id="27" name="Straight Arrow Connector 26">
             <a:extLst>
               <a:ext uri="{FF2B5EF4-FFF2-40B4-BE49-F238E27FC236}">
-                <a16:creationId xmlns:a16="http://schemas.microsoft.com/office/drawing/2014/main" xmlns="" id="{104F6FC2-E13D-4097-9667-8F4A154A8D80}"/>
+                <a16:creationId xmlns="" xmlns:a16="http://schemas.microsoft.com/office/drawing/2014/main" id="{104F6FC2-E13D-4097-9667-8F4A154A8D80}"/>
               </a:ext>
             </a:extLst>
           </p:cNvPr>
@@ -33371,7 +33371,7 @@
           <p:cNvPr id="28" name="Straight Arrow Connector 27">
             <a:extLst>
               <a:ext uri="{FF2B5EF4-FFF2-40B4-BE49-F238E27FC236}">
-                <a16:creationId xmlns:a16="http://schemas.microsoft.com/office/drawing/2014/main" xmlns="" id="{29780F90-A07F-4BB0-9F2F-AAC340DC9D38}"/>
+                <a16:creationId xmlns="" xmlns:a16="http://schemas.microsoft.com/office/drawing/2014/main" id="{29780F90-A07F-4BB0-9F2F-AAC340DC9D38}"/>
               </a:ext>
             </a:extLst>
           </p:cNvPr>
@@ -33415,7 +33415,7 @@
           <p:cNvPr id="31" name="TextBox 30">
             <a:extLst>
               <a:ext uri="{FF2B5EF4-FFF2-40B4-BE49-F238E27FC236}">
-                <a16:creationId xmlns:a16="http://schemas.microsoft.com/office/drawing/2014/main" xmlns="" id="{4C6058E9-F453-4FCC-9697-02D88A979F2A}"/>
+                <a16:creationId xmlns="" xmlns:a16="http://schemas.microsoft.com/office/drawing/2014/main" id="{4C6058E9-F453-4FCC-9697-02D88A979F2A}"/>
               </a:ext>
             </a:extLst>
           </p:cNvPr>
@@ -33451,7 +33451,7 @@
           <p:cNvPr id="32" name="TextBox 31">
             <a:extLst>
               <a:ext uri="{FF2B5EF4-FFF2-40B4-BE49-F238E27FC236}">
-                <a16:creationId xmlns:a16="http://schemas.microsoft.com/office/drawing/2014/main" xmlns="" id="{78EDB91B-C071-4D7E-B239-6F5257BFA37A}"/>
+                <a16:creationId xmlns="" xmlns:a16="http://schemas.microsoft.com/office/drawing/2014/main" id="{78EDB91B-C071-4D7E-B239-6F5257BFA37A}"/>
               </a:ext>
             </a:extLst>
           </p:cNvPr>
@@ -33487,7 +33487,7 @@
           <p:cNvPr id="19" name="Group 18">
             <a:extLst>
               <a:ext uri="{FF2B5EF4-FFF2-40B4-BE49-F238E27FC236}">
-                <a16:creationId xmlns:a16="http://schemas.microsoft.com/office/drawing/2014/main" xmlns="" id="{6F513CEE-2FED-431E-B171-29AD4FD8073D}"/>
+                <a16:creationId xmlns="" xmlns:a16="http://schemas.microsoft.com/office/drawing/2014/main" id="{6F513CEE-2FED-431E-B171-29AD4FD8073D}"/>
               </a:ext>
             </a:extLst>
           </p:cNvPr>
@@ -33507,7 +33507,7 @@
             <p:cNvPr id="33" name="Straight Arrow Connector 32">
               <a:extLst>
                 <a:ext uri="{FF2B5EF4-FFF2-40B4-BE49-F238E27FC236}">
-                  <a16:creationId xmlns:a16="http://schemas.microsoft.com/office/drawing/2014/main" xmlns="" id="{760F0522-E927-4EF6-875E-2DADA29693AC}"/>
+                  <a16:creationId xmlns="" xmlns:a16="http://schemas.microsoft.com/office/drawing/2014/main" id="{760F0522-E927-4EF6-875E-2DADA29693AC}"/>
                 </a:ext>
               </a:extLst>
             </p:cNvPr>
@@ -33551,7 +33551,7 @@
             <p:cNvPr id="34" name="TextBox 33">
               <a:extLst>
                 <a:ext uri="{FF2B5EF4-FFF2-40B4-BE49-F238E27FC236}">
-                  <a16:creationId xmlns:a16="http://schemas.microsoft.com/office/drawing/2014/main" xmlns="" id="{E096BC95-CF89-477C-A149-CADD8535D70D}"/>
+                  <a16:creationId xmlns="" xmlns:a16="http://schemas.microsoft.com/office/drawing/2014/main" id="{E096BC95-CF89-477C-A149-CADD8535D70D}"/>
                 </a:ext>
               </a:extLst>
             </p:cNvPr>
@@ -33587,7 +33587,7 @@
             <p:cNvPr id="35" name="Straight Arrow Connector 34">
               <a:extLst>
                 <a:ext uri="{FF2B5EF4-FFF2-40B4-BE49-F238E27FC236}">
-                  <a16:creationId xmlns:a16="http://schemas.microsoft.com/office/drawing/2014/main" xmlns="" id="{16A5DB64-6D02-469B-8ECF-1AC120A06DE3}"/>
+                  <a16:creationId xmlns="" xmlns:a16="http://schemas.microsoft.com/office/drawing/2014/main" id="{16A5DB64-6D02-469B-8ECF-1AC120A06DE3}"/>
                 </a:ext>
               </a:extLst>
             </p:cNvPr>
@@ -33631,7 +33631,7 @@
             <p:cNvPr id="37" name="TextBox 36">
               <a:extLst>
                 <a:ext uri="{FF2B5EF4-FFF2-40B4-BE49-F238E27FC236}">
-                  <a16:creationId xmlns:a16="http://schemas.microsoft.com/office/drawing/2014/main" xmlns="" id="{85C4C53D-D5CB-4E7F-937C-C49212F44A70}"/>
+                  <a16:creationId xmlns="" xmlns:a16="http://schemas.microsoft.com/office/drawing/2014/main" id="{85C4C53D-D5CB-4E7F-937C-C49212F44A70}"/>
                 </a:ext>
               </a:extLst>
             </p:cNvPr>
@@ -33668,7 +33668,7 @@
           <p:cNvPr id="38" name="Straight Arrow Connector 37">
             <a:extLst>
               <a:ext uri="{FF2B5EF4-FFF2-40B4-BE49-F238E27FC236}">
-                <a16:creationId xmlns:a16="http://schemas.microsoft.com/office/drawing/2014/main" xmlns="" id="{5D867792-63F2-4767-BC8D-917B88AC05E1}"/>
+                <a16:creationId xmlns="" xmlns:a16="http://schemas.microsoft.com/office/drawing/2014/main" id="{5D867792-63F2-4767-BC8D-917B88AC05E1}"/>
               </a:ext>
             </a:extLst>
           </p:cNvPr>
@@ -33712,7 +33712,7 @@
           <p:cNvPr id="39" name="TextBox 38">
             <a:extLst>
               <a:ext uri="{FF2B5EF4-FFF2-40B4-BE49-F238E27FC236}">
-                <a16:creationId xmlns:a16="http://schemas.microsoft.com/office/drawing/2014/main" xmlns="" id="{94708DE2-B64C-48F4-8076-59A108D618A6}"/>
+                <a16:creationId xmlns="" xmlns:a16="http://schemas.microsoft.com/office/drawing/2014/main" id="{94708DE2-B64C-48F4-8076-59A108D618A6}"/>
               </a:ext>
             </a:extLst>
           </p:cNvPr>
@@ -33748,7 +33748,7 @@
           <p:cNvPr id="40" name="Straight Arrow Connector 39">
             <a:extLst>
               <a:ext uri="{FF2B5EF4-FFF2-40B4-BE49-F238E27FC236}">
-                <a16:creationId xmlns:a16="http://schemas.microsoft.com/office/drawing/2014/main" xmlns="" id="{5CA8617A-911B-4C68-B5F4-CED221D4F758}"/>
+                <a16:creationId xmlns="" xmlns:a16="http://schemas.microsoft.com/office/drawing/2014/main" id="{5CA8617A-911B-4C68-B5F4-CED221D4F758}"/>
               </a:ext>
             </a:extLst>
           </p:cNvPr>
@@ -33792,7 +33792,7 @@
           <p:cNvPr id="42" name="TextBox 41">
             <a:extLst>
               <a:ext uri="{FF2B5EF4-FFF2-40B4-BE49-F238E27FC236}">
-                <a16:creationId xmlns:a16="http://schemas.microsoft.com/office/drawing/2014/main" xmlns="" id="{10573C7C-31D3-4491-9B05-DACBB0B02145}"/>
+                <a16:creationId xmlns="" xmlns:a16="http://schemas.microsoft.com/office/drawing/2014/main" id="{10573C7C-31D3-4491-9B05-DACBB0B02145}"/>
               </a:ext>
             </a:extLst>
           </p:cNvPr>
@@ -33827,7 +33827,7 @@
           <p:cNvPr id="43" name="Straight Arrow Connector 42">
             <a:extLst>
               <a:ext uri="{FF2B5EF4-FFF2-40B4-BE49-F238E27FC236}">
-                <a16:creationId xmlns:a16="http://schemas.microsoft.com/office/drawing/2014/main" xmlns="" id="{BF01DE0F-75F5-4498-A057-FE68F1F8E4FB}"/>
+                <a16:creationId xmlns="" xmlns:a16="http://schemas.microsoft.com/office/drawing/2014/main" id="{BF01DE0F-75F5-4498-A057-FE68F1F8E4FB}"/>
               </a:ext>
             </a:extLst>
           </p:cNvPr>
@@ -33871,7 +33871,7 @@
           <p:cNvPr id="44" name="TextBox 43">
             <a:extLst>
               <a:ext uri="{FF2B5EF4-FFF2-40B4-BE49-F238E27FC236}">
-                <a16:creationId xmlns:a16="http://schemas.microsoft.com/office/drawing/2014/main" xmlns="" id="{21D961B1-8920-45A2-B7B6-24C52F68A83D}"/>
+                <a16:creationId xmlns="" xmlns:a16="http://schemas.microsoft.com/office/drawing/2014/main" id="{21D961B1-8920-45A2-B7B6-24C52F68A83D}"/>
               </a:ext>
             </a:extLst>
           </p:cNvPr>
@@ -33907,7 +33907,7 @@
           <p:cNvPr id="45" name="Straight Arrow Connector 44">
             <a:extLst>
               <a:ext uri="{FF2B5EF4-FFF2-40B4-BE49-F238E27FC236}">
-                <a16:creationId xmlns:a16="http://schemas.microsoft.com/office/drawing/2014/main" xmlns="" id="{C1FAEF9C-B2F6-4215-9812-69CE9F14BAFC}"/>
+                <a16:creationId xmlns="" xmlns:a16="http://schemas.microsoft.com/office/drawing/2014/main" id="{C1FAEF9C-B2F6-4215-9812-69CE9F14BAFC}"/>
               </a:ext>
             </a:extLst>
           </p:cNvPr>
@@ -33951,7 +33951,7 @@
           <p:cNvPr id="47" name="TextBox 46">
             <a:extLst>
               <a:ext uri="{FF2B5EF4-FFF2-40B4-BE49-F238E27FC236}">
-                <a16:creationId xmlns:a16="http://schemas.microsoft.com/office/drawing/2014/main" xmlns="" id="{5B05E545-DCBA-4D82-8B24-9CA55C349478}"/>
+                <a16:creationId xmlns="" xmlns:a16="http://schemas.microsoft.com/office/drawing/2014/main" id="{5B05E545-DCBA-4D82-8B24-9CA55C349478}"/>
               </a:ext>
             </a:extLst>
           </p:cNvPr>
@@ -33986,7 +33986,7 @@
           <p:cNvPr id="48" name="Straight Arrow Connector 47">
             <a:extLst>
               <a:ext uri="{FF2B5EF4-FFF2-40B4-BE49-F238E27FC236}">
-                <a16:creationId xmlns:a16="http://schemas.microsoft.com/office/drawing/2014/main" xmlns="" id="{3598B223-2123-426C-8451-717BE628A163}"/>
+                <a16:creationId xmlns="" xmlns:a16="http://schemas.microsoft.com/office/drawing/2014/main" id="{3598B223-2123-426C-8451-717BE628A163}"/>
               </a:ext>
             </a:extLst>
           </p:cNvPr>
@@ -34031,7 +34031,7 @@
           <p:cNvPr id="50" name="TextBox 49">
             <a:extLst>
               <a:ext uri="{FF2B5EF4-FFF2-40B4-BE49-F238E27FC236}">
-                <a16:creationId xmlns:a16="http://schemas.microsoft.com/office/drawing/2014/main" xmlns="" id="{548A5FC5-8E8D-4334-94CA-553E93958E21}"/>
+                <a16:creationId xmlns="" xmlns:a16="http://schemas.microsoft.com/office/drawing/2014/main" id="{548A5FC5-8E8D-4334-94CA-553E93958E21}"/>
               </a:ext>
             </a:extLst>
           </p:cNvPr>
@@ -34066,7 +34066,7 @@
           <p:cNvPr id="53" name="Straight Arrow Connector 52">
             <a:extLst>
               <a:ext uri="{FF2B5EF4-FFF2-40B4-BE49-F238E27FC236}">
-                <a16:creationId xmlns:a16="http://schemas.microsoft.com/office/drawing/2014/main" xmlns="" id="{90BB1FB3-601E-4C1C-B25F-639594D36DF0}"/>
+                <a16:creationId xmlns="" xmlns:a16="http://schemas.microsoft.com/office/drawing/2014/main" id="{90BB1FB3-601E-4C1C-B25F-639594D36DF0}"/>
               </a:ext>
             </a:extLst>
           </p:cNvPr>
@@ -34110,7 +34110,7 @@
           <p:cNvPr id="56" name="TextBox 55">
             <a:extLst>
               <a:ext uri="{FF2B5EF4-FFF2-40B4-BE49-F238E27FC236}">
-                <a16:creationId xmlns:a16="http://schemas.microsoft.com/office/drawing/2014/main" xmlns="" id="{126170BE-DBB8-41CA-A9D4-23D0210E7F14}"/>
+                <a16:creationId xmlns="" xmlns:a16="http://schemas.microsoft.com/office/drawing/2014/main" id="{126170BE-DBB8-41CA-A9D4-23D0210E7F14}"/>
               </a:ext>
             </a:extLst>
           </p:cNvPr>
@@ -34145,7 +34145,7 @@
           <p:cNvPr id="57" name="Straight Arrow Connector 56">
             <a:extLst>
               <a:ext uri="{FF2B5EF4-FFF2-40B4-BE49-F238E27FC236}">
-                <a16:creationId xmlns:a16="http://schemas.microsoft.com/office/drawing/2014/main" xmlns="" id="{B0C578F6-714B-4824-9ECE-5015FB620964}"/>
+                <a16:creationId xmlns="" xmlns:a16="http://schemas.microsoft.com/office/drawing/2014/main" id="{B0C578F6-714B-4824-9ECE-5015FB620964}"/>
               </a:ext>
             </a:extLst>
           </p:cNvPr>
@@ -34189,7 +34189,7 @@
           <p:cNvPr id="58" name="Straight Arrow Connector 57">
             <a:extLst>
               <a:ext uri="{FF2B5EF4-FFF2-40B4-BE49-F238E27FC236}">
-                <a16:creationId xmlns:a16="http://schemas.microsoft.com/office/drawing/2014/main" xmlns="" id="{850D419C-9C5F-43B0-9494-8C763B70C8D8}"/>
+                <a16:creationId xmlns="" xmlns:a16="http://schemas.microsoft.com/office/drawing/2014/main" id="{850D419C-9C5F-43B0-9494-8C763B70C8D8}"/>
               </a:ext>
             </a:extLst>
           </p:cNvPr>
@@ -34233,7 +34233,7 @@
           <p:cNvPr id="60" name="TextBox 59">
             <a:extLst>
               <a:ext uri="{FF2B5EF4-FFF2-40B4-BE49-F238E27FC236}">
-                <a16:creationId xmlns:a16="http://schemas.microsoft.com/office/drawing/2014/main" xmlns="" id="{00FCB261-BF63-40FC-B508-C6E3BDD9E269}"/>
+                <a16:creationId xmlns="" xmlns:a16="http://schemas.microsoft.com/office/drawing/2014/main" id="{00FCB261-BF63-40FC-B508-C6E3BDD9E269}"/>
               </a:ext>
             </a:extLst>
           </p:cNvPr>
@@ -34268,7 +34268,7 @@
           <p:cNvPr id="61" name="TextBox 60">
             <a:extLst>
               <a:ext uri="{FF2B5EF4-FFF2-40B4-BE49-F238E27FC236}">
-                <a16:creationId xmlns:a16="http://schemas.microsoft.com/office/drawing/2014/main" xmlns="" id="{9F61E270-C94A-40B7-A722-8E8BDDC11047}"/>
+                <a16:creationId xmlns="" xmlns:a16="http://schemas.microsoft.com/office/drawing/2014/main" id="{9F61E270-C94A-40B7-A722-8E8BDDC11047}"/>
               </a:ext>
             </a:extLst>
           </p:cNvPr>
@@ -34304,7 +34304,7 @@
           <p:cNvPr id="62" name="Straight Arrow Connector 61">
             <a:extLst>
               <a:ext uri="{FF2B5EF4-FFF2-40B4-BE49-F238E27FC236}">
-                <a16:creationId xmlns:a16="http://schemas.microsoft.com/office/drawing/2014/main" xmlns="" id="{CFF82DD4-5FF5-4264-902D-D7599D1875D6}"/>
+                <a16:creationId xmlns="" xmlns:a16="http://schemas.microsoft.com/office/drawing/2014/main" id="{CFF82DD4-5FF5-4264-902D-D7599D1875D6}"/>
               </a:ext>
             </a:extLst>
           </p:cNvPr>
@@ -34348,7 +34348,7 @@
           <p:cNvPr id="63" name="Straight Arrow Connector 62">
             <a:extLst>
               <a:ext uri="{FF2B5EF4-FFF2-40B4-BE49-F238E27FC236}">
-                <a16:creationId xmlns:a16="http://schemas.microsoft.com/office/drawing/2014/main" xmlns="" id="{D0F66810-2AF9-4236-95FB-FFBF82C4FD8E}"/>
+                <a16:creationId xmlns="" xmlns:a16="http://schemas.microsoft.com/office/drawing/2014/main" id="{D0F66810-2AF9-4236-95FB-FFBF82C4FD8E}"/>
               </a:ext>
             </a:extLst>
           </p:cNvPr>
@@ -34392,7 +34392,7 @@
           <p:cNvPr id="65" name="TextBox 64">
             <a:extLst>
               <a:ext uri="{FF2B5EF4-FFF2-40B4-BE49-F238E27FC236}">
-                <a16:creationId xmlns:a16="http://schemas.microsoft.com/office/drawing/2014/main" xmlns="" id="{83B2A0EA-96AE-46DE-9582-415750498B5B}"/>
+                <a16:creationId xmlns="" xmlns:a16="http://schemas.microsoft.com/office/drawing/2014/main" id="{83B2A0EA-96AE-46DE-9582-415750498B5B}"/>
               </a:ext>
             </a:extLst>
           </p:cNvPr>
@@ -34428,7 +34428,7 @@
           <p:cNvPr id="66" name="TextBox 65">
             <a:extLst>
               <a:ext uri="{FF2B5EF4-FFF2-40B4-BE49-F238E27FC236}">
-                <a16:creationId xmlns:a16="http://schemas.microsoft.com/office/drawing/2014/main" xmlns="" id="{D520A455-DE89-4DDE-8FC6-85DD4E5E4D49}"/>
+                <a16:creationId xmlns="" xmlns:a16="http://schemas.microsoft.com/office/drawing/2014/main" id="{D520A455-DE89-4DDE-8FC6-85DD4E5E4D49}"/>
               </a:ext>
             </a:extLst>
           </p:cNvPr>
@@ -34464,7 +34464,7 @@
           <p:cNvPr id="46" name="TextBox 45">
             <a:extLst>
               <a:ext uri="{FF2B5EF4-FFF2-40B4-BE49-F238E27FC236}">
-                <a16:creationId xmlns:a16="http://schemas.microsoft.com/office/drawing/2014/main" xmlns="" id="{AED62D3E-1C93-4BB9-81AF-99B4E63BC8E3}"/>
+                <a16:creationId xmlns="" xmlns:a16="http://schemas.microsoft.com/office/drawing/2014/main" id="{AED62D3E-1C93-4BB9-81AF-99B4E63BC8E3}"/>
               </a:ext>
             </a:extLst>
           </p:cNvPr>
@@ -34501,7 +34501,7 @@
     </p:spTree>
     <p:extLst>
       <p:ext uri="{BB962C8B-B14F-4D97-AF65-F5344CB8AC3E}">
-        <p14:creationId xmlns:p14="http://schemas.microsoft.com/office/powerpoint/2010/main" xmlns="" val="2779966150"/>
+        <p14:creationId xmlns="" xmlns:p14="http://schemas.microsoft.com/office/powerpoint/2010/main" val="2779966150"/>
       </p:ext>
     </p:extLst>
   </p:cSld>
@@ -34533,7 +34533,7 @@
           <p:cNvPr id="7" name="Picture 6">
             <a:extLst>
               <a:ext uri="{FF2B5EF4-FFF2-40B4-BE49-F238E27FC236}">
-                <a16:creationId xmlns:a16="http://schemas.microsoft.com/office/drawing/2014/main" xmlns="" id="{CBE07435-6B16-411D-BE0D-FB61038A8F09}"/>
+                <a16:creationId xmlns="" xmlns:a16="http://schemas.microsoft.com/office/drawing/2014/main" id="{CBE07435-6B16-411D-BE0D-FB61038A8F09}"/>
               </a:ext>
             </a:extLst>
           </p:cNvPr>
@@ -34546,10 +34546,10 @@
           <a:blip r:embed="rId2" cstate="print">
             <a:extLst>
               <a:ext uri="{28A0092B-C50C-407E-A947-70E740481C1C}">
-                <a14:useLocalDpi xmlns:a14="http://schemas.microsoft.com/office/drawing/2010/main" xmlns="" val="0"/>
+                <a14:useLocalDpi xmlns="" xmlns:a14="http://schemas.microsoft.com/office/drawing/2010/main" val="0"/>
               </a:ext>
               <a:ext uri="{837473B0-CC2E-450A-ABE3-18F120FF3D39}">
-                <a1611:picAttrSrcUrl xmlns:a1611="http://schemas.microsoft.com/office/drawing/2016/11/main" xmlns="" r:id="rId3"/>
+                <a1611:picAttrSrcUrl xmlns="" xmlns:a1611="http://schemas.microsoft.com/office/drawing/2016/11/main" r:id="rId3"/>
               </a:ext>
             </a:extLst>
           </a:blip>
@@ -34675,7 +34675,7 @@
           <p:cNvPr id="4" name="TextBox 3">
             <a:extLst>
               <a:ext uri="{FF2B5EF4-FFF2-40B4-BE49-F238E27FC236}">
-                <a16:creationId xmlns:a16="http://schemas.microsoft.com/office/drawing/2014/main" xmlns="" id="{065F8F52-C484-420F-8838-9BA9EB24F06F}"/>
+                <a16:creationId xmlns="" xmlns:a16="http://schemas.microsoft.com/office/drawing/2014/main" id="{065F8F52-C484-420F-8838-9BA9EB24F06F}"/>
               </a:ext>
             </a:extLst>
           </p:cNvPr>
@@ -34710,7 +34710,7 @@
           <p:cNvPr id="14" name="TextBox 13">
             <a:extLst>
               <a:ext uri="{FF2B5EF4-FFF2-40B4-BE49-F238E27FC236}">
-                <a16:creationId xmlns:a16="http://schemas.microsoft.com/office/drawing/2014/main" xmlns="" id="{545FB07B-3C17-49FB-8188-00D3D635E234}"/>
+                <a16:creationId xmlns="" xmlns:a16="http://schemas.microsoft.com/office/drawing/2014/main" id="{545FB07B-3C17-49FB-8188-00D3D635E234}"/>
               </a:ext>
             </a:extLst>
           </p:cNvPr>
@@ -34746,7 +34746,7 @@
           <p:cNvPr id="16" name="TextBox 15">
             <a:extLst>
               <a:ext uri="{FF2B5EF4-FFF2-40B4-BE49-F238E27FC236}">
-                <a16:creationId xmlns:a16="http://schemas.microsoft.com/office/drawing/2014/main" xmlns="" id="{FE719AD3-1761-492D-823C-0AA513693A5E}"/>
+                <a16:creationId xmlns="" xmlns:a16="http://schemas.microsoft.com/office/drawing/2014/main" id="{FE719AD3-1761-492D-823C-0AA513693A5E}"/>
               </a:ext>
             </a:extLst>
           </p:cNvPr>
@@ -34781,7 +34781,7 @@
           <p:cNvPr id="18" name="Straight Arrow Connector 17">
             <a:extLst>
               <a:ext uri="{FF2B5EF4-FFF2-40B4-BE49-F238E27FC236}">
-                <a16:creationId xmlns:a16="http://schemas.microsoft.com/office/drawing/2014/main" xmlns="" id="{F1E47557-78F8-4490-9DC2-B232D55FD35C}"/>
+                <a16:creationId xmlns="" xmlns:a16="http://schemas.microsoft.com/office/drawing/2014/main" id="{F1E47557-78F8-4490-9DC2-B232D55FD35C}"/>
               </a:ext>
             </a:extLst>
           </p:cNvPr>
@@ -34825,7 +34825,7 @@
           <p:cNvPr id="22" name="Straight Arrow Connector 21">
             <a:extLst>
               <a:ext uri="{FF2B5EF4-FFF2-40B4-BE49-F238E27FC236}">
-                <a16:creationId xmlns:a16="http://schemas.microsoft.com/office/drawing/2014/main" xmlns="" id="{54728F14-6E5A-45E2-AC4A-EFD14011F60B}"/>
+                <a16:creationId xmlns="" xmlns:a16="http://schemas.microsoft.com/office/drawing/2014/main" id="{54728F14-6E5A-45E2-AC4A-EFD14011F60B}"/>
               </a:ext>
             </a:extLst>
           </p:cNvPr>
@@ -34870,7 +34870,7 @@
           <p:cNvPr id="25" name="Straight Arrow Connector 24">
             <a:extLst>
               <a:ext uri="{FF2B5EF4-FFF2-40B4-BE49-F238E27FC236}">
-                <a16:creationId xmlns:a16="http://schemas.microsoft.com/office/drawing/2014/main" xmlns="" id="{D54D66D9-20DA-42BE-9E8F-546A8ED2AA32}"/>
+                <a16:creationId xmlns="" xmlns:a16="http://schemas.microsoft.com/office/drawing/2014/main" id="{D54D66D9-20DA-42BE-9E8F-546A8ED2AA32}"/>
               </a:ext>
             </a:extLst>
           </p:cNvPr>
@@ -34915,7 +34915,7 @@
           <p:cNvPr id="19" name="Group 18">
             <a:extLst>
               <a:ext uri="{FF2B5EF4-FFF2-40B4-BE49-F238E27FC236}">
-                <a16:creationId xmlns:a16="http://schemas.microsoft.com/office/drawing/2014/main" xmlns="" id="{6F513CEE-2FED-431E-B171-29AD4FD8073D}"/>
+                <a16:creationId xmlns="" xmlns:a16="http://schemas.microsoft.com/office/drawing/2014/main" id="{6F513CEE-2FED-431E-B171-29AD4FD8073D}"/>
               </a:ext>
             </a:extLst>
           </p:cNvPr>
@@ -34935,7 +34935,7 @@
             <p:cNvPr id="33" name="Straight Arrow Connector 32">
               <a:extLst>
                 <a:ext uri="{FF2B5EF4-FFF2-40B4-BE49-F238E27FC236}">
-                  <a16:creationId xmlns:a16="http://schemas.microsoft.com/office/drawing/2014/main" xmlns="" id="{760F0522-E927-4EF6-875E-2DADA29693AC}"/>
+                  <a16:creationId xmlns="" xmlns:a16="http://schemas.microsoft.com/office/drawing/2014/main" id="{760F0522-E927-4EF6-875E-2DADA29693AC}"/>
                 </a:ext>
               </a:extLst>
             </p:cNvPr>
@@ -34979,7 +34979,7 @@
             <p:cNvPr id="34" name="TextBox 33">
               <a:extLst>
                 <a:ext uri="{FF2B5EF4-FFF2-40B4-BE49-F238E27FC236}">
-                  <a16:creationId xmlns:a16="http://schemas.microsoft.com/office/drawing/2014/main" xmlns="" id="{E096BC95-CF89-477C-A149-CADD8535D70D}"/>
+                  <a16:creationId xmlns="" xmlns:a16="http://schemas.microsoft.com/office/drawing/2014/main" id="{E096BC95-CF89-477C-A149-CADD8535D70D}"/>
                 </a:ext>
               </a:extLst>
             </p:cNvPr>
@@ -35014,7 +35014,7 @@
             <p:cNvPr id="35" name="Straight Arrow Connector 34">
               <a:extLst>
                 <a:ext uri="{FF2B5EF4-FFF2-40B4-BE49-F238E27FC236}">
-                  <a16:creationId xmlns:a16="http://schemas.microsoft.com/office/drawing/2014/main" xmlns="" id="{16A5DB64-6D02-469B-8ECF-1AC120A06DE3}"/>
+                  <a16:creationId xmlns="" xmlns:a16="http://schemas.microsoft.com/office/drawing/2014/main" id="{16A5DB64-6D02-469B-8ECF-1AC120A06DE3}"/>
                 </a:ext>
               </a:extLst>
             </p:cNvPr>
@@ -35058,7 +35058,7 @@
             <p:cNvPr id="37" name="TextBox 36">
               <a:extLst>
                 <a:ext uri="{FF2B5EF4-FFF2-40B4-BE49-F238E27FC236}">
-                  <a16:creationId xmlns:a16="http://schemas.microsoft.com/office/drawing/2014/main" xmlns="" id="{85C4C53D-D5CB-4E7F-937C-C49212F44A70}"/>
+                  <a16:creationId xmlns="" xmlns:a16="http://schemas.microsoft.com/office/drawing/2014/main" id="{85C4C53D-D5CB-4E7F-937C-C49212F44A70}"/>
                 </a:ext>
               </a:extLst>
             </p:cNvPr>
@@ -35094,7 +35094,7 @@
           <p:cNvPr id="49" name="TextBox 48">
             <a:extLst>
               <a:ext uri="{FF2B5EF4-FFF2-40B4-BE49-F238E27FC236}">
-                <a16:creationId xmlns:a16="http://schemas.microsoft.com/office/drawing/2014/main" xmlns="" id="{AD4E479C-C7D3-4FA7-8EE4-DA3F6846CEBF}"/>
+                <a16:creationId xmlns="" xmlns:a16="http://schemas.microsoft.com/office/drawing/2014/main" id="{AD4E479C-C7D3-4FA7-8EE4-DA3F6846CEBF}"/>
               </a:ext>
             </a:extLst>
           </p:cNvPr>
@@ -35129,7 +35129,7 @@
           <p:cNvPr id="51" name="Straight Arrow Connector 50">
             <a:extLst>
               <a:ext uri="{FF2B5EF4-FFF2-40B4-BE49-F238E27FC236}">
-                <a16:creationId xmlns:a16="http://schemas.microsoft.com/office/drawing/2014/main" xmlns="" id="{B7A35247-303C-440E-9EF8-CFF4A62CB795}"/>
+                <a16:creationId xmlns="" xmlns:a16="http://schemas.microsoft.com/office/drawing/2014/main" id="{B7A35247-303C-440E-9EF8-CFF4A62CB795}"/>
               </a:ext>
             </a:extLst>
           </p:cNvPr>
@@ -35173,7 +35173,7 @@
           <p:cNvPr id="52" name="TextBox 51">
             <a:extLst>
               <a:ext uri="{FF2B5EF4-FFF2-40B4-BE49-F238E27FC236}">
-                <a16:creationId xmlns:a16="http://schemas.microsoft.com/office/drawing/2014/main" xmlns="" id="{D2456DF6-62CB-4E4B-B3FA-997F2B3B16E6}"/>
+                <a16:creationId xmlns="" xmlns:a16="http://schemas.microsoft.com/office/drawing/2014/main" id="{D2456DF6-62CB-4E4B-B3FA-997F2B3B16E6}"/>
               </a:ext>
             </a:extLst>
           </p:cNvPr>
@@ -35208,7 +35208,7 @@
           <p:cNvPr id="54" name="Straight Arrow Connector 53">
             <a:extLst>
               <a:ext uri="{FF2B5EF4-FFF2-40B4-BE49-F238E27FC236}">
-                <a16:creationId xmlns:a16="http://schemas.microsoft.com/office/drawing/2014/main" xmlns="" id="{1958F21B-DD9D-4F87-A9FC-CBF5255F1B3C}"/>
+                <a16:creationId xmlns="" xmlns:a16="http://schemas.microsoft.com/office/drawing/2014/main" id="{1958F21B-DD9D-4F87-A9FC-CBF5255F1B3C}"/>
               </a:ext>
             </a:extLst>
           </p:cNvPr>
@@ -35253,7 +35253,7 @@
           <p:cNvPr id="55" name="TextBox 54">
             <a:extLst>
               <a:ext uri="{FF2B5EF4-FFF2-40B4-BE49-F238E27FC236}">
-                <a16:creationId xmlns:a16="http://schemas.microsoft.com/office/drawing/2014/main" xmlns="" id="{E7E4DA4C-EC3A-4ACF-8EBB-A00C0F8FF55E}"/>
+                <a16:creationId xmlns="" xmlns:a16="http://schemas.microsoft.com/office/drawing/2014/main" id="{E7E4DA4C-EC3A-4ACF-8EBB-A00C0F8FF55E}"/>
               </a:ext>
             </a:extLst>
           </p:cNvPr>
@@ -35288,7 +35288,7 @@
           <p:cNvPr id="59" name="Straight Arrow Connector 58">
             <a:extLst>
               <a:ext uri="{FF2B5EF4-FFF2-40B4-BE49-F238E27FC236}">
-                <a16:creationId xmlns:a16="http://schemas.microsoft.com/office/drawing/2014/main" xmlns="" id="{0CC8607E-5F22-4E9F-A601-DE0D6E1F20A4}"/>
+                <a16:creationId xmlns="" xmlns:a16="http://schemas.microsoft.com/office/drawing/2014/main" id="{0CC8607E-5F22-4E9F-A601-DE0D6E1F20A4}"/>
               </a:ext>
             </a:extLst>
           </p:cNvPr>
@@ -35333,7 +35333,7 @@
           <p:cNvPr id="64" name="Straight Arrow Connector 63">
             <a:extLst>
               <a:ext uri="{FF2B5EF4-FFF2-40B4-BE49-F238E27FC236}">
-                <a16:creationId xmlns:a16="http://schemas.microsoft.com/office/drawing/2014/main" xmlns="" id="{71FB8733-BFA2-4CDB-98C3-F2442114AFB8}"/>
+                <a16:creationId xmlns="" xmlns:a16="http://schemas.microsoft.com/office/drawing/2014/main" id="{71FB8733-BFA2-4CDB-98C3-F2442114AFB8}"/>
               </a:ext>
             </a:extLst>
           </p:cNvPr>
@@ -35378,7 +35378,7 @@
           <p:cNvPr id="67" name="TextBox 66">
             <a:extLst>
               <a:ext uri="{FF2B5EF4-FFF2-40B4-BE49-F238E27FC236}">
-                <a16:creationId xmlns:a16="http://schemas.microsoft.com/office/drawing/2014/main" xmlns="" id="{DC0BFD13-F3B3-4BCC-8F72-4820D3CA3F2F}"/>
+                <a16:creationId xmlns="" xmlns:a16="http://schemas.microsoft.com/office/drawing/2014/main" id="{DC0BFD13-F3B3-4BCC-8F72-4820D3CA3F2F}"/>
               </a:ext>
             </a:extLst>
           </p:cNvPr>
@@ -35413,7 +35413,7 @@
           <p:cNvPr id="78" name="Group 77">
             <a:extLst>
               <a:ext uri="{FF2B5EF4-FFF2-40B4-BE49-F238E27FC236}">
-                <a16:creationId xmlns:a16="http://schemas.microsoft.com/office/drawing/2014/main" xmlns="" id="{B0D8A55A-C35F-4DD8-A7AC-42C2A2C91E9E}"/>
+                <a16:creationId xmlns="" xmlns:a16="http://schemas.microsoft.com/office/drawing/2014/main" id="{B0D8A55A-C35F-4DD8-A7AC-42C2A2C91E9E}"/>
               </a:ext>
             </a:extLst>
           </p:cNvPr>
@@ -35433,7 +35433,7 @@
             <p:cNvPr id="17" name="TextBox 16">
               <a:extLst>
                 <a:ext uri="{FF2B5EF4-FFF2-40B4-BE49-F238E27FC236}">
-                  <a16:creationId xmlns:a16="http://schemas.microsoft.com/office/drawing/2014/main" xmlns="" id="{0AECDDDD-9C69-4208-AA1C-905C5B95F22C}"/>
+                  <a16:creationId xmlns="" xmlns:a16="http://schemas.microsoft.com/office/drawing/2014/main" id="{0AECDDDD-9C69-4208-AA1C-905C5B95F22C}"/>
                 </a:ext>
               </a:extLst>
             </p:cNvPr>
@@ -35468,7 +35468,7 @@
             <p:cNvPr id="8" name="Straight Arrow Connector 7">
               <a:extLst>
                 <a:ext uri="{FF2B5EF4-FFF2-40B4-BE49-F238E27FC236}">
-                  <a16:creationId xmlns:a16="http://schemas.microsoft.com/office/drawing/2014/main" xmlns="" id="{8DDBEF33-54E1-493E-BF2F-6C758455DB2F}"/>
+                  <a16:creationId xmlns="" xmlns:a16="http://schemas.microsoft.com/office/drawing/2014/main" id="{8DDBEF33-54E1-493E-BF2F-6C758455DB2F}"/>
                 </a:ext>
               </a:extLst>
             </p:cNvPr>
@@ -35513,7 +35513,7 @@
             <p:cNvPr id="29" name="Group 28">
               <a:extLst>
                 <a:ext uri="{FF2B5EF4-FFF2-40B4-BE49-F238E27FC236}">
-                  <a16:creationId xmlns:a16="http://schemas.microsoft.com/office/drawing/2014/main" xmlns="" id="{E0A9ECB2-F47D-41E6-A396-253B7A4ED88E}"/>
+                  <a16:creationId xmlns="" xmlns:a16="http://schemas.microsoft.com/office/drawing/2014/main" id="{E0A9ECB2-F47D-41E6-A396-253B7A4ED88E}"/>
                 </a:ext>
               </a:extLst>
             </p:cNvPr>
@@ -35533,7 +35533,7 @@
               <p:cNvPr id="27" name="Straight Arrow Connector 26">
                 <a:extLst>
                   <a:ext uri="{FF2B5EF4-FFF2-40B4-BE49-F238E27FC236}">
-                    <a16:creationId xmlns:a16="http://schemas.microsoft.com/office/drawing/2014/main" xmlns="" id="{104F6FC2-E13D-4097-9667-8F4A154A8D80}"/>
+                    <a16:creationId xmlns="" xmlns:a16="http://schemas.microsoft.com/office/drawing/2014/main" id="{104F6FC2-E13D-4097-9667-8F4A154A8D80}"/>
                   </a:ext>
                 </a:extLst>
               </p:cNvPr>
@@ -35577,7 +35577,7 @@
               <p:cNvPr id="28" name="Straight Arrow Connector 27">
                 <a:extLst>
                   <a:ext uri="{FF2B5EF4-FFF2-40B4-BE49-F238E27FC236}">
-                    <a16:creationId xmlns:a16="http://schemas.microsoft.com/office/drawing/2014/main" xmlns="" id="{29780F90-A07F-4BB0-9F2F-AAC340DC9D38}"/>
+                    <a16:creationId xmlns="" xmlns:a16="http://schemas.microsoft.com/office/drawing/2014/main" id="{29780F90-A07F-4BB0-9F2F-AAC340DC9D38}"/>
                   </a:ext>
                 </a:extLst>
               </p:cNvPr>
@@ -35621,7 +35621,7 @@
               <p:cNvPr id="32" name="TextBox 31">
                 <a:extLst>
                   <a:ext uri="{FF2B5EF4-FFF2-40B4-BE49-F238E27FC236}">
-                    <a16:creationId xmlns:a16="http://schemas.microsoft.com/office/drawing/2014/main" xmlns="" id="{78EDB91B-C071-4D7E-B239-6F5257BFA37A}"/>
+                    <a16:creationId xmlns="" xmlns:a16="http://schemas.microsoft.com/office/drawing/2014/main" id="{78EDB91B-C071-4D7E-B239-6F5257BFA37A}"/>
                   </a:ext>
                 </a:extLst>
               </p:cNvPr>
@@ -35657,7 +35657,7 @@
             <p:cNvPr id="68" name="TextBox 67">
               <a:extLst>
                 <a:ext uri="{FF2B5EF4-FFF2-40B4-BE49-F238E27FC236}">
-                  <a16:creationId xmlns:a16="http://schemas.microsoft.com/office/drawing/2014/main" xmlns="" id="{0A60C194-FFE9-4535-BDE8-2F20E4E57547}"/>
+                  <a16:creationId xmlns="" xmlns:a16="http://schemas.microsoft.com/office/drawing/2014/main" id="{0A60C194-FFE9-4535-BDE8-2F20E4E57547}"/>
                 </a:ext>
               </a:extLst>
             </p:cNvPr>
@@ -35692,7 +35692,7 @@
             <p:cNvPr id="69" name="Straight Arrow Connector 68">
               <a:extLst>
                 <a:ext uri="{FF2B5EF4-FFF2-40B4-BE49-F238E27FC236}">
-                  <a16:creationId xmlns:a16="http://schemas.microsoft.com/office/drawing/2014/main" xmlns="" id="{47E19BB3-F762-4D66-86F3-4DF00CE8304A}"/>
+                  <a16:creationId xmlns="" xmlns:a16="http://schemas.microsoft.com/office/drawing/2014/main" id="{47E19BB3-F762-4D66-86F3-4DF00CE8304A}"/>
                 </a:ext>
               </a:extLst>
             </p:cNvPr>
@@ -35736,7 +35736,7 @@
             <p:cNvPr id="70" name="TextBox 69">
               <a:extLst>
                 <a:ext uri="{FF2B5EF4-FFF2-40B4-BE49-F238E27FC236}">
-                  <a16:creationId xmlns:a16="http://schemas.microsoft.com/office/drawing/2014/main" xmlns="" id="{3B75113D-26B4-4A15-9FFC-2D447FA3EC79}"/>
+                  <a16:creationId xmlns="" xmlns:a16="http://schemas.microsoft.com/office/drawing/2014/main" id="{3B75113D-26B4-4A15-9FFC-2D447FA3EC79}"/>
                 </a:ext>
               </a:extLst>
             </p:cNvPr>
@@ -35771,7 +35771,7 @@
             <p:cNvPr id="71" name="Straight Arrow Connector 70">
               <a:extLst>
                 <a:ext uri="{FF2B5EF4-FFF2-40B4-BE49-F238E27FC236}">
-                  <a16:creationId xmlns:a16="http://schemas.microsoft.com/office/drawing/2014/main" xmlns="" id="{EBF545C9-EA5A-4CE0-A939-9A1C6615DDD5}"/>
+                  <a16:creationId xmlns="" xmlns:a16="http://schemas.microsoft.com/office/drawing/2014/main" id="{EBF545C9-EA5A-4CE0-A939-9A1C6615DDD5}"/>
                 </a:ext>
               </a:extLst>
             </p:cNvPr>
@@ -35815,7 +35815,7 @@
             <p:cNvPr id="72" name="TextBox 71">
               <a:extLst>
                 <a:ext uri="{FF2B5EF4-FFF2-40B4-BE49-F238E27FC236}">
-                  <a16:creationId xmlns:a16="http://schemas.microsoft.com/office/drawing/2014/main" xmlns="" id="{4C9035C0-A0A4-430A-91A1-6C4219863EDE}"/>
+                  <a16:creationId xmlns="" xmlns:a16="http://schemas.microsoft.com/office/drawing/2014/main" id="{4C9035C0-A0A4-430A-91A1-6C4219863EDE}"/>
                 </a:ext>
               </a:extLst>
             </p:cNvPr>
@@ -35851,7 +35851,7 @@
           <p:cNvPr id="74" name="TextBox 73">
             <a:extLst>
               <a:ext uri="{FF2B5EF4-FFF2-40B4-BE49-F238E27FC236}">
-                <a16:creationId xmlns:a16="http://schemas.microsoft.com/office/drawing/2014/main" xmlns="" id="{50741080-9C80-4250-AC0F-FFD661CBFA1F}"/>
+                <a16:creationId xmlns="" xmlns:a16="http://schemas.microsoft.com/office/drawing/2014/main" id="{50741080-9C80-4250-AC0F-FFD661CBFA1F}"/>
               </a:ext>
             </a:extLst>
           </p:cNvPr>
@@ -35887,7 +35887,7 @@
           <p:cNvPr id="75" name="Straight Arrow Connector 74">
             <a:extLst>
               <a:ext uri="{FF2B5EF4-FFF2-40B4-BE49-F238E27FC236}">
-                <a16:creationId xmlns:a16="http://schemas.microsoft.com/office/drawing/2014/main" xmlns="" id="{6B3F6054-C557-4674-912C-7B62D069A0A5}"/>
+                <a16:creationId xmlns="" xmlns:a16="http://schemas.microsoft.com/office/drawing/2014/main" id="{6B3F6054-C557-4674-912C-7B62D069A0A5}"/>
               </a:ext>
             </a:extLst>
           </p:cNvPr>
@@ -35932,7 +35932,7 @@
           <p:cNvPr id="81" name="TextBox 80">
             <a:extLst>
               <a:ext uri="{FF2B5EF4-FFF2-40B4-BE49-F238E27FC236}">
-                <a16:creationId xmlns:a16="http://schemas.microsoft.com/office/drawing/2014/main" xmlns="" id="{1544325F-61CC-4767-9E91-0BFCAF00FECD}"/>
+                <a16:creationId xmlns="" xmlns:a16="http://schemas.microsoft.com/office/drawing/2014/main" id="{1544325F-61CC-4767-9E91-0BFCAF00FECD}"/>
               </a:ext>
             </a:extLst>
           </p:cNvPr>
@@ -35968,7 +35968,7 @@
           <p:cNvPr id="82" name="Straight Arrow Connector 81">
             <a:extLst>
               <a:ext uri="{FF2B5EF4-FFF2-40B4-BE49-F238E27FC236}">
-                <a16:creationId xmlns:a16="http://schemas.microsoft.com/office/drawing/2014/main" xmlns="" id="{3DC0B780-9162-4D43-8BD5-694331D969B9}"/>
+                <a16:creationId xmlns="" xmlns:a16="http://schemas.microsoft.com/office/drawing/2014/main" id="{3DC0B780-9162-4D43-8BD5-694331D969B9}"/>
               </a:ext>
             </a:extLst>
           </p:cNvPr>
@@ -36012,7 +36012,7 @@
           <p:cNvPr id="44" name="TextBox 43">
             <a:extLst>
               <a:ext uri="{FF2B5EF4-FFF2-40B4-BE49-F238E27FC236}">
-                <a16:creationId xmlns:a16="http://schemas.microsoft.com/office/drawing/2014/main" xmlns="" id="{5D331EED-21ED-4FC2-B7DC-83316B7E165D}"/>
+                <a16:creationId xmlns="" xmlns:a16="http://schemas.microsoft.com/office/drawing/2014/main" id="{5D331EED-21ED-4FC2-B7DC-83316B7E165D}"/>
               </a:ext>
             </a:extLst>
           </p:cNvPr>
@@ -36050,7 +36050,7 @@
     </p:spTree>
     <p:extLst>
       <p:ext uri="{BB962C8B-B14F-4D97-AF65-F5344CB8AC3E}">
-        <p14:creationId xmlns:p14="http://schemas.microsoft.com/office/powerpoint/2010/main" xmlns="" val="1256710779"/>
+        <p14:creationId xmlns="" xmlns:p14="http://schemas.microsoft.com/office/powerpoint/2010/main" val="1256710779"/>
       </p:ext>
     </p:extLst>
   </p:cSld>
@@ -36349,7 +36349,7 @@
   <a:extraClrSchemeLst/>
   <a:extLst>
     <a:ext uri="{05A4C25C-085E-4340-85A3-A5531E510DB2}">
-      <thm15:themeFamily xmlns:thm15="http://schemas.microsoft.com/office/thememl/2012/main" xmlns="" name="eye_tracker_presentation" id="{00ED1D97-A04B-46A0-BB71-88655A6B057F}" vid="{F36189FA-3966-4852-951E-5734674D1C7B}"/>
+      <thm15:themeFamily xmlns="" xmlns:thm15="http://schemas.microsoft.com/office/thememl/2012/main" name="eye_tracker_presentation" id="{00ED1D97-A04B-46A0-BB71-88655A6B057F}" vid="{F36189FA-3966-4852-951E-5734674D1C7B}"/>
     </a:ext>
   </a:extLst>
 </a:theme>
@@ -36644,7 +36644,7 @@
   <a:extraClrSchemeLst/>
   <a:extLst>
     <a:ext uri="{05A4C25C-085E-4340-85A3-A5531E510DB2}">
-      <thm15:themeFamily xmlns:thm15="http://schemas.microsoft.com/office/thememl/2012/main" xmlns="" name="Office Theme" id="{62F939B6-93AF-4DB8-9C6B-D6C7DFDC589F}" vid="{4A3C46E8-61CC-4603-A589-7422A47A8E4A}"/>
+      <thm15:themeFamily xmlns="" xmlns:thm15="http://schemas.microsoft.com/office/thememl/2012/main" name="Office Theme" id="{62F939B6-93AF-4DB8-9C6B-D6C7DFDC589F}" vid="{4A3C46E8-61CC-4603-A589-7422A47A8E4A}"/>
     </a:ext>
   </a:extLst>
 </a:theme>

</xml_diff>